<commit_message>
Reworked final tokenizer in W9S3, maximal munch in W10S1.
</commit_message>
<xml_diff>
--- a/W10/W10S1/W10S1.pptx
+++ b/W10/W10S1/W10S1.pptx
@@ -5,7 +5,7 @@
     <p:sldMasterId id="2147483648" r:id="rId1"/>
   </p:sldMasterIdLst>
   <p:notesMasterIdLst>
-    <p:notesMasterId r:id="rId33"/>
+    <p:notesMasterId r:id="rId30"/>
   </p:notesMasterIdLst>
   <p:sldIdLst>
     <p:sldId id="377" r:id="rId2"/>
@@ -35,10 +35,7 @@
     <p:sldId id="386" r:id="rId26"/>
     <p:sldId id="387" r:id="rId27"/>
     <p:sldId id="382" r:id="rId28"/>
-    <p:sldId id="383" r:id="rId29"/>
-    <p:sldId id="384" r:id="rId30"/>
-    <p:sldId id="385" r:id="rId31"/>
-    <p:sldId id="379" r:id="rId32"/>
+    <p:sldId id="379" r:id="rId29"/>
   </p:sldIdLst>
   <p:sldSz cx="12192000" cy="6858000"/>
   <p:notesSz cx="6858000" cy="9144000"/>
@@ -191,21 +188,6 @@
             <p14:sldId id="382"/>
           </p14:sldIdLst>
         </p14:section>
-        <p14:section name="Maximal munch algorithm" id="{F50E59B9-7643-4002-8740-B9A0974D9259}">
-          <p14:sldIdLst>
-            <p14:sldId id="383"/>
-          </p14:sldIdLst>
-        </p14:section>
-        <p14:section name="Upgraded version of code with maximal munch" id="{4275FF3E-D348-43AE-90DC-35A20F4AA8AD}">
-          <p14:sldIdLst>
-            <p14:sldId id="384"/>
-          </p14:sldIdLst>
-        </p14:section>
-        <p14:section name="Limits of new implementation" id="{594870C2-F82D-4614-A4FF-0CFE7E8E5962}">
-          <p14:sldIdLst>
-            <p14:sldId id="385"/>
-          </p14:sldIdLst>
-        </p14:section>
         <p14:section name="Recognizing and discarding comments" id="{BBC104A9-9980-47DF-A3E7-9ED3066AD4FF}">
           <p14:sldIdLst>
             <p14:sldId id="379"/>
@@ -4364,7 +4346,7 @@
   <pc:docChgLst>
     <pc:chgData name="Matthieu De Mari" userId="dfb708c9-d8dc-439f-9a3b-c772bf4a311c" providerId="ADAL" clId="{B062104F-1E69-4CDF-A22D-D1D6E8C24F26}"/>
     <pc:docChg chg="undo redo custSel addSld delSld modSld sldOrd addSection delSection modSection">
-      <pc:chgData name="Matthieu De Mari" userId="dfb708c9-d8dc-439f-9a3b-c772bf4a311c" providerId="ADAL" clId="{B062104F-1E69-4CDF-A22D-D1D6E8C24F26}" dt="2023-03-23T07:49:05.126" v="5237" actId="17846"/>
+      <pc:chgData name="Matthieu De Mari" userId="dfb708c9-d8dc-439f-9a3b-c772bf4a311c" providerId="ADAL" clId="{B062104F-1E69-4CDF-A22D-D1D6E8C24F26}" dt="2023-03-23T11:43:39.296" v="5321" actId="47"/>
       <pc:docMkLst>
         <pc:docMk/>
       </pc:docMkLst>
@@ -4485,7 +4467,7 @@
         </pc:spChg>
       </pc:sldChg>
       <pc:sldChg chg="addSp delSp modSp new mod modClrScheme chgLayout">
-        <pc:chgData name="Matthieu De Mari" userId="dfb708c9-d8dc-439f-9a3b-c772bf4a311c" providerId="ADAL" clId="{B062104F-1E69-4CDF-A22D-D1D6E8C24F26}" dt="2023-03-23T07:24:24.812" v="2196" actId="20577"/>
+        <pc:chgData name="Matthieu De Mari" userId="dfb708c9-d8dc-439f-9a3b-c772bf4a311c" providerId="ADAL" clId="{B062104F-1E69-4CDF-A22D-D1D6E8C24F26}" dt="2023-03-23T10:51:16.073" v="5250" actId="20577"/>
         <pc:sldMkLst>
           <pc:docMk/>
           <pc:sldMk cId="3929722451" sldId="381"/>
@@ -4507,7 +4489,7 @@
           </ac:spMkLst>
         </pc:spChg>
         <pc:spChg chg="add mod ord">
-          <ac:chgData name="Matthieu De Mari" userId="dfb708c9-d8dc-439f-9a3b-c772bf4a311c" providerId="ADAL" clId="{B062104F-1E69-4CDF-A22D-D1D6E8C24F26}" dt="2023-03-23T07:24:24.812" v="2196" actId="20577"/>
+          <ac:chgData name="Matthieu De Mari" userId="dfb708c9-d8dc-439f-9a3b-c772bf4a311c" providerId="ADAL" clId="{B062104F-1E69-4CDF-A22D-D1D6E8C24F26}" dt="2023-03-23T10:51:16.073" v="5250" actId="20577"/>
           <ac:spMkLst>
             <pc:docMk/>
             <pc:sldMk cId="3929722451" sldId="381"/>
@@ -4532,7 +4514,7 @@
         </pc:picChg>
       </pc:sldChg>
       <pc:sldChg chg="modSp new mod ord">
-        <pc:chgData name="Matthieu De Mari" userId="dfb708c9-d8dc-439f-9a3b-c772bf4a311c" providerId="ADAL" clId="{B062104F-1E69-4CDF-A22D-D1D6E8C24F26}" dt="2023-03-21T09:49:10.062" v="1328" actId="5793"/>
+        <pc:chgData name="Matthieu De Mari" userId="dfb708c9-d8dc-439f-9a3b-c772bf4a311c" providerId="ADAL" clId="{B062104F-1E69-4CDF-A22D-D1D6E8C24F26}" dt="2023-03-23T11:43:34.416" v="5320" actId="27636"/>
         <pc:sldMkLst>
           <pc:docMk/>
           <pc:sldMk cId="2291200604" sldId="382"/>
@@ -4546,7 +4528,7 @@
           </ac:spMkLst>
         </pc:spChg>
         <pc:spChg chg="mod">
-          <ac:chgData name="Matthieu De Mari" userId="dfb708c9-d8dc-439f-9a3b-c772bf4a311c" providerId="ADAL" clId="{B062104F-1E69-4CDF-A22D-D1D6E8C24F26}" dt="2023-03-21T09:49:10.062" v="1328" actId="5793"/>
+          <ac:chgData name="Matthieu De Mari" userId="dfb708c9-d8dc-439f-9a3b-c772bf4a311c" providerId="ADAL" clId="{B062104F-1E69-4CDF-A22D-D1D6E8C24F26}" dt="2023-03-23T11:43:34.416" v="5320" actId="27636"/>
           <ac:spMkLst>
             <pc:docMk/>
             <pc:sldMk cId="2291200604" sldId="382"/>
@@ -4554,22 +4536,22 @@
           </ac:spMkLst>
         </pc:spChg>
       </pc:sldChg>
-      <pc:sldChg chg="new">
-        <pc:chgData name="Matthieu De Mari" userId="dfb708c9-d8dc-439f-9a3b-c772bf4a311c" providerId="ADAL" clId="{B062104F-1E69-4CDF-A22D-D1D6E8C24F26}" dt="2023-03-21T09:35:26.775" v="1320" actId="680"/>
+      <pc:sldChg chg="new del">
+        <pc:chgData name="Matthieu De Mari" userId="dfb708c9-d8dc-439f-9a3b-c772bf4a311c" providerId="ADAL" clId="{B062104F-1E69-4CDF-A22D-D1D6E8C24F26}" dt="2023-03-23T11:43:19.691" v="5316" actId="47"/>
         <pc:sldMkLst>
           <pc:docMk/>
           <pc:sldMk cId="3242948426" sldId="383"/>
         </pc:sldMkLst>
       </pc:sldChg>
-      <pc:sldChg chg="new">
-        <pc:chgData name="Matthieu De Mari" userId="dfb708c9-d8dc-439f-9a3b-c772bf4a311c" providerId="ADAL" clId="{B062104F-1E69-4CDF-A22D-D1D6E8C24F26}" dt="2023-03-21T09:35:38.917" v="1323" actId="680"/>
+      <pc:sldChg chg="new del">
+        <pc:chgData name="Matthieu De Mari" userId="dfb708c9-d8dc-439f-9a3b-c772bf4a311c" providerId="ADAL" clId="{B062104F-1E69-4CDF-A22D-D1D6E8C24F26}" dt="2023-03-23T11:43:21.033" v="5317" actId="47"/>
         <pc:sldMkLst>
           <pc:docMk/>
           <pc:sldMk cId="1463768414" sldId="384"/>
         </pc:sldMkLst>
       </pc:sldChg>
-      <pc:sldChg chg="modSp new mod">
-        <pc:chgData name="Matthieu De Mari" userId="dfb708c9-d8dc-439f-9a3b-c772bf4a311c" providerId="ADAL" clId="{B062104F-1E69-4CDF-A22D-D1D6E8C24F26}" dt="2023-03-21T09:52:13.789" v="1681" actId="20577"/>
+      <pc:sldChg chg="modSp new del mod">
+        <pc:chgData name="Matthieu De Mari" userId="dfb708c9-d8dc-439f-9a3b-c772bf4a311c" providerId="ADAL" clId="{B062104F-1E69-4CDF-A22D-D1D6E8C24F26}" dt="2023-03-23T11:43:39.296" v="5321" actId="47"/>
         <pc:sldMkLst>
           <pc:docMk/>
           <pc:sldMk cId="1117217621" sldId="385"/>
@@ -4583,7 +4565,7 @@
           </ac:spMkLst>
         </pc:spChg>
         <pc:spChg chg="mod">
-          <ac:chgData name="Matthieu De Mari" userId="dfb708c9-d8dc-439f-9a3b-c772bf4a311c" providerId="ADAL" clId="{B062104F-1E69-4CDF-A22D-D1D6E8C24F26}" dt="2023-03-21T09:51:46.995" v="1665" actId="20577"/>
+          <ac:chgData name="Matthieu De Mari" userId="dfb708c9-d8dc-439f-9a3b-c772bf4a311c" providerId="ADAL" clId="{B062104F-1E69-4CDF-A22D-D1D6E8C24F26}" dt="2023-03-23T11:43:31.020" v="5318" actId="21"/>
           <ac:spMkLst>
             <pc:docMk/>
             <pc:sldMk cId="1117217621" sldId="385"/>
@@ -4627,7 +4609,7 @@
         </pc:sldMkLst>
       </pc:sldChg>
       <pc:sldChg chg="addSp delSp modSp new mod modClrScheme chgLayout">
-        <pc:chgData name="Matthieu De Mari" userId="dfb708c9-d8dc-439f-9a3b-c772bf4a311c" providerId="ADAL" clId="{B062104F-1E69-4CDF-A22D-D1D6E8C24F26}" dt="2023-03-23T07:30:55.309" v="2648" actId="14100"/>
+        <pc:chgData name="Matthieu De Mari" userId="dfb708c9-d8dc-439f-9a3b-c772bf4a311c" providerId="ADAL" clId="{B062104F-1E69-4CDF-A22D-D1D6E8C24F26}" dt="2023-03-23T10:51:27.897" v="5252" actId="20577"/>
         <pc:sldMkLst>
           <pc:docMk/>
           <pc:sldMk cId="3646841337" sldId="388"/>
@@ -4681,7 +4663,7 @@
           </ac:spMkLst>
         </pc:spChg>
         <pc:spChg chg="add mod">
-          <ac:chgData name="Matthieu De Mari" userId="dfb708c9-d8dc-439f-9a3b-c772bf4a311c" providerId="ADAL" clId="{B062104F-1E69-4CDF-A22D-D1D6E8C24F26}" dt="2023-03-23T07:29:56.406" v="2607" actId="20577"/>
+          <ac:chgData name="Matthieu De Mari" userId="dfb708c9-d8dc-439f-9a3b-c772bf4a311c" providerId="ADAL" clId="{B062104F-1E69-4CDF-A22D-D1D6E8C24F26}" dt="2023-03-23T10:51:27.897" v="5252" actId="20577"/>
           <ac:spMkLst>
             <pc:docMk/>
             <pc:sldMk cId="3646841337" sldId="388"/>
@@ -4690,13 +4672,13 @@
         </pc:spChg>
       </pc:sldChg>
       <pc:sldChg chg="addSp delSp modSp add mod">
-        <pc:chgData name="Matthieu De Mari" userId="dfb708c9-d8dc-439f-9a3b-c772bf4a311c" providerId="ADAL" clId="{B062104F-1E69-4CDF-A22D-D1D6E8C24F26}" dt="2023-03-23T07:31:01.244" v="2677" actId="1038"/>
+        <pc:chgData name="Matthieu De Mari" userId="dfb708c9-d8dc-439f-9a3b-c772bf4a311c" providerId="ADAL" clId="{B062104F-1E69-4CDF-A22D-D1D6E8C24F26}" dt="2023-03-23T10:51:30.922" v="5254" actId="20577"/>
         <pc:sldMkLst>
           <pc:docMk/>
           <pc:sldMk cId="1748129226" sldId="389"/>
         </pc:sldMkLst>
         <pc:spChg chg="add mod">
-          <ac:chgData name="Matthieu De Mari" userId="dfb708c9-d8dc-439f-9a3b-c772bf4a311c" providerId="ADAL" clId="{B062104F-1E69-4CDF-A22D-D1D6E8C24F26}" dt="2023-03-23T07:29:58.050" v="2608"/>
+          <ac:chgData name="Matthieu De Mari" userId="dfb708c9-d8dc-439f-9a3b-c772bf4a311c" providerId="ADAL" clId="{B062104F-1E69-4CDF-A22D-D1D6E8C24F26}" dt="2023-03-23T10:51:30.922" v="5254" actId="20577"/>
           <ac:spMkLst>
             <pc:docMk/>
             <pc:sldMk cId="1748129226" sldId="389"/>
@@ -4751,13 +4733,13 @@
         </pc:sldMkLst>
       </pc:sldChg>
       <pc:sldChg chg="addSp delSp modSp add mod">
-        <pc:chgData name="Matthieu De Mari" userId="dfb708c9-d8dc-439f-9a3b-c772bf4a311c" providerId="ADAL" clId="{B062104F-1E69-4CDF-A22D-D1D6E8C24F26}" dt="2023-03-23T07:31:06.127" v="2698" actId="1038"/>
+        <pc:chgData name="Matthieu De Mari" userId="dfb708c9-d8dc-439f-9a3b-c772bf4a311c" providerId="ADAL" clId="{B062104F-1E69-4CDF-A22D-D1D6E8C24F26}" dt="2023-03-23T10:51:33.516" v="5256" actId="20577"/>
         <pc:sldMkLst>
           <pc:docMk/>
           <pc:sldMk cId="1434346927" sldId="390"/>
         </pc:sldMkLst>
         <pc:spChg chg="add mod">
-          <ac:chgData name="Matthieu De Mari" userId="dfb708c9-d8dc-439f-9a3b-c772bf4a311c" providerId="ADAL" clId="{B062104F-1E69-4CDF-A22D-D1D6E8C24F26}" dt="2023-03-23T07:30:24.077" v="2623" actId="20577"/>
+          <ac:chgData name="Matthieu De Mari" userId="dfb708c9-d8dc-439f-9a3b-c772bf4a311c" providerId="ADAL" clId="{B062104F-1E69-4CDF-A22D-D1D6E8C24F26}" dt="2023-03-23T10:51:33.516" v="5256" actId="20577"/>
           <ac:spMkLst>
             <pc:docMk/>
             <pc:sldMk cId="1434346927" sldId="390"/>
@@ -4797,13 +4779,13 @@
         </pc:sldMkLst>
       </pc:sldChg>
       <pc:sldChg chg="addSp delSp modSp add mod">
-        <pc:chgData name="Matthieu De Mari" userId="dfb708c9-d8dc-439f-9a3b-c772bf4a311c" providerId="ADAL" clId="{B062104F-1E69-4CDF-A22D-D1D6E8C24F26}" dt="2023-03-23T07:31:20.576" v="2737" actId="20577"/>
+        <pc:chgData name="Matthieu De Mari" userId="dfb708c9-d8dc-439f-9a3b-c772bf4a311c" providerId="ADAL" clId="{B062104F-1E69-4CDF-A22D-D1D6E8C24F26}" dt="2023-03-23T10:51:36.167" v="5258" actId="20577"/>
         <pc:sldMkLst>
           <pc:docMk/>
           <pc:sldMk cId="2471101771" sldId="391"/>
         </pc:sldMkLst>
         <pc:spChg chg="mod">
-          <ac:chgData name="Matthieu De Mari" userId="dfb708c9-d8dc-439f-9a3b-c772bf4a311c" providerId="ADAL" clId="{B062104F-1E69-4CDF-A22D-D1D6E8C24F26}" dt="2023-03-23T07:31:20.576" v="2737" actId="20577"/>
+          <ac:chgData name="Matthieu De Mari" userId="dfb708c9-d8dc-439f-9a3b-c772bf4a311c" providerId="ADAL" clId="{B062104F-1E69-4CDF-A22D-D1D6E8C24F26}" dt="2023-03-23T10:51:36.167" v="5258" actId="20577"/>
           <ac:spMkLst>
             <pc:docMk/>
             <pc:sldMk cId="2471101771" sldId="391"/>
@@ -4835,13 +4817,13 @@
         </pc:sldMkLst>
       </pc:sldChg>
       <pc:sldChg chg="modSp add mod">
-        <pc:chgData name="Matthieu De Mari" userId="dfb708c9-d8dc-439f-9a3b-c772bf4a311c" providerId="ADAL" clId="{B062104F-1E69-4CDF-A22D-D1D6E8C24F26}" dt="2023-03-23T07:32:00.469" v="2843" actId="20577"/>
+        <pc:chgData name="Matthieu De Mari" userId="dfb708c9-d8dc-439f-9a3b-c772bf4a311c" providerId="ADAL" clId="{B062104F-1E69-4CDF-A22D-D1D6E8C24F26}" dt="2023-03-23T10:51:40.122" v="5260" actId="20577"/>
         <pc:sldMkLst>
           <pc:docMk/>
           <pc:sldMk cId="3422702262" sldId="392"/>
         </pc:sldMkLst>
         <pc:spChg chg="mod">
-          <ac:chgData name="Matthieu De Mari" userId="dfb708c9-d8dc-439f-9a3b-c772bf4a311c" providerId="ADAL" clId="{B062104F-1E69-4CDF-A22D-D1D6E8C24F26}" dt="2023-03-23T07:32:00.469" v="2843" actId="20577"/>
+          <ac:chgData name="Matthieu De Mari" userId="dfb708c9-d8dc-439f-9a3b-c772bf4a311c" providerId="ADAL" clId="{B062104F-1E69-4CDF-A22D-D1D6E8C24F26}" dt="2023-03-23T10:51:40.122" v="5260" actId="20577"/>
           <ac:spMkLst>
             <pc:docMk/>
             <pc:sldMk cId="3422702262" sldId="392"/>
@@ -4858,7 +4840,7 @@
         </pc:spChg>
       </pc:sldChg>
       <pc:sldChg chg="modSp new mod">
-        <pc:chgData name="Matthieu De Mari" userId="dfb708c9-d8dc-439f-9a3b-c772bf4a311c" providerId="ADAL" clId="{B062104F-1E69-4CDF-A22D-D1D6E8C24F26}" dt="2023-03-23T07:34:52.902" v="3366" actId="122"/>
+        <pc:chgData name="Matthieu De Mari" userId="dfb708c9-d8dc-439f-9a3b-c772bf4a311c" providerId="ADAL" clId="{B062104F-1E69-4CDF-A22D-D1D6E8C24F26}" dt="2023-03-23T10:51:59.092" v="5266" actId="20577"/>
         <pc:sldMkLst>
           <pc:docMk/>
           <pc:sldMk cId="2789972961" sldId="393"/>
@@ -4872,7 +4854,7 @@
           </ac:spMkLst>
         </pc:spChg>
         <pc:spChg chg="mod">
-          <ac:chgData name="Matthieu De Mari" userId="dfb708c9-d8dc-439f-9a3b-c772bf4a311c" providerId="ADAL" clId="{B062104F-1E69-4CDF-A22D-D1D6E8C24F26}" dt="2023-03-23T07:34:52.902" v="3366" actId="122"/>
+          <ac:chgData name="Matthieu De Mari" userId="dfb708c9-d8dc-439f-9a3b-c772bf4a311c" providerId="ADAL" clId="{B062104F-1E69-4CDF-A22D-D1D6E8C24F26}" dt="2023-03-23T10:51:59.092" v="5266" actId="20577"/>
           <ac:spMkLst>
             <pc:docMk/>
             <pc:sldMk cId="2789972961" sldId="393"/>
@@ -4881,13 +4863,13 @@
         </pc:spChg>
       </pc:sldChg>
       <pc:sldChg chg="addSp modSp add mod">
-        <pc:chgData name="Matthieu De Mari" userId="dfb708c9-d8dc-439f-9a3b-c772bf4a311c" providerId="ADAL" clId="{B062104F-1E69-4CDF-A22D-D1D6E8C24F26}" dt="2023-03-23T07:40:50.251" v="3942" actId="20577"/>
+        <pc:chgData name="Matthieu De Mari" userId="dfb708c9-d8dc-439f-9a3b-c772bf4a311c" providerId="ADAL" clId="{B062104F-1E69-4CDF-A22D-D1D6E8C24F26}" dt="2023-03-23T10:54:13.918" v="5297" actId="113"/>
         <pc:sldMkLst>
           <pc:docMk/>
           <pc:sldMk cId="1577038532" sldId="394"/>
         </pc:sldMkLst>
         <pc:spChg chg="mod">
-          <ac:chgData name="Matthieu De Mari" userId="dfb708c9-d8dc-439f-9a3b-c772bf4a311c" providerId="ADAL" clId="{B062104F-1E69-4CDF-A22D-D1D6E8C24F26}" dt="2023-03-23T07:35:13.233" v="3398" actId="113"/>
+          <ac:chgData name="Matthieu De Mari" userId="dfb708c9-d8dc-439f-9a3b-c772bf4a311c" providerId="ADAL" clId="{B062104F-1E69-4CDF-A22D-D1D6E8C24F26}" dt="2023-03-23T10:54:13.918" v="5297" actId="113"/>
           <ac:spMkLst>
             <pc:docMk/>
             <pc:sldMk cId="1577038532" sldId="394"/>
@@ -4918,13 +4900,13 @@
         </pc:sldMkLst>
       </pc:sldChg>
       <pc:sldChg chg="modSp add mod">
-        <pc:chgData name="Matthieu De Mari" userId="dfb708c9-d8dc-439f-9a3b-c772bf4a311c" providerId="ADAL" clId="{B062104F-1E69-4CDF-A22D-D1D6E8C24F26}" dt="2023-03-23T07:36:49.202" v="3568" actId="113"/>
+        <pc:chgData name="Matthieu De Mari" userId="dfb708c9-d8dc-439f-9a3b-c772bf4a311c" providerId="ADAL" clId="{B062104F-1E69-4CDF-A22D-D1D6E8C24F26}" dt="2023-03-23T10:52:35.337" v="5270" actId="20577"/>
         <pc:sldMkLst>
           <pc:docMk/>
           <pc:sldMk cId="2803925302" sldId="395"/>
         </pc:sldMkLst>
         <pc:spChg chg="mod">
-          <ac:chgData name="Matthieu De Mari" userId="dfb708c9-d8dc-439f-9a3b-c772bf4a311c" providerId="ADAL" clId="{B062104F-1E69-4CDF-A22D-D1D6E8C24F26}" dt="2023-03-23T07:36:49.202" v="3568" actId="113"/>
+          <ac:chgData name="Matthieu De Mari" userId="dfb708c9-d8dc-439f-9a3b-c772bf4a311c" providerId="ADAL" clId="{B062104F-1E69-4CDF-A22D-D1D6E8C24F26}" dt="2023-03-23T10:52:35.337" v="5270" actId="20577"/>
           <ac:spMkLst>
             <pc:docMk/>
             <pc:sldMk cId="2803925302" sldId="395"/>
@@ -4933,13 +4915,13 @@
         </pc:spChg>
       </pc:sldChg>
       <pc:sldChg chg="modSp add mod">
-        <pc:chgData name="Matthieu De Mari" userId="dfb708c9-d8dc-439f-9a3b-c772bf4a311c" providerId="ADAL" clId="{B062104F-1E69-4CDF-A22D-D1D6E8C24F26}" dt="2023-03-23T07:36:25.138" v="3535" actId="20577"/>
+        <pc:chgData name="Matthieu De Mari" userId="dfb708c9-d8dc-439f-9a3b-c772bf4a311c" providerId="ADAL" clId="{B062104F-1E69-4CDF-A22D-D1D6E8C24F26}" dt="2023-03-23T10:52:39.614" v="5272" actId="20577"/>
         <pc:sldMkLst>
           <pc:docMk/>
           <pc:sldMk cId="1573852417" sldId="396"/>
         </pc:sldMkLst>
         <pc:spChg chg="mod">
-          <ac:chgData name="Matthieu De Mari" userId="dfb708c9-d8dc-439f-9a3b-c772bf4a311c" providerId="ADAL" clId="{B062104F-1E69-4CDF-A22D-D1D6E8C24F26}" dt="2023-03-23T07:36:25.138" v="3535" actId="20577"/>
+          <ac:chgData name="Matthieu De Mari" userId="dfb708c9-d8dc-439f-9a3b-c772bf4a311c" providerId="ADAL" clId="{B062104F-1E69-4CDF-A22D-D1D6E8C24F26}" dt="2023-03-23T10:52:39.614" v="5272" actId="20577"/>
           <ac:spMkLst>
             <pc:docMk/>
             <pc:sldMk cId="1573852417" sldId="396"/>
@@ -4970,13 +4952,13 @@
         </pc:sldMkLst>
       </pc:sldChg>
       <pc:sldChg chg="modSp add mod">
-        <pc:chgData name="Matthieu De Mari" userId="dfb708c9-d8dc-439f-9a3b-c772bf4a311c" providerId="ADAL" clId="{B062104F-1E69-4CDF-A22D-D1D6E8C24F26}" dt="2023-03-23T07:37:22.627" v="3633" actId="20577"/>
+        <pc:chgData name="Matthieu De Mari" userId="dfb708c9-d8dc-439f-9a3b-c772bf4a311c" providerId="ADAL" clId="{B062104F-1E69-4CDF-A22D-D1D6E8C24F26}" dt="2023-03-23T10:52:46.726" v="5276" actId="20577"/>
         <pc:sldMkLst>
           <pc:docMk/>
           <pc:sldMk cId="1501876870" sldId="397"/>
         </pc:sldMkLst>
         <pc:spChg chg="mod">
-          <ac:chgData name="Matthieu De Mari" userId="dfb708c9-d8dc-439f-9a3b-c772bf4a311c" providerId="ADAL" clId="{B062104F-1E69-4CDF-A22D-D1D6E8C24F26}" dt="2023-03-23T07:37:22.627" v="3633" actId="20577"/>
+          <ac:chgData name="Matthieu De Mari" userId="dfb708c9-d8dc-439f-9a3b-c772bf4a311c" providerId="ADAL" clId="{B062104F-1E69-4CDF-A22D-D1D6E8C24F26}" dt="2023-03-23T10:52:46.726" v="5276" actId="20577"/>
           <ac:spMkLst>
             <pc:docMk/>
             <pc:sldMk cId="1501876870" sldId="397"/>
@@ -5000,13 +4982,13 @@
         </pc:sldMkLst>
       </pc:sldChg>
       <pc:sldChg chg="modSp add mod">
-        <pc:chgData name="Matthieu De Mari" userId="dfb708c9-d8dc-439f-9a3b-c772bf4a311c" providerId="ADAL" clId="{B062104F-1E69-4CDF-A22D-D1D6E8C24F26}" dt="2023-03-23T07:36:41.215" v="3565" actId="113"/>
+        <pc:chgData name="Matthieu De Mari" userId="dfb708c9-d8dc-439f-9a3b-c772bf4a311c" providerId="ADAL" clId="{B062104F-1E69-4CDF-A22D-D1D6E8C24F26}" dt="2023-03-23T10:52:42.499" v="5274" actId="20577"/>
         <pc:sldMkLst>
           <pc:docMk/>
           <pc:sldMk cId="3664343651" sldId="398"/>
         </pc:sldMkLst>
         <pc:spChg chg="mod">
-          <ac:chgData name="Matthieu De Mari" userId="dfb708c9-d8dc-439f-9a3b-c772bf4a311c" providerId="ADAL" clId="{B062104F-1E69-4CDF-A22D-D1D6E8C24F26}" dt="2023-03-23T07:36:41.215" v="3565" actId="113"/>
+          <ac:chgData name="Matthieu De Mari" userId="dfb708c9-d8dc-439f-9a3b-c772bf4a311c" providerId="ADAL" clId="{B062104F-1E69-4CDF-A22D-D1D6E8C24F26}" dt="2023-03-23T10:52:42.499" v="5274" actId="20577"/>
           <ac:spMkLst>
             <pc:docMk/>
             <pc:sldMk cId="3664343651" sldId="398"/>
@@ -5015,13 +4997,13 @@
         </pc:spChg>
       </pc:sldChg>
       <pc:sldChg chg="modSp add mod">
-        <pc:chgData name="Matthieu De Mari" userId="dfb708c9-d8dc-439f-9a3b-c772bf4a311c" providerId="ADAL" clId="{B062104F-1E69-4CDF-A22D-D1D6E8C24F26}" dt="2023-03-23T07:37:26.227" v="3637" actId="20577"/>
+        <pc:chgData name="Matthieu De Mari" userId="dfb708c9-d8dc-439f-9a3b-c772bf4a311c" providerId="ADAL" clId="{B062104F-1E69-4CDF-A22D-D1D6E8C24F26}" dt="2023-03-23T10:52:52.156" v="5278" actId="20577"/>
         <pc:sldMkLst>
           <pc:docMk/>
           <pc:sldMk cId="135080229" sldId="399"/>
         </pc:sldMkLst>
         <pc:spChg chg="mod">
-          <ac:chgData name="Matthieu De Mari" userId="dfb708c9-d8dc-439f-9a3b-c772bf4a311c" providerId="ADAL" clId="{B062104F-1E69-4CDF-A22D-D1D6E8C24F26}" dt="2023-03-23T07:37:26.227" v="3637" actId="20577"/>
+          <ac:chgData name="Matthieu De Mari" userId="dfb708c9-d8dc-439f-9a3b-c772bf4a311c" providerId="ADAL" clId="{B062104F-1E69-4CDF-A22D-D1D6E8C24F26}" dt="2023-03-23T10:52:52.156" v="5278" actId="20577"/>
           <ac:spMkLst>
             <pc:docMk/>
             <pc:sldMk cId="135080229" sldId="399"/>
@@ -5052,13 +5034,13 @@
         </pc:sldMkLst>
       </pc:sldChg>
       <pc:sldChg chg="modSp add mod">
-        <pc:chgData name="Matthieu De Mari" userId="dfb708c9-d8dc-439f-9a3b-c772bf4a311c" providerId="ADAL" clId="{B062104F-1E69-4CDF-A22D-D1D6E8C24F26}" dt="2023-03-23T07:37:37.270" v="3677" actId="1038"/>
+        <pc:chgData name="Matthieu De Mari" userId="dfb708c9-d8dc-439f-9a3b-c772bf4a311c" providerId="ADAL" clId="{B062104F-1E69-4CDF-A22D-D1D6E8C24F26}" dt="2023-03-23T10:52:55.371" v="5280" actId="20577"/>
         <pc:sldMkLst>
           <pc:docMk/>
           <pc:sldMk cId="2744671885" sldId="400"/>
         </pc:sldMkLst>
         <pc:spChg chg="mod">
-          <ac:chgData name="Matthieu De Mari" userId="dfb708c9-d8dc-439f-9a3b-c772bf4a311c" providerId="ADAL" clId="{B062104F-1E69-4CDF-A22D-D1D6E8C24F26}" dt="2023-03-23T07:37:34.646" v="3649" actId="20577"/>
+          <ac:chgData name="Matthieu De Mari" userId="dfb708c9-d8dc-439f-9a3b-c772bf4a311c" providerId="ADAL" clId="{B062104F-1E69-4CDF-A22D-D1D6E8C24F26}" dt="2023-03-23T10:52:55.371" v="5280" actId="20577"/>
           <ac:spMkLst>
             <pc:docMk/>
             <pc:sldMk cId="2744671885" sldId="400"/>
@@ -5075,13 +5057,13 @@
         </pc:spChg>
       </pc:sldChg>
       <pc:sldChg chg="modSp add mod">
-        <pc:chgData name="Matthieu De Mari" userId="dfb708c9-d8dc-439f-9a3b-c772bf4a311c" providerId="ADAL" clId="{B062104F-1E69-4CDF-A22D-D1D6E8C24F26}" dt="2023-03-23T07:37:55.992" v="3733" actId="20577"/>
+        <pc:chgData name="Matthieu De Mari" userId="dfb708c9-d8dc-439f-9a3b-c772bf4a311c" providerId="ADAL" clId="{B062104F-1E69-4CDF-A22D-D1D6E8C24F26}" dt="2023-03-23T10:53:49.212" v="5294" actId="113"/>
         <pc:sldMkLst>
           <pc:docMk/>
           <pc:sldMk cId="3302857874" sldId="401"/>
         </pc:sldMkLst>
         <pc:spChg chg="mod">
-          <ac:chgData name="Matthieu De Mari" userId="dfb708c9-d8dc-439f-9a3b-c772bf4a311c" providerId="ADAL" clId="{B062104F-1E69-4CDF-A22D-D1D6E8C24F26}" dt="2023-03-23T07:37:55.992" v="3733" actId="20577"/>
+          <ac:chgData name="Matthieu De Mari" userId="dfb708c9-d8dc-439f-9a3b-c772bf4a311c" providerId="ADAL" clId="{B062104F-1E69-4CDF-A22D-D1D6E8C24F26}" dt="2023-03-23T10:53:49.212" v="5294" actId="113"/>
           <ac:spMkLst>
             <pc:docMk/>
             <pc:sldMk cId="3302857874" sldId="401"/>
@@ -5097,13 +5079,13 @@
         </pc:sldMkLst>
       </pc:sldChg>
       <pc:sldChg chg="modSp add mod">
-        <pc:chgData name="Matthieu De Mari" userId="dfb708c9-d8dc-439f-9a3b-c772bf4a311c" providerId="ADAL" clId="{B062104F-1E69-4CDF-A22D-D1D6E8C24F26}" dt="2023-03-23T07:38:13.003" v="3752" actId="20577"/>
+        <pc:chgData name="Matthieu De Mari" userId="dfb708c9-d8dc-439f-9a3b-c772bf4a311c" providerId="ADAL" clId="{B062104F-1E69-4CDF-A22D-D1D6E8C24F26}" dt="2023-03-23T10:53:38.479" v="5292" actId="113"/>
         <pc:sldMkLst>
           <pc:docMk/>
           <pc:sldMk cId="2243929354" sldId="402"/>
         </pc:sldMkLst>
         <pc:spChg chg="mod">
-          <ac:chgData name="Matthieu De Mari" userId="dfb708c9-d8dc-439f-9a3b-c772bf4a311c" providerId="ADAL" clId="{B062104F-1E69-4CDF-A22D-D1D6E8C24F26}" dt="2023-03-23T07:38:13.003" v="3752" actId="20577"/>
+          <ac:chgData name="Matthieu De Mari" userId="dfb708c9-d8dc-439f-9a3b-c772bf4a311c" providerId="ADAL" clId="{B062104F-1E69-4CDF-A22D-D1D6E8C24F26}" dt="2023-03-23T10:53:38.479" v="5292" actId="113"/>
           <ac:spMkLst>
             <pc:docMk/>
             <pc:sldMk cId="2243929354" sldId="402"/>
@@ -5112,13 +5094,13 @@
         </pc:spChg>
       </pc:sldChg>
       <pc:sldChg chg="modSp add mod">
-        <pc:chgData name="Matthieu De Mari" userId="dfb708c9-d8dc-439f-9a3b-c772bf4a311c" providerId="ADAL" clId="{B062104F-1E69-4CDF-A22D-D1D6E8C24F26}" dt="2023-03-23T07:38:25.745" v="3777" actId="6549"/>
+        <pc:chgData name="Matthieu De Mari" userId="dfb708c9-d8dc-439f-9a3b-c772bf4a311c" providerId="ADAL" clId="{B062104F-1E69-4CDF-A22D-D1D6E8C24F26}" dt="2023-03-23T10:53:27.045" v="5286" actId="20577"/>
         <pc:sldMkLst>
           <pc:docMk/>
           <pc:sldMk cId="1279828586" sldId="403"/>
         </pc:sldMkLst>
         <pc:spChg chg="mod">
-          <ac:chgData name="Matthieu De Mari" userId="dfb708c9-d8dc-439f-9a3b-c772bf4a311c" providerId="ADAL" clId="{B062104F-1E69-4CDF-A22D-D1D6E8C24F26}" dt="2023-03-23T07:38:25.745" v="3777" actId="6549"/>
+          <ac:chgData name="Matthieu De Mari" userId="dfb708c9-d8dc-439f-9a3b-c772bf4a311c" providerId="ADAL" clId="{B062104F-1E69-4CDF-A22D-D1D6E8C24F26}" dt="2023-03-23T10:53:27.045" v="5286" actId="20577"/>
           <ac:spMkLst>
             <pc:docMk/>
             <pc:sldMk cId="1279828586" sldId="403"/>
@@ -5142,13 +5124,13 @@
         </pc:sldMkLst>
       </pc:sldChg>
       <pc:sldChg chg="modSp add mod">
-        <pc:chgData name="Matthieu De Mari" userId="dfb708c9-d8dc-439f-9a3b-c772bf4a311c" providerId="ADAL" clId="{B062104F-1E69-4CDF-A22D-D1D6E8C24F26}" dt="2023-03-23T07:38:50.826" v="3812" actId="20577"/>
+        <pc:chgData name="Matthieu De Mari" userId="dfb708c9-d8dc-439f-9a3b-c772bf4a311c" providerId="ADAL" clId="{B062104F-1E69-4CDF-A22D-D1D6E8C24F26}" dt="2023-03-23T10:53:32.612" v="5289" actId="113"/>
         <pc:sldMkLst>
           <pc:docMk/>
           <pc:sldMk cId="1991040393" sldId="404"/>
         </pc:sldMkLst>
         <pc:spChg chg="mod">
-          <ac:chgData name="Matthieu De Mari" userId="dfb708c9-d8dc-439f-9a3b-c772bf4a311c" providerId="ADAL" clId="{B062104F-1E69-4CDF-A22D-D1D6E8C24F26}" dt="2023-03-23T07:38:50.826" v="3812" actId="20577"/>
+          <ac:chgData name="Matthieu De Mari" userId="dfb708c9-d8dc-439f-9a3b-c772bf4a311c" providerId="ADAL" clId="{B062104F-1E69-4CDF-A22D-D1D6E8C24F26}" dt="2023-03-23T10:53:32.612" v="5289" actId="113"/>
           <ac:spMkLst>
             <pc:docMk/>
             <pc:sldMk cId="1991040393" sldId="404"/>
@@ -5179,13 +5161,13 @@
         </pc:sldMkLst>
       </pc:sldChg>
       <pc:sldChg chg="addSp modSp add mod">
-        <pc:chgData name="Matthieu De Mari" userId="dfb708c9-d8dc-439f-9a3b-c772bf4a311c" providerId="ADAL" clId="{B062104F-1E69-4CDF-A22D-D1D6E8C24F26}" dt="2023-03-23T07:40:45.239" v="3941" actId="20577"/>
+        <pc:chgData name="Matthieu De Mari" userId="dfb708c9-d8dc-439f-9a3b-c772bf4a311c" providerId="ADAL" clId="{B062104F-1E69-4CDF-A22D-D1D6E8C24F26}" dt="2023-03-23T10:54:18.171" v="5298" actId="113"/>
         <pc:sldMkLst>
           <pc:docMk/>
           <pc:sldMk cId="4083758455" sldId="405"/>
         </pc:sldMkLst>
         <pc:spChg chg="mod">
-          <ac:chgData name="Matthieu De Mari" userId="dfb708c9-d8dc-439f-9a3b-c772bf4a311c" providerId="ADAL" clId="{B062104F-1E69-4CDF-A22D-D1D6E8C24F26}" dt="2023-03-23T07:39:24.470" v="3827" actId="20577"/>
+          <ac:chgData name="Matthieu De Mari" userId="dfb708c9-d8dc-439f-9a3b-c772bf4a311c" providerId="ADAL" clId="{B062104F-1E69-4CDF-A22D-D1D6E8C24F26}" dt="2023-03-23T10:54:18.171" v="5298" actId="113"/>
           <ac:spMkLst>
             <pc:docMk/>
             <pc:sldMk cId="4083758455" sldId="405"/>
@@ -5247,13 +5229,13 @@
         </pc:sldMkLst>
       </pc:sldChg>
       <pc:sldChg chg="modSp add mod">
-        <pc:chgData name="Matthieu De Mari" userId="dfb708c9-d8dc-439f-9a3b-c772bf4a311c" providerId="ADAL" clId="{B062104F-1E69-4CDF-A22D-D1D6E8C24F26}" dt="2023-03-23T07:48:54.730" v="5236" actId="20577"/>
+        <pc:chgData name="Matthieu De Mari" userId="dfb708c9-d8dc-439f-9a3b-c772bf4a311c" providerId="ADAL" clId="{B062104F-1E69-4CDF-A22D-D1D6E8C24F26}" dt="2023-03-23T10:55:02.921" v="5314" actId="20577"/>
         <pc:sldMkLst>
           <pc:docMk/>
           <pc:sldMk cId="2387224364" sldId="407"/>
         </pc:sldMkLst>
         <pc:spChg chg="mod">
-          <ac:chgData name="Matthieu De Mari" userId="dfb708c9-d8dc-439f-9a3b-c772bf4a311c" providerId="ADAL" clId="{B062104F-1E69-4CDF-A22D-D1D6E8C24F26}" dt="2023-03-23T07:48:54.730" v="5236" actId="20577"/>
+          <ac:chgData name="Matthieu De Mari" userId="dfb708c9-d8dc-439f-9a3b-c772bf4a311c" providerId="ADAL" clId="{B062104F-1E69-4CDF-A22D-D1D6E8C24F26}" dt="2023-03-23T10:55:02.921" v="5314" actId="20577"/>
           <ac:spMkLst>
             <pc:docMk/>
             <pc:sldMk cId="2387224364" sldId="407"/>
@@ -7005,6 +6987,1824 @@
           </ac:spMkLst>
         </pc:spChg>
       </pc:sldChg>
+    </pc:docChg>
+  </pc:docChgLst>
+  <pc:docChgLst>
+    <pc:chgData name="Matthieu De Mari" userId="dfb708c9-d8dc-439f-9a3b-c772bf4a311c" providerId="ADAL" clId="{5AF9E225-0E3D-4808-B523-40F6E9A1D59D}"/>
+    <pc:docChg chg="undo custSel mod addSld delSld modSld sldOrd modMainMaster addSection modSection">
+      <pc:chgData name="Matthieu De Mari" userId="dfb708c9-d8dc-439f-9a3b-c772bf4a311c" providerId="ADAL" clId="{5AF9E225-0E3D-4808-B523-40F6E9A1D59D}" dt="2023-03-02T09:21:50.474" v="4687" actId="17846"/>
+      <pc:docMkLst>
+        <pc:docMk/>
+      </pc:docMkLst>
+      <pc:sldChg chg="modSp add del mod">
+        <pc:chgData name="Matthieu De Mari" userId="dfb708c9-d8dc-439f-9a3b-c772bf4a311c" providerId="ADAL" clId="{5AF9E225-0E3D-4808-B523-40F6E9A1D59D}" dt="2023-03-02T09:21:44.969" v="4686" actId="47"/>
+        <pc:sldMkLst>
+          <pc:docMk/>
+          <pc:sldMk cId="901767542" sldId="256"/>
+        </pc:sldMkLst>
+        <pc:spChg chg="mod">
+          <ac:chgData name="Matthieu De Mari" userId="dfb708c9-d8dc-439f-9a3b-c772bf4a311c" providerId="ADAL" clId="{5AF9E225-0E3D-4808-B523-40F6E9A1D59D}" dt="2023-03-02T06:54:38.562" v="26" actId="20577"/>
+          <ac:spMkLst>
+            <pc:docMk/>
+            <pc:sldMk cId="901767542" sldId="256"/>
+            <ac:spMk id="2" creationId="{2A670A59-7759-7B00-8247-A16BA5AC8105}"/>
+          </ac:spMkLst>
+        </pc:spChg>
+      </pc:sldChg>
+      <pc:sldChg chg="addSp delSp modSp add mod chgLayout">
+        <pc:chgData name="Matthieu De Mari" userId="dfb708c9-d8dc-439f-9a3b-c772bf4a311c" providerId="ADAL" clId="{5AF9E225-0E3D-4808-B523-40F6E9A1D59D}" dt="2023-03-02T07:05:19.188" v="526" actId="20577"/>
+        <pc:sldMkLst>
+          <pc:docMk/>
+          <pc:sldMk cId="3239548726" sldId="257"/>
+        </pc:sldMkLst>
+        <pc:spChg chg="mod ord">
+          <ac:chgData name="Matthieu De Mari" userId="dfb708c9-d8dc-439f-9a3b-c772bf4a311c" providerId="ADAL" clId="{5AF9E225-0E3D-4808-B523-40F6E9A1D59D}" dt="2023-03-02T06:57:42.999" v="278" actId="700"/>
+          <ac:spMkLst>
+            <pc:docMk/>
+            <pc:sldMk cId="3239548726" sldId="257"/>
+            <ac:spMk id="2" creationId="{B50B574F-C933-4F2A-F08D-3E476DF2C874}"/>
+          </ac:spMkLst>
+        </pc:spChg>
+        <pc:spChg chg="add del mod ord">
+          <ac:chgData name="Matthieu De Mari" userId="dfb708c9-d8dc-439f-9a3b-c772bf4a311c" providerId="ADAL" clId="{5AF9E225-0E3D-4808-B523-40F6E9A1D59D}" dt="2023-03-02T06:58:16.230" v="292" actId="478"/>
+          <ac:spMkLst>
+            <pc:docMk/>
+            <pc:sldMk cId="3239548726" sldId="257"/>
+            <ac:spMk id="3" creationId="{D2DC9FEB-9B75-AB4D-B5F1-F78585CE0DE0}"/>
+          </ac:spMkLst>
+        </pc:spChg>
+        <pc:spChg chg="mod ord">
+          <ac:chgData name="Matthieu De Mari" userId="dfb708c9-d8dc-439f-9a3b-c772bf4a311c" providerId="ADAL" clId="{5AF9E225-0E3D-4808-B523-40F6E9A1D59D}" dt="2023-03-02T07:05:19.188" v="526" actId="20577"/>
+          <ac:spMkLst>
+            <pc:docMk/>
+            <pc:sldMk cId="3239548726" sldId="257"/>
+            <ac:spMk id="4" creationId="{11B5C143-F936-00BC-44EE-7E05A29966EA}"/>
+          </ac:spMkLst>
+        </pc:spChg>
+        <pc:spChg chg="mod">
+          <ac:chgData name="Matthieu De Mari" userId="dfb708c9-d8dc-439f-9a3b-c772bf4a311c" providerId="ADAL" clId="{5AF9E225-0E3D-4808-B523-40F6E9A1D59D}" dt="2023-03-02T06:57:36.942" v="277" actId="1035"/>
+          <ac:spMkLst>
+            <pc:docMk/>
+            <pc:sldMk cId="3239548726" sldId="257"/>
+            <ac:spMk id="5" creationId="{7F5DEAE6-D202-B325-C159-0845A73F1131}"/>
+          </ac:spMkLst>
+        </pc:spChg>
+        <pc:spChg chg="mod">
+          <ac:chgData name="Matthieu De Mari" userId="dfb708c9-d8dc-439f-9a3b-c772bf4a311c" providerId="ADAL" clId="{5AF9E225-0E3D-4808-B523-40F6E9A1D59D}" dt="2023-03-02T06:57:36.942" v="277" actId="1035"/>
+          <ac:spMkLst>
+            <pc:docMk/>
+            <pc:sldMk cId="3239548726" sldId="257"/>
+            <ac:spMk id="7" creationId="{05B98F52-283E-8873-3A86-F4B6625D7C1D}"/>
+          </ac:spMkLst>
+        </pc:spChg>
+        <pc:spChg chg="mod">
+          <ac:chgData name="Matthieu De Mari" userId="dfb708c9-d8dc-439f-9a3b-c772bf4a311c" providerId="ADAL" clId="{5AF9E225-0E3D-4808-B523-40F6E9A1D59D}" dt="2023-03-02T06:57:36.942" v="277" actId="1035"/>
+          <ac:spMkLst>
+            <pc:docMk/>
+            <pc:sldMk cId="3239548726" sldId="257"/>
+            <ac:spMk id="8" creationId="{B49EF664-3365-8344-2224-91A3BF11359E}"/>
+          </ac:spMkLst>
+        </pc:spChg>
+        <pc:spChg chg="mod">
+          <ac:chgData name="Matthieu De Mari" userId="dfb708c9-d8dc-439f-9a3b-c772bf4a311c" providerId="ADAL" clId="{5AF9E225-0E3D-4808-B523-40F6E9A1D59D}" dt="2023-03-02T06:57:36.942" v="277" actId="1035"/>
+          <ac:spMkLst>
+            <pc:docMk/>
+            <pc:sldMk cId="3239548726" sldId="257"/>
+            <ac:spMk id="9" creationId="{46800871-91B7-4097-1AEE-239AAB61FD10}"/>
+          </ac:spMkLst>
+        </pc:spChg>
+        <pc:spChg chg="mod">
+          <ac:chgData name="Matthieu De Mari" userId="dfb708c9-d8dc-439f-9a3b-c772bf4a311c" providerId="ADAL" clId="{5AF9E225-0E3D-4808-B523-40F6E9A1D59D}" dt="2023-03-02T06:57:36.942" v="277" actId="1035"/>
+          <ac:spMkLst>
+            <pc:docMk/>
+            <pc:sldMk cId="3239548726" sldId="257"/>
+            <ac:spMk id="10" creationId="{D69CD5E0-172F-06FD-35CD-C47EA4676A31}"/>
+          </ac:spMkLst>
+        </pc:spChg>
+        <pc:spChg chg="add del mod">
+          <ac:chgData name="Matthieu De Mari" userId="dfb708c9-d8dc-439f-9a3b-c772bf4a311c" providerId="ADAL" clId="{5AF9E225-0E3D-4808-B523-40F6E9A1D59D}" dt="2023-03-02T06:58:13.715" v="290" actId="478"/>
+          <ac:spMkLst>
+            <pc:docMk/>
+            <pc:sldMk cId="3239548726" sldId="257"/>
+            <ac:spMk id="11" creationId="{B6DF1EB1-6668-ABCF-B896-D3812A5087F3}"/>
+          </ac:spMkLst>
+        </pc:spChg>
+      </pc:sldChg>
+      <pc:sldChg chg="modSp add mod">
+        <pc:chgData name="Matthieu De Mari" userId="dfb708c9-d8dc-439f-9a3b-c772bf4a311c" providerId="ADAL" clId="{5AF9E225-0E3D-4808-B523-40F6E9A1D59D}" dt="2023-03-02T07:01:55.363" v="524" actId="20577"/>
+        <pc:sldMkLst>
+          <pc:docMk/>
+          <pc:sldMk cId="1495819743" sldId="258"/>
+        </pc:sldMkLst>
+        <pc:spChg chg="mod">
+          <ac:chgData name="Matthieu De Mari" userId="dfb708c9-d8dc-439f-9a3b-c772bf4a311c" providerId="ADAL" clId="{5AF9E225-0E3D-4808-B523-40F6E9A1D59D}" dt="2023-03-02T07:01:55.363" v="524" actId="20577"/>
+          <ac:spMkLst>
+            <pc:docMk/>
+            <pc:sldMk cId="1495819743" sldId="258"/>
+            <ac:spMk id="3" creationId="{F23BB8E2-2C5A-6D2B-E7FF-F55104DECF62}"/>
+          </ac:spMkLst>
+        </pc:spChg>
+      </pc:sldChg>
+      <pc:sldChg chg="addSp modSp add mod modClrScheme chgLayout">
+        <pc:chgData name="Matthieu De Mari" userId="dfb708c9-d8dc-439f-9a3b-c772bf4a311c" providerId="ADAL" clId="{5AF9E225-0E3D-4808-B523-40F6E9A1D59D}" dt="2023-03-02T07:07:22.195" v="628" actId="20577"/>
+        <pc:sldMkLst>
+          <pc:docMk/>
+          <pc:sldMk cId="609186567" sldId="259"/>
+        </pc:sldMkLst>
+        <pc:spChg chg="mod ord">
+          <ac:chgData name="Matthieu De Mari" userId="dfb708c9-d8dc-439f-9a3b-c772bf4a311c" providerId="ADAL" clId="{5AF9E225-0E3D-4808-B523-40F6E9A1D59D}" dt="2023-03-02T07:07:02.911" v="616" actId="700"/>
+          <ac:spMkLst>
+            <pc:docMk/>
+            <pc:sldMk cId="609186567" sldId="259"/>
+            <ac:spMk id="2" creationId="{28DE36AE-A7BD-B2D6-D7DE-EBE0834C1A93}"/>
+          </ac:spMkLst>
+        </pc:spChg>
+        <pc:spChg chg="mod ord">
+          <ac:chgData name="Matthieu De Mari" userId="dfb708c9-d8dc-439f-9a3b-c772bf4a311c" providerId="ADAL" clId="{5AF9E225-0E3D-4808-B523-40F6E9A1D59D}" dt="2023-03-02T07:07:22.195" v="628" actId="20577"/>
+          <ac:spMkLst>
+            <pc:docMk/>
+            <pc:sldMk cId="609186567" sldId="259"/>
+            <ac:spMk id="3" creationId="{B20362F6-0A45-1821-AD14-0E3C760A995E}"/>
+          </ac:spMkLst>
+        </pc:spChg>
+        <pc:spChg chg="add mod ord">
+          <ac:chgData name="Matthieu De Mari" userId="dfb708c9-d8dc-439f-9a3b-c772bf4a311c" providerId="ADAL" clId="{5AF9E225-0E3D-4808-B523-40F6E9A1D59D}" dt="2023-03-02T07:07:18.146" v="627" actId="20577"/>
+          <ac:spMkLst>
+            <pc:docMk/>
+            <pc:sldMk cId="609186567" sldId="259"/>
+            <ac:spMk id="4" creationId="{353D99B7-5312-BFF8-1D5D-BEF7B953B9D9}"/>
+          </ac:spMkLst>
+        </pc:spChg>
+      </pc:sldChg>
+      <pc:sldChg chg="modSp add mod">
+        <pc:chgData name="Matthieu De Mari" userId="dfb708c9-d8dc-439f-9a3b-c772bf4a311c" providerId="ADAL" clId="{5AF9E225-0E3D-4808-B523-40F6E9A1D59D}" dt="2023-03-02T07:05:58.205" v="582" actId="20577"/>
+        <pc:sldMkLst>
+          <pc:docMk/>
+          <pc:sldMk cId="1812694891" sldId="260"/>
+        </pc:sldMkLst>
+        <pc:spChg chg="mod">
+          <ac:chgData name="Matthieu De Mari" userId="dfb708c9-d8dc-439f-9a3b-c772bf4a311c" providerId="ADAL" clId="{5AF9E225-0E3D-4808-B523-40F6E9A1D59D}" dt="2023-03-02T07:05:58.205" v="582" actId="20577"/>
+          <ac:spMkLst>
+            <pc:docMk/>
+            <pc:sldMk cId="1812694891" sldId="260"/>
+            <ac:spMk id="4" creationId="{11B5C143-F936-00BC-44EE-7E05A29966EA}"/>
+          </ac:spMkLst>
+        </pc:spChg>
+      </pc:sldChg>
+      <pc:sldChg chg="modSp add mod">
+        <pc:chgData name="Matthieu De Mari" userId="dfb708c9-d8dc-439f-9a3b-c772bf4a311c" providerId="ADAL" clId="{5AF9E225-0E3D-4808-B523-40F6E9A1D59D}" dt="2023-03-02T07:08:41.284" v="667" actId="20577"/>
+        <pc:sldMkLst>
+          <pc:docMk/>
+          <pc:sldMk cId="2172647381" sldId="261"/>
+        </pc:sldMkLst>
+        <pc:spChg chg="mod">
+          <ac:chgData name="Matthieu De Mari" userId="dfb708c9-d8dc-439f-9a3b-c772bf4a311c" providerId="ADAL" clId="{5AF9E225-0E3D-4808-B523-40F6E9A1D59D}" dt="2023-03-02T07:08:41.284" v="667" actId="20577"/>
+          <ac:spMkLst>
+            <pc:docMk/>
+            <pc:sldMk cId="2172647381" sldId="261"/>
+            <ac:spMk id="3" creationId="{097D872E-3486-FBAD-9B1E-6412E4F0FB9B}"/>
+          </ac:spMkLst>
+        </pc:spChg>
+      </pc:sldChg>
+      <pc:sldChg chg="modSp add mod">
+        <pc:chgData name="Matthieu De Mari" userId="dfb708c9-d8dc-439f-9a3b-c772bf4a311c" providerId="ADAL" clId="{5AF9E225-0E3D-4808-B523-40F6E9A1D59D}" dt="2023-03-02T07:09:13.009" v="690" actId="20577"/>
+        <pc:sldMkLst>
+          <pc:docMk/>
+          <pc:sldMk cId="3166947328" sldId="262"/>
+        </pc:sldMkLst>
+        <pc:spChg chg="mod">
+          <ac:chgData name="Matthieu De Mari" userId="dfb708c9-d8dc-439f-9a3b-c772bf4a311c" providerId="ADAL" clId="{5AF9E225-0E3D-4808-B523-40F6E9A1D59D}" dt="2023-03-02T07:09:13.009" v="690" actId="20577"/>
+          <ac:spMkLst>
+            <pc:docMk/>
+            <pc:sldMk cId="3166947328" sldId="262"/>
+            <ac:spMk id="3" creationId="{A61FAA42-106F-39F5-DD78-BB04653C3A81}"/>
+          </ac:spMkLst>
+        </pc:spChg>
+      </pc:sldChg>
+      <pc:sldChg chg="modSp add mod">
+        <pc:chgData name="Matthieu De Mari" userId="dfb708c9-d8dc-439f-9a3b-c772bf4a311c" providerId="ADAL" clId="{5AF9E225-0E3D-4808-B523-40F6E9A1D59D}" dt="2023-03-02T07:09:44.442" v="694" actId="20577"/>
+        <pc:sldMkLst>
+          <pc:docMk/>
+          <pc:sldMk cId="2723458640" sldId="263"/>
+        </pc:sldMkLst>
+        <pc:spChg chg="mod">
+          <ac:chgData name="Matthieu De Mari" userId="dfb708c9-d8dc-439f-9a3b-c772bf4a311c" providerId="ADAL" clId="{5AF9E225-0E3D-4808-B523-40F6E9A1D59D}" dt="2023-03-02T07:09:44.442" v="694" actId="20577"/>
+          <ac:spMkLst>
+            <pc:docMk/>
+            <pc:sldMk cId="2723458640" sldId="263"/>
+            <ac:spMk id="3" creationId="{C085ED28-5440-9734-066D-069B39F29AEB}"/>
+          </ac:spMkLst>
+        </pc:spChg>
+      </pc:sldChg>
+      <pc:sldChg chg="add">
+        <pc:chgData name="Matthieu De Mari" userId="dfb708c9-d8dc-439f-9a3b-c772bf4a311c" providerId="ADAL" clId="{5AF9E225-0E3D-4808-B523-40F6E9A1D59D}" dt="2023-03-02T06:54:29.623" v="2"/>
+        <pc:sldMkLst>
+          <pc:docMk/>
+          <pc:sldMk cId="649892368" sldId="264"/>
+        </pc:sldMkLst>
+      </pc:sldChg>
+      <pc:sldChg chg="add">
+        <pc:chgData name="Matthieu De Mari" userId="dfb708c9-d8dc-439f-9a3b-c772bf4a311c" providerId="ADAL" clId="{5AF9E225-0E3D-4808-B523-40F6E9A1D59D}" dt="2023-03-02T06:54:29.623" v="2"/>
+        <pc:sldMkLst>
+          <pc:docMk/>
+          <pc:sldMk cId="4127898596" sldId="265"/>
+        </pc:sldMkLst>
+      </pc:sldChg>
+      <pc:sldChg chg="addSp delSp modSp add mod modClrScheme chgLayout">
+        <pc:chgData name="Matthieu De Mari" userId="dfb708c9-d8dc-439f-9a3b-c772bf4a311c" providerId="ADAL" clId="{5AF9E225-0E3D-4808-B523-40F6E9A1D59D}" dt="2023-03-02T08:47:11.979" v="3217" actId="20577"/>
+        <pc:sldMkLst>
+          <pc:docMk/>
+          <pc:sldMk cId="256269341" sldId="266"/>
+        </pc:sldMkLst>
+        <pc:spChg chg="mod ord">
+          <ac:chgData name="Matthieu De Mari" userId="dfb708c9-d8dc-439f-9a3b-c772bf4a311c" providerId="ADAL" clId="{5AF9E225-0E3D-4808-B523-40F6E9A1D59D}" dt="2023-03-02T07:16:25.110" v="867" actId="700"/>
+          <ac:spMkLst>
+            <pc:docMk/>
+            <pc:sldMk cId="256269341" sldId="266"/>
+            <ac:spMk id="2" creationId="{D83D78A6-5213-F5DF-FAC1-B6D18B0BB4F5}"/>
+          </ac:spMkLst>
+        </pc:spChg>
+        <pc:spChg chg="del mod">
+          <ac:chgData name="Matthieu De Mari" userId="dfb708c9-d8dc-439f-9a3b-c772bf4a311c" providerId="ADAL" clId="{5AF9E225-0E3D-4808-B523-40F6E9A1D59D}" dt="2023-03-02T07:16:11.714" v="855" actId="478"/>
+          <ac:spMkLst>
+            <pc:docMk/>
+            <pc:sldMk cId="256269341" sldId="266"/>
+            <ac:spMk id="4" creationId="{9BFCB341-9C36-5FBD-32A6-099F6A5E5940}"/>
+          </ac:spMkLst>
+        </pc:spChg>
+        <pc:spChg chg="add mod ord">
+          <ac:chgData name="Matthieu De Mari" userId="dfb708c9-d8dc-439f-9a3b-c772bf4a311c" providerId="ADAL" clId="{5AF9E225-0E3D-4808-B523-40F6E9A1D59D}" dt="2023-03-02T08:47:11.979" v="3217" actId="20577"/>
+          <ac:spMkLst>
+            <pc:docMk/>
+            <pc:sldMk cId="256269341" sldId="266"/>
+            <ac:spMk id="5" creationId="{6649BB52-89C3-E6CD-F1B2-2D67B477189C}"/>
+          </ac:spMkLst>
+        </pc:spChg>
+        <pc:spChg chg="add mod ord">
+          <ac:chgData name="Matthieu De Mari" userId="dfb708c9-d8dc-439f-9a3b-c772bf4a311c" providerId="ADAL" clId="{5AF9E225-0E3D-4808-B523-40F6E9A1D59D}" dt="2023-03-02T07:21:24.421" v="1179" actId="20577"/>
+          <ac:spMkLst>
+            <pc:docMk/>
+            <pc:sldMk cId="256269341" sldId="266"/>
+            <ac:spMk id="6" creationId="{FDD2EC50-CDA1-1B6E-AE8B-50784F3D4430}"/>
+          </ac:spMkLst>
+        </pc:spChg>
+        <pc:spChg chg="add mod ord">
+          <ac:chgData name="Matthieu De Mari" userId="dfb708c9-d8dc-439f-9a3b-c772bf4a311c" providerId="ADAL" clId="{5AF9E225-0E3D-4808-B523-40F6E9A1D59D}" dt="2023-03-02T07:17:52.154" v="984" actId="1035"/>
+          <ac:spMkLst>
+            <pc:docMk/>
+            <pc:sldMk cId="256269341" sldId="266"/>
+            <ac:spMk id="7" creationId="{CE64D9DC-283B-4657-7206-690C8044C929}"/>
+          </ac:spMkLst>
+        </pc:spChg>
+        <pc:spChg chg="add mod ord">
+          <ac:chgData name="Matthieu De Mari" userId="dfb708c9-d8dc-439f-9a3b-c772bf4a311c" providerId="ADAL" clId="{5AF9E225-0E3D-4808-B523-40F6E9A1D59D}" dt="2023-03-02T07:17:52.154" v="984" actId="1035"/>
+          <ac:spMkLst>
+            <pc:docMk/>
+            <pc:sldMk cId="256269341" sldId="266"/>
+            <ac:spMk id="8" creationId="{8D7715D0-7C6F-FE4B-319D-81CC8F353AF3}"/>
+          </ac:spMkLst>
+        </pc:spChg>
+        <pc:graphicFrameChg chg="del">
+          <ac:chgData name="Matthieu De Mari" userId="dfb708c9-d8dc-439f-9a3b-c772bf4a311c" providerId="ADAL" clId="{5AF9E225-0E3D-4808-B523-40F6E9A1D59D}" dt="2023-03-02T07:16:09.629" v="854" actId="478"/>
+          <ac:graphicFrameMkLst>
+            <pc:docMk/>
+            <pc:sldMk cId="256269341" sldId="266"/>
+            <ac:graphicFrameMk id="3" creationId="{F7ED8123-9CA8-E8C5-65C0-70940FFAF010}"/>
+          </ac:graphicFrameMkLst>
+        </pc:graphicFrameChg>
+      </pc:sldChg>
+      <pc:sldChg chg="modSp add mod">
+        <pc:chgData name="Matthieu De Mari" userId="dfb708c9-d8dc-439f-9a3b-c772bf4a311c" providerId="ADAL" clId="{5AF9E225-0E3D-4808-B523-40F6E9A1D59D}" dt="2023-03-02T07:01:21.208" v="484" actId="115"/>
+        <pc:sldMkLst>
+          <pc:docMk/>
+          <pc:sldMk cId="2566504203" sldId="267"/>
+        </pc:sldMkLst>
+        <pc:spChg chg="mod">
+          <ac:chgData name="Matthieu De Mari" userId="dfb708c9-d8dc-439f-9a3b-c772bf4a311c" providerId="ADAL" clId="{5AF9E225-0E3D-4808-B523-40F6E9A1D59D}" dt="2023-03-02T07:01:21.208" v="484" actId="115"/>
+          <ac:spMkLst>
+            <pc:docMk/>
+            <pc:sldMk cId="2566504203" sldId="267"/>
+            <ac:spMk id="4" creationId="{AAD607B1-0264-F96B-5344-F51B4AD661EC}"/>
+          </ac:spMkLst>
+        </pc:spChg>
+      </pc:sldChg>
+      <pc:sldChg chg="addSp delSp modSp add mod chgLayout">
+        <pc:chgData name="Matthieu De Mari" userId="dfb708c9-d8dc-439f-9a3b-c772bf4a311c" providerId="ADAL" clId="{5AF9E225-0E3D-4808-B523-40F6E9A1D59D}" dt="2023-03-02T07:00:12.794" v="471" actId="115"/>
+        <pc:sldMkLst>
+          <pc:docMk/>
+          <pc:sldMk cId="1205920737" sldId="268"/>
+        </pc:sldMkLst>
+        <pc:spChg chg="mod ord">
+          <ac:chgData name="Matthieu De Mari" userId="dfb708c9-d8dc-439f-9a3b-c772bf4a311c" providerId="ADAL" clId="{5AF9E225-0E3D-4808-B523-40F6E9A1D59D}" dt="2023-03-02T06:58:21.739" v="294" actId="700"/>
+          <ac:spMkLst>
+            <pc:docMk/>
+            <pc:sldMk cId="1205920737" sldId="268"/>
+            <ac:spMk id="2" creationId="{B50B574F-C933-4F2A-F08D-3E476DF2C874}"/>
+          </ac:spMkLst>
+        </pc:spChg>
+        <pc:spChg chg="add mod ord">
+          <ac:chgData name="Matthieu De Mari" userId="dfb708c9-d8dc-439f-9a3b-c772bf4a311c" providerId="ADAL" clId="{5AF9E225-0E3D-4808-B523-40F6E9A1D59D}" dt="2023-03-02T06:59:48.417" v="468" actId="113"/>
+          <ac:spMkLst>
+            <pc:docMk/>
+            <pc:sldMk cId="1205920737" sldId="268"/>
+            <ac:spMk id="3" creationId="{D09C5ECE-F6D7-98F1-D7D9-BD7455F1F759}"/>
+          </ac:spMkLst>
+        </pc:spChg>
+        <pc:spChg chg="mod ord">
+          <ac:chgData name="Matthieu De Mari" userId="dfb708c9-d8dc-439f-9a3b-c772bf4a311c" providerId="ADAL" clId="{5AF9E225-0E3D-4808-B523-40F6E9A1D59D}" dt="2023-03-02T07:00:12.794" v="471" actId="115"/>
+          <ac:spMkLst>
+            <pc:docMk/>
+            <pc:sldMk cId="1205920737" sldId="268"/>
+            <ac:spMk id="4" creationId="{11B5C143-F936-00BC-44EE-7E05A29966EA}"/>
+          </ac:spMkLst>
+        </pc:spChg>
+        <pc:spChg chg="del">
+          <ac:chgData name="Matthieu De Mari" userId="dfb708c9-d8dc-439f-9a3b-c772bf4a311c" providerId="ADAL" clId="{5AF9E225-0E3D-4808-B523-40F6E9A1D59D}" dt="2023-03-02T06:58:24.807" v="297" actId="478"/>
+          <ac:spMkLst>
+            <pc:docMk/>
+            <pc:sldMk cId="1205920737" sldId="268"/>
+            <ac:spMk id="5" creationId="{7F5DEAE6-D202-B325-C159-0845A73F1131}"/>
+          </ac:spMkLst>
+        </pc:spChg>
+        <pc:spChg chg="del">
+          <ac:chgData name="Matthieu De Mari" userId="dfb708c9-d8dc-439f-9a3b-c772bf4a311c" providerId="ADAL" clId="{5AF9E225-0E3D-4808-B523-40F6E9A1D59D}" dt="2023-03-02T06:58:24.807" v="297" actId="478"/>
+          <ac:spMkLst>
+            <pc:docMk/>
+            <pc:sldMk cId="1205920737" sldId="268"/>
+            <ac:spMk id="7" creationId="{05B98F52-283E-8873-3A86-F4B6625D7C1D}"/>
+          </ac:spMkLst>
+        </pc:spChg>
+        <pc:spChg chg="del">
+          <ac:chgData name="Matthieu De Mari" userId="dfb708c9-d8dc-439f-9a3b-c772bf4a311c" providerId="ADAL" clId="{5AF9E225-0E3D-4808-B523-40F6E9A1D59D}" dt="2023-03-02T06:58:24.807" v="297" actId="478"/>
+          <ac:spMkLst>
+            <pc:docMk/>
+            <pc:sldMk cId="1205920737" sldId="268"/>
+            <ac:spMk id="8" creationId="{B49EF664-3365-8344-2224-91A3BF11359E}"/>
+          </ac:spMkLst>
+        </pc:spChg>
+        <pc:spChg chg="del">
+          <ac:chgData name="Matthieu De Mari" userId="dfb708c9-d8dc-439f-9a3b-c772bf4a311c" providerId="ADAL" clId="{5AF9E225-0E3D-4808-B523-40F6E9A1D59D}" dt="2023-03-02T06:58:24.807" v="297" actId="478"/>
+          <ac:spMkLst>
+            <pc:docMk/>
+            <pc:sldMk cId="1205920737" sldId="268"/>
+            <ac:spMk id="9" creationId="{46800871-91B7-4097-1AEE-239AAB61FD10}"/>
+          </ac:spMkLst>
+        </pc:spChg>
+        <pc:spChg chg="del">
+          <ac:chgData name="Matthieu De Mari" userId="dfb708c9-d8dc-439f-9a3b-c772bf4a311c" providerId="ADAL" clId="{5AF9E225-0E3D-4808-B523-40F6E9A1D59D}" dt="2023-03-02T06:58:24.807" v="297" actId="478"/>
+          <ac:spMkLst>
+            <pc:docMk/>
+            <pc:sldMk cId="1205920737" sldId="268"/>
+            <ac:spMk id="10" creationId="{D69CD5E0-172F-06FD-35CD-C47EA4676A31}"/>
+          </ac:spMkLst>
+        </pc:spChg>
+      </pc:sldChg>
+      <pc:sldChg chg="delSp modSp add mod modClrScheme chgLayout">
+        <pc:chgData name="Matthieu De Mari" userId="dfb708c9-d8dc-439f-9a3b-c772bf4a311c" providerId="ADAL" clId="{5AF9E225-0E3D-4808-B523-40F6E9A1D59D}" dt="2023-03-02T07:13:38.493" v="793" actId="114"/>
+        <pc:sldMkLst>
+          <pc:docMk/>
+          <pc:sldMk cId="4188287311" sldId="269"/>
+        </pc:sldMkLst>
+        <pc:spChg chg="mod ord">
+          <ac:chgData name="Matthieu De Mari" userId="dfb708c9-d8dc-439f-9a3b-c772bf4a311c" providerId="ADAL" clId="{5AF9E225-0E3D-4808-B523-40F6E9A1D59D}" dt="2023-03-02T07:12:03.175" v="700" actId="700"/>
+          <ac:spMkLst>
+            <pc:docMk/>
+            <pc:sldMk cId="4188287311" sldId="269"/>
+            <ac:spMk id="2" creationId="{4C82E11B-DFFC-C58E-D85D-43F29962418C}"/>
+          </ac:spMkLst>
+        </pc:spChg>
+        <pc:spChg chg="mod ord">
+          <ac:chgData name="Matthieu De Mari" userId="dfb708c9-d8dc-439f-9a3b-c772bf4a311c" providerId="ADAL" clId="{5AF9E225-0E3D-4808-B523-40F6E9A1D59D}" dt="2023-03-02T07:13:38.493" v="793" actId="114"/>
+          <ac:spMkLst>
+            <pc:docMk/>
+            <pc:sldMk cId="4188287311" sldId="269"/>
+            <ac:spMk id="4" creationId="{AAD607B1-0264-F96B-5344-F51B4AD661EC}"/>
+          </ac:spMkLst>
+        </pc:spChg>
+        <pc:spChg chg="del">
+          <ac:chgData name="Matthieu De Mari" userId="dfb708c9-d8dc-439f-9a3b-c772bf4a311c" providerId="ADAL" clId="{5AF9E225-0E3D-4808-B523-40F6E9A1D59D}" dt="2023-03-02T07:12:08.307" v="702" actId="478"/>
+          <ac:spMkLst>
+            <pc:docMk/>
+            <pc:sldMk cId="4188287311" sldId="269"/>
+            <ac:spMk id="6" creationId="{74BA015B-2BA6-D38E-6EF5-512EDEABFC5E}"/>
+          </ac:spMkLst>
+        </pc:spChg>
+        <pc:spChg chg="del">
+          <ac:chgData name="Matthieu De Mari" userId="dfb708c9-d8dc-439f-9a3b-c772bf4a311c" providerId="ADAL" clId="{5AF9E225-0E3D-4808-B523-40F6E9A1D59D}" dt="2023-03-02T07:12:08.307" v="702" actId="478"/>
+          <ac:spMkLst>
+            <pc:docMk/>
+            <pc:sldMk cId="4188287311" sldId="269"/>
+            <ac:spMk id="7" creationId="{1D88D58E-B29B-60D4-269B-69C46DA2E57F}"/>
+          </ac:spMkLst>
+        </pc:spChg>
+        <pc:spChg chg="del">
+          <ac:chgData name="Matthieu De Mari" userId="dfb708c9-d8dc-439f-9a3b-c772bf4a311c" providerId="ADAL" clId="{5AF9E225-0E3D-4808-B523-40F6E9A1D59D}" dt="2023-03-02T07:12:08.307" v="702" actId="478"/>
+          <ac:spMkLst>
+            <pc:docMk/>
+            <pc:sldMk cId="4188287311" sldId="269"/>
+            <ac:spMk id="8" creationId="{690F1F1E-F5F4-43D4-D4AE-A1566EEC4481}"/>
+          </ac:spMkLst>
+        </pc:spChg>
+        <pc:spChg chg="del">
+          <ac:chgData name="Matthieu De Mari" userId="dfb708c9-d8dc-439f-9a3b-c772bf4a311c" providerId="ADAL" clId="{5AF9E225-0E3D-4808-B523-40F6E9A1D59D}" dt="2023-03-02T07:12:08.307" v="702" actId="478"/>
+          <ac:spMkLst>
+            <pc:docMk/>
+            <pc:sldMk cId="4188287311" sldId="269"/>
+            <ac:spMk id="10" creationId="{7A8B5180-F7BF-4E44-A517-D1FA6FDC2BDD}"/>
+          </ac:spMkLst>
+        </pc:spChg>
+        <pc:spChg chg="del">
+          <ac:chgData name="Matthieu De Mari" userId="dfb708c9-d8dc-439f-9a3b-c772bf4a311c" providerId="ADAL" clId="{5AF9E225-0E3D-4808-B523-40F6E9A1D59D}" dt="2023-03-02T07:12:08.307" v="702" actId="478"/>
+          <ac:spMkLst>
+            <pc:docMk/>
+            <pc:sldMk cId="4188287311" sldId="269"/>
+            <ac:spMk id="11" creationId="{56167DA6-6D54-C592-1B14-073D45E80E56}"/>
+          </ac:spMkLst>
+        </pc:spChg>
+        <pc:spChg chg="del">
+          <ac:chgData name="Matthieu De Mari" userId="dfb708c9-d8dc-439f-9a3b-c772bf4a311c" providerId="ADAL" clId="{5AF9E225-0E3D-4808-B523-40F6E9A1D59D}" dt="2023-03-02T07:12:08.307" v="702" actId="478"/>
+          <ac:spMkLst>
+            <pc:docMk/>
+            <pc:sldMk cId="4188287311" sldId="269"/>
+            <ac:spMk id="12" creationId="{79BD6F7A-8253-7AB5-41BC-724970D5C542}"/>
+          </ac:spMkLst>
+        </pc:spChg>
+        <pc:spChg chg="del">
+          <ac:chgData name="Matthieu De Mari" userId="dfb708c9-d8dc-439f-9a3b-c772bf4a311c" providerId="ADAL" clId="{5AF9E225-0E3D-4808-B523-40F6E9A1D59D}" dt="2023-03-02T07:12:08.307" v="702" actId="478"/>
+          <ac:spMkLst>
+            <pc:docMk/>
+            <pc:sldMk cId="4188287311" sldId="269"/>
+            <ac:spMk id="13" creationId="{7DD25C2B-16C3-B5FF-6184-818C0572FD6A}"/>
+          </ac:spMkLst>
+        </pc:spChg>
+        <pc:spChg chg="del">
+          <ac:chgData name="Matthieu De Mari" userId="dfb708c9-d8dc-439f-9a3b-c772bf4a311c" providerId="ADAL" clId="{5AF9E225-0E3D-4808-B523-40F6E9A1D59D}" dt="2023-03-02T07:12:08.307" v="702" actId="478"/>
+          <ac:spMkLst>
+            <pc:docMk/>
+            <pc:sldMk cId="4188287311" sldId="269"/>
+            <ac:spMk id="14" creationId="{9A5504DC-1A8A-6D7C-11CC-4EB02613A364}"/>
+          </ac:spMkLst>
+        </pc:spChg>
+        <pc:spChg chg="del">
+          <ac:chgData name="Matthieu De Mari" userId="dfb708c9-d8dc-439f-9a3b-c772bf4a311c" providerId="ADAL" clId="{5AF9E225-0E3D-4808-B523-40F6E9A1D59D}" dt="2023-03-02T07:12:08.307" v="702" actId="478"/>
+          <ac:spMkLst>
+            <pc:docMk/>
+            <pc:sldMk cId="4188287311" sldId="269"/>
+            <ac:spMk id="15" creationId="{1F3398C0-72E8-4ED9-A8A5-E15959805EEB}"/>
+          </ac:spMkLst>
+        </pc:spChg>
+      </pc:sldChg>
+      <pc:sldChg chg="modSp add mod">
+        <pc:chgData name="Matthieu De Mari" userId="dfb708c9-d8dc-439f-9a3b-c772bf4a311c" providerId="ADAL" clId="{5AF9E225-0E3D-4808-B523-40F6E9A1D59D}" dt="2023-03-02T07:25:33.827" v="1288" actId="1076"/>
+        <pc:sldMkLst>
+          <pc:docMk/>
+          <pc:sldMk cId="997896339" sldId="270"/>
+        </pc:sldMkLst>
+        <pc:spChg chg="mod">
+          <ac:chgData name="Matthieu De Mari" userId="dfb708c9-d8dc-439f-9a3b-c772bf4a311c" providerId="ADAL" clId="{5AF9E225-0E3D-4808-B523-40F6E9A1D59D}" dt="2023-03-02T07:15:53.623" v="810" actId="20577"/>
+          <ac:spMkLst>
+            <pc:docMk/>
+            <pc:sldMk cId="997896339" sldId="270"/>
+            <ac:spMk id="2" creationId="{D83D78A6-5213-F5DF-FAC1-B6D18B0BB4F5}"/>
+          </ac:spMkLst>
+        </pc:spChg>
+        <pc:spChg chg="mod">
+          <ac:chgData name="Matthieu De Mari" userId="dfb708c9-d8dc-439f-9a3b-c772bf4a311c" providerId="ADAL" clId="{5AF9E225-0E3D-4808-B523-40F6E9A1D59D}" dt="2023-03-02T07:25:33.827" v="1288" actId="1076"/>
+          <ac:spMkLst>
+            <pc:docMk/>
+            <pc:sldMk cId="997896339" sldId="270"/>
+            <ac:spMk id="4" creationId="{9BFCB341-9C36-5FBD-32A6-099F6A5E5940}"/>
+          </ac:spMkLst>
+        </pc:spChg>
+        <pc:graphicFrameChg chg="mod modGraphic">
+          <ac:chgData name="Matthieu De Mari" userId="dfb708c9-d8dc-439f-9a3b-c772bf4a311c" providerId="ADAL" clId="{5AF9E225-0E3D-4808-B523-40F6E9A1D59D}" dt="2023-03-02T07:25:09.419" v="1282" actId="14100"/>
+          <ac:graphicFrameMkLst>
+            <pc:docMk/>
+            <pc:sldMk cId="997896339" sldId="270"/>
+            <ac:graphicFrameMk id="3" creationId="{F7ED8123-9CA8-E8C5-65C0-70940FFAF010}"/>
+          </ac:graphicFrameMkLst>
+        </pc:graphicFrameChg>
+      </pc:sldChg>
+      <pc:sldChg chg="modSp add mod">
+        <pc:chgData name="Matthieu De Mari" userId="dfb708c9-d8dc-439f-9a3b-c772bf4a311c" providerId="ADAL" clId="{5AF9E225-0E3D-4808-B523-40F6E9A1D59D}" dt="2023-03-02T07:23:39.008" v="1244" actId="113"/>
+        <pc:sldMkLst>
+          <pc:docMk/>
+          <pc:sldMk cId="961845771" sldId="271"/>
+        </pc:sldMkLst>
+        <pc:spChg chg="mod">
+          <ac:chgData name="Matthieu De Mari" userId="dfb708c9-d8dc-439f-9a3b-c772bf4a311c" providerId="ADAL" clId="{5AF9E225-0E3D-4808-B523-40F6E9A1D59D}" dt="2023-03-02T07:21:38.014" v="1192" actId="20577"/>
+          <ac:spMkLst>
+            <pc:docMk/>
+            <pc:sldMk cId="961845771" sldId="271"/>
+            <ac:spMk id="2" creationId="{D83D78A6-5213-F5DF-FAC1-B6D18B0BB4F5}"/>
+          </ac:spMkLst>
+        </pc:spChg>
+        <pc:spChg chg="mod">
+          <ac:chgData name="Matthieu De Mari" userId="dfb708c9-d8dc-439f-9a3b-c772bf4a311c" providerId="ADAL" clId="{5AF9E225-0E3D-4808-B523-40F6E9A1D59D}" dt="2023-03-02T07:22:53.792" v="1234" actId="20577"/>
+          <ac:spMkLst>
+            <pc:docMk/>
+            <pc:sldMk cId="961845771" sldId="271"/>
+            <ac:spMk id="5" creationId="{6649BB52-89C3-E6CD-F1B2-2D67B477189C}"/>
+          </ac:spMkLst>
+        </pc:spChg>
+        <pc:spChg chg="mod">
+          <ac:chgData name="Matthieu De Mari" userId="dfb708c9-d8dc-439f-9a3b-c772bf4a311c" providerId="ADAL" clId="{5AF9E225-0E3D-4808-B523-40F6E9A1D59D}" dt="2023-03-02T07:23:39.008" v="1244" actId="113"/>
+          <ac:spMkLst>
+            <pc:docMk/>
+            <pc:sldMk cId="961845771" sldId="271"/>
+            <ac:spMk id="6" creationId="{FDD2EC50-CDA1-1B6E-AE8B-50784F3D4430}"/>
+          </ac:spMkLst>
+        </pc:spChg>
+        <pc:spChg chg="mod">
+          <ac:chgData name="Matthieu De Mari" userId="dfb708c9-d8dc-439f-9a3b-c772bf4a311c" providerId="ADAL" clId="{5AF9E225-0E3D-4808-B523-40F6E9A1D59D}" dt="2023-03-02T07:21:41.708" v="1204" actId="20577"/>
+          <ac:spMkLst>
+            <pc:docMk/>
+            <pc:sldMk cId="961845771" sldId="271"/>
+            <ac:spMk id="7" creationId="{CE64D9DC-283B-4657-7206-690C8044C929}"/>
+          </ac:spMkLst>
+        </pc:spChg>
+        <pc:spChg chg="mod">
+          <ac:chgData name="Matthieu De Mari" userId="dfb708c9-d8dc-439f-9a3b-c772bf4a311c" providerId="ADAL" clId="{5AF9E225-0E3D-4808-B523-40F6E9A1D59D}" dt="2023-03-02T07:21:45.407" v="1205"/>
+          <ac:spMkLst>
+            <pc:docMk/>
+            <pc:sldMk cId="961845771" sldId="271"/>
+            <ac:spMk id="8" creationId="{8D7715D0-7C6F-FE4B-319D-81CC8F353AF3}"/>
+          </ac:spMkLst>
+        </pc:spChg>
+      </pc:sldChg>
+      <pc:sldChg chg="addSp delSp modSp new mod ord modClrScheme chgLayout">
+        <pc:chgData name="Matthieu De Mari" userId="dfb708c9-d8dc-439f-9a3b-c772bf4a311c" providerId="ADAL" clId="{5AF9E225-0E3D-4808-B523-40F6E9A1D59D}" dt="2023-03-02T07:31:21.011" v="1491" actId="20577"/>
+        <pc:sldMkLst>
+          <pc:docMk/>
+          <pc:sldMk cId="1628130454" sldId="272"/>
+        </pc:sldMkLst>
+        <pc:spChg chg="mod ord">
+          <ac:chgData name="Matthieu De Mari" userId="dfb708c9-d8dc-439f-9a3b-c772bf4a311c" providerId="ADAL" clId="{5AF9E225-0E3D-4808-B523-40F6E9A1D59D}" dt="2023-03-02T07:27:42.339" v="1322" actId="700"/>
+          <ac:spMkLst>
+            <pc:docMk/>
+            <pc:sldMk cId="1628130454" sldId="272"/>
+            <ac:spMk id="2" creationId="{A5B0BCE0-A549-1A7B-6F4B-B0C1C98DE2A1}"/>
+          </ac:spMkLst>
+        </pc:spChg>
+        <pc:spChg chg="mod ord">
+          <ac:chgData name="Matthieu De Mari" userId="dfb708c9-d8dc-439f-9a3b-c772bf4a311c" providerId="ADAL" clId="{5AF9E225-0E3D-4808-B523-40F6E9A1D59D}" dt="2023-03-02T07:31:21.011" v="1491" actId="20577"/>
+          <ac:spMkLst>
+            <pc:docMk/>
+            <pc:sldMk cId="1628130454" sldId="272"/>
+            <ac:spMk id="3" creationId="{047FD354-275A-C734-E17F-FED0638E05F9}"/>
+          </ac:spMkLst>
+        </pc:spChg>
+        <pc:spChg chg="add del mod ord">
+          <ac:chgData name="Matthieu De Mari" userId="dfb708c9-d8dc-439f-9a3b-c772bf4a311c" providerId="ADAL" clId="{5AF9E225-0E3D-4808-B523-40F6E9A1D59D}" dt="2023-03-02T07:28:28.867" v="1352" actId="478"/>
+          <ac:spMkLst>
+            <pc:docMk/>
+            <pc:sldMk cId="1628130454" sldId="272"/>
+            <ac:spMk id="4" creationId="{9F1CFCE2-90FF-701C-0226-3759FF2D030B}"/>
+          </ac:spMkLst>
+        </pc:spChg>
+        <pc:picChg chg="add mod">
+          <ac:chgData name="Matthieu De Mari" userId="dfb708c9-d8dc-439f-9a3b-c772bf4a311c" providerId="ADAL" clId="{5AF9E225-0E3D-4808-B523-40F6E9A1D59D}" dt="2023-03-02T07:29:17.928" v="1360" actId="14100"/>
+          <ac:picMkLst>
+            <pc:docMk/>
+            <pc:sldMk cId="1628130454" sldId="272"/>
+            <ac:picMk id="6" creationId="{55CD7F81-A6B6-798E-DD89-DC8670C0DE2C}"/>
+          </ac:picMkLst>
+        </pc:picChg>
+      </pc:sldChg>
+      <pc:sldChg chg="addSp delSp modSp add mod modClrScheme chgLayout">
+        <pc:chgData name="Matthieu De Mari" userId="dfb708c9-d8dc-439f-9a3b-c772bf4a311c" providerId="ADAL" clId="{5AF9E225-0E3D-4808-B523-40F6E9A1D59D}" dt="2023-03-02T07:30:59.874" v="1470" actId="1076"/>
+        <pc:sldMkLst>
+          <pc:docMk/>
+          <pc:sldMk cId="3014069118" sldId="273"/>
+        </pc:sldMkLst>
+        <pc:spChg chg="mod ord">
+          <ac:chgData name="Matthieu De Mari" userId="dfb708c9-d8dc-439f-9a3b-c772bf4a311c" providerId="ADAL" clId="{5AF9E225-0E3D-4808-B523-40F6E9A1D59D}" dt="2023-03-02T07:29:57.759" v="1365" actId="700"/>
+          <ac:spMkLst>
+            <pc:docMk/>
+            <pc:sldMk cId="3014069118" sldId="273"/>
+            <ac:spMk id="2" creationId="{A5B0BCE0-A549-1A7B-6F4B-B0C1C98DE2A1}"/>
+          </ac:spMkLst>
+        </pc:spChg>
+        <pc:spChg chg="mod ord">
+          <ac:chgData name="Matthieu De Mari" userId="dfb708c9-d8dc-439f-9a3b-c772bf4a311c" providerId="ADAL" clId="{5AF9E225-0E3D-4808-B523-40F6E9A1D59D}" dt="2023-03-02T07:30:54.086" v="1468" actId="113"/>
+          <ac:spMkLst>
+            <pc:docMk/>
+            <pc:sldMk cId="3014069118" sldId="273"/>
+            <ac:spMk id="3" creationId="{047FD354-275A-C734-E17F-FED0638E05F9}"/>
+          </ac:spMkLst>
+        </pc:spChg>
+        <pc:picChg chg="add mod">
+          <ac:chgData name="Matthieu De Mari" userId="dfb708c9-d8dc-439f-9a3b-c772bf4a311c" providerId="ADAL" clId="{5AF9E225-0E3D-4808-B523-40F6E9A1D59D}" dt="2023-03-02T07:30:59.874" v="1470" actId="1076"/>
+          <ac:picMkLst>
+            <pc:docMk/>
+            <pc:sldMk cId="3014069118" sldId="273"/>
+            <ac:picMk id="5" creationId="{EABBBED6-4EB2-7ACD-C156-5A730591D325}"/>
+          </ac:picMkLst>
+        </pc:picChg>
+        <pc:picChg chg="del">
+          <ac:chgData name="Matthieu De Mari" userId="dfb708c9-d8dc-439f-9a3b-c772bf4a311c" providerId="ADAL" clId="{5AF9E225-0E3D-4808-B523-40F6E9A1D59D}" dt="2023-03-02T07:29:43.179" v="1362" actId="478"/>
+          <ac:picMkLst>
+            <pc:docMk/>
+            <pc:sldMk cId="3014069118" sldId="273"/>
+            <ac:picMk id="6" creationId="{55CD7F81-A6B6-798E-DD89-DC8670C0DE2C}"/>
+          </ac:picMkLst>
+        </pc:picChg>
+      </pc:sldChg>
+      <pc:sldChg chg="addSp delSp modSp new mod modClrScheme chgLayout">
+        <pc:chgData name="Matthieu De Mari" userId="dfb708c9-d8dc-439f-9a3b-c772bf4a311c" providerId="ADAL" clId="{5AF9E225-0E3D-4808-B523-40F6E9A1D59D}" dt="2023-03-02T09:06:53.193" v="4236" actId="20577"/>
+        <pc:sldMkLst>
+          <pc:docMk/>
+          <pc:sldMk cId="1813455260" sldId="274"/>
+        </pc:sldMkLst>
+        <pc:spChg chg="mod ord">
+          <ac:chgData name="Matthieu De Mari" userId="dfb708c9-d8dc-439f-9a3b-c772bf4a311c" providerId="ADAL" clId="{5AF9E225-0E3D-4808-B523-40F6E9A1D59D}" dt="2023-03-02T07:32:29.963" v="1598" actId="700"/>
+          <ac:spMkLst>
+            <pc:docMk/>
+            <pc:sldMk cId="1813455260" sldId="274"/>
+            <ac:spMk id="2" creationId="{87657C29-1A3B-9090-2528-30E69AB94051}"/>
+          </ac:spMkLst>
+        </pc:spChg>
+        <pc:spChg chg="del mod ord">
+          <ac:chgData name="Matthieu De Mari" userId="dfb708c9-d8dc-439f-9a3b-c772bf4a311c" providerId="ADAL" clId="{5AF9E225-0E3D-4808-B523-40F6E9A1D59D}" dt="2023-03-02T07:31:51.685" v="1527" actId="700"/>
+          <ac:spMkLst>
+            <pc:docMk/>
+            <pc:sldMk cId="1813455260" sldId="274"/>
+            <ac:spMk id="3" creationId="{AC40E2B5-7E38-9BFA-56AD-20E1020751DC}"/>
+          </ac:spMkLst>
+        </pc:spChg>
+        <pc:spChg chg="del">
+          <ac:chgData name="Matthieu De Mari" userId="dfb708c9-d8dc-439f-9a3b-c772bf4a311c" providerId="ADAL" clId="{5AF9E225-0E3D-4808-B523-40F6E9A1D59D}" dt="2023-03-02T07:31:51.685" v="1527" actId="700"/>
+          <ac:spMkLst>
+            <pc:docMk/>
+            <pc:sldMk cId="1813455260" sldId="274"/>
+            <ac:spMk id="4" creationId="{2639C806-2795-6959-3B91-90B6BF904949}"/>
+          </ac:spMkLst>
+        </pc:spChg>
+        <pc:spChg chg="add mod ord">
+          <ac:chgData name="Matthieu De Mari" userId="dfb708c9-d8dc-439f-9a3b-c772bf4a311c" providerId="ADAL" clId="{5AF9E225-0E3D-4808-B523-40F6E9A1D59D}" dt="2023-03-02T09:06:53.193" v="4236" actId="20577"/>
+          <ac:spMkLst>
+            <pc:docMk/>
+            <pc:sldMk cId="1813455260" sldId="274"/>
+            <ac:spMk id="5" creationId="{2B13EA12-F42E-A14F-570D-C7B3FB0BA678}"/>
+          </ac:spMkLst>
+        </pc:spChg>
+        <pc:spChg chg="add del mod ord">
+          <ac:chgData name="Matthieu De Mari" userId="dfb708c9-d8dc-439f-9a3b-c772bf4a311c" providerId="ADAL" clId="{5AF9E225-0E3D-4808-B523-40F6E9A1D59D}" dt="2023-03-02T07:33:05.793" v="1635" actId="478"/>
+          <ac:spMkLst>
+            <pc:docMk/>
+            <pc:sldMk cId="1813455260" sldId="274"/>
+            <ac:spMk id="6" creationId="{FCCBF918-C626-4BAB-C761-B4C7DCCDB4C7}"/>
+          </ac:spMkLst>
+        </pc:spChg>
+        <pc:picChg chg="add mod">
+          <ac:chgData name="Matthieu De Mari" userId="dfb708c9-d8dc-439f-9a3b-c772bf4a311c" providerId="ADAL" clId="{5AF9E225-0E3D-4808-B523-40F6E9A1D59D}" dt="2023-03-02T07:33:14.798" v="1639"/>
+          <ac:picMkLst>
+            <pc:docMk/>
+            <pc:sldMk cId="1813455260" sldId="274"/>
+            <ac:picMk id="7" creationId="{8D7AE188-3FCF-9638-BCBC-D80FAEB83789}"/>
+          </ac:picMkLst>
+        </pc:picChg>
+      </pc:sldChg>
+      <pc:sldChg chg="addSp modSp add mod modClrScheme chgLayout">
+        <pc:chgData name="Matthieu De Mari" userId="dfb708c9-d8dc-439f-9a3b-c772bf4a311c" providerId="ADAL" clId="{5AF9E225-0E3D-4808-B523-40F6E9A1D59D}" dt="2023-03-02T08:43:42.183" v="3020" actId="13822"/>
+        <pc:sldMkLst>
+          <pc:docMk/>
+          <pc:sldMk cId="144954399" sldId="275"/>
+        </pc:sldMkLst>
+        <pc:spChg chg="mod ord">
+          <ac:chgData name="Matthieu De Mari" userId="dfb708c9-d8dc-439f-9a3b-c772bf4a311c" providerId="ADAL" clId="{5AF9E225-0E3D-4808-B523-40F6E9A1D59D}" dt="2023-03-02T07:46:08.814" v="2131" actId="700"/>
+          <ac:spMkLst>
+            <pc:docMk/>
+            <pc:sldMk cId="144954399" sldId="275"/>
+            <ac:spMk id="2" creationId="{87657C29-1A3B-9090-2528-30E69AB94051}"/>
+          </ac:spMkLst>
+        </pc:spChg>
+        <pc:spChg chg="mod ord">
+          <ac:chgData name="Matthieu De Mari" userId="dfb708c9-d8dc-439f-9a3b-c772bf4a311c" providerId="ADAL" clId="{5AF9E225-0E3D-4808-B523-40F6E9A1D59D}" dt="2023-03-02T07:46:08.814" v="2131" actId="700"/>
+          <ac:spMkLst>
+            <pc:docMk/>
+            <pc:sldMk cId="144954399" sldId="275"/>
+            <ac:spMk id="5" creationId="{2B13EA12-F42E-A14F-570D-C7B3FB0BA678}"/>
+          </ac:spMkLst>
+        </pc:spChg>
+        <pc:spChg chg="add mod">
+          <ac:chgData name="Matthieu De Mari" userId="dfb708c9-d8dc-439f-9a3b-c772bf4a311c" providerId="ADAL" clId="{5AF9E225-0E3D-4808-B523-40F6E9A1D59D}" dt="2023-03-02T07:48:05.307" v="2259"/>
+          <ac:spMkLst>
+            <pc:docMk/>
+            <pc:sldMk cId="144954399" sldId="275"/>
+            <ac:spMk id="6" creationId="{57C7ED51-0A97-1822-42FD-5AA2C9F30400}"/>
+          </ac:spMkLst>
+        </pc:spChg>
+        <pc:spChg chg="add mod">
+          <ac:chgData name="Matthieu De Mari" userId="dfb708c9-d8dc-439f-9a3b-c772bf4a311c" providerId="ADAL" clId="{5AF9E225-0E3D-4808-B523-40F6E9A1D59D}" dt="2023-03-02T08:43:42.183" v="3020" actId="13822"/>
+          <ac:spMkLst>
+            <pc:docMk/>
+            <pc:sldMk cId="144954399" sldId="275"/>
+            <ac:spMk id="7" creationId="{ECF836CD-AD6D-AE6D-BD12-76C872F50BA1}"/>
+          </ac:spMkLst>
+        </pc:spChg>
+        <pc:picChg chg="add mod">
+          <ac:chgData name="Matthieu De Mari" userId="dfb708c9-d8dc-439f-9a3b-c772bf4a311c" providerId="ADAL" clId="{5AF9E225-0E3D-4808-B523-40F6E9A1D59D}" dt="2023-03-02T07:46:16.390" v="2137" actId="1076"/>
+          <ac:picMkLst>
+            <pc:docMk/>
+            <pc:sldMk cId="144954399" sldId="275"/>
+            <ac:picMk id="4" creationId="{516B1709-7CCB-DAA9-4D13-D59FB8BB267D}"/>
+          </ac:picMkLst>
+        </pc:picChg>
+      </pc:sldChg>
+      <pc:sldChg chg="modSp add mod modClrScheme chgLayout">
+        <pc:chgData name="Matthieu De Mari" userId="dfb708c9-d8dc-439f-9a3b-c772bf4a311c" providerId="ADAL" clId="{5AF9E225-0E3D-4808-B523-40F6E9A1D59D}" dt="2023-03-02T08:31:32.489" v="2596" actId="20577"/>
+        <pc:sldMkLst>
+          <pc:docMk/>
+          <pc:sldMk cId="4217769597" sldId="276"/>
+        </pc:sldMkLst>
+        <pc:spChg chg="mod ord">
+          <ac:chgData name="Matthieu De Mari" userId="dfb708c9-d8dc-439f-9a3b-c772bf4a311c" providerId="ADAL" clId="{5AF9E225-0E3D-4808-B523-40F6E9A1D59D}" dt="2023-03-02T08:27:57.452" v="2453" actId="700"/>
+          <ac:spMkLst>
+            <pc:docMk/>
+            <pc:sldMk cId="4217769597" sldId="276"/>
+            <ac:spMk id="2" creationId="{87657C29-1A3B-9090-2528-30E69AB94051}"/>
+          </ac:spMkLst>
+        </pc:spChg>
+        <pc:spChg chg="mod ord">
+          <ac:chgData name="Matthieu De Mari" userId="dfb708c9-d8dc-439f-9a3b-c772bf4a311c" providerId="ADAL" clId="{5AF9E225-0E3D-4808-B523-40F6E9A1D59D}" dt="2023-03-02T08:31:32.489" v="2596" actId="20577"/>
+          <ac:spMkLst>
+            <pc:docMk/>
+            <pc:sldMk cId="4217769597" sldId="276"/>
+            <ac:spMk id="5" creationId="{2B13EA12-F42E-A14F-570D-C7B3FB0BA678}"/>
+          </ac:spMkLst>
+        </pc:spChg>
+      </pc:sldChg>
+      <pc:sldChg chg="modSp add mod modClrScheme chgLayout">
+        <pc:chgData name="Matthieu De Mari" userId="dfb708c9-d8dc-439f-9a3b-c772bf4a311c" providerId="ADAL" clId="{5AF9E225-0E3D-4808-B523-40F6E9A1D59D}" dt="2023-03-02T09:05:04.931" v="4179" actId="207"/>
+        <pc:sldMkLst>
+          <pc:docMk/>
+          <pc:sldMk cId="1233188664" sldId="277"/>
+        </pc:sldMkLst>
+        <pc:spChg chg="mod ord">
+          <ac:chgData name="Matthieu De Mari" userId="dfb708c9-d8dc-439f-9a3b-c772bf4a311c" providerId="ADAL" clId="{5AF9E225-0E3D-4808-B523-40F6E9A1D59D}" dt="2023-03-02T08:51:43.961" v="3323" actId="700"/>
+          <ac:spMkLst>
+            <pc:docMk/>
+            <pc:sldMk cId="1233188664" sldId="277"/>
+            <ac:spMk id="2" creationId="{87657C29-1A3B-9090-2528-30E69AB94051}"/>
+          </ac:spMkLst>
+        </pc:spChg>
+        <pc:spChg chg="mod ord">
+          <ac:chgData name="Matthieu De Mari" userId="dfb708c9-d8dc-439f-9a3b-c772bf4a311c" providerId="ADAL" clId="{5AF9E225-0E3D-4808-B523-40F6E9A1D59D}" dt="2023-03-02T09:05:04.931" v="4179" actId="207"/>
+          <ac:spMkLst>
+            <pc:docMk/>
+            <pc:sldMk cId="1233188664" sldId="277"/>
+            <ac:spMk id="5" creationId="{2B13EA12-F42E-A14F-570D-C7B3FB0BA678}"/>
+          </ac:spMkLst>
+        </pc:spChg>
+      </pc:sldChg>
+      <pc:sldChg chg="addSp modSp add mod chgLayout">
+        <pc:chgData name="Matthieu De Mari" userId="dfb708c9-d8dc-439f-9a3b-c772bf4a311c" providerId="ADAL" clId="{5AF9E225-0E3D-4808-B523-40F6E9A1D59D}" dt="2023-03-02T07:40:29.138" v="1964" actId="20577"/>
+        <pc:sldMkLst>
+          <pc:docMk/>
+          <pc:sldMk cId="885607022" sldId="278"/>
+        </pc:sldMkLst>
+        <pc:spChg chg="mod ord">
+          <ac:chgData name="Matthieu De Mari" userId="dfb708c9-d8dc-439f-9a3b-c772bf4a311c" providerId="ADAL" clId="{5AF9E225-0E3D-4808-B523-40F6E9A1D59D}" dt="2023-03-02T07:37:04.336" v="1795" actId="700"/>
+          <ac:spMkLst>
+            <pc:docMk/>
+            <pc:sldMk cId="885607022" sldId="278"/>
+            <ac:spMk id="2" creationId="{87657C29-1A3B-9090-2528-30E69AB94051}"/>
+          </ac:spMkLst>
+        </pc:spChg>
+        <pc:spChg chg="add mod ord">
+          <ac:chgData name="Matthieu De Mari" userId="dfb708c9-d8dc-439f-9a3b-c772bf4a311c" providerId="ADAL" clId="{5AF9E225-0E3D-4808-B523-40F6E9A1D59D}" dt="2023-03-02T07:40:29.138" v="1964" actId="20577"/>
+          <ac:spMkLst>
+            <pc:docMk/>
+            <pc:sldMk cId="885607022" sldId="278"/>
+            <ac:spMk id="3" creationId="{E1F7AF25-2360-31D8-D5BF-56EDDD31008D}"/>
+          </ac:spMkLst>
+        </pc:spChg>
+        <pc:spChg chg="mod ord">
+          <ac:chgData name="Matthieu De Mari" userId="dfb708c9-d8dc-439f-9a3b-c772bf4a311c" providerId="ADAL" clId="{5AF9E225-0E3D-4808-B523-40F6E9A1D59D}" dt="2023-03-02T07:40:27.571" v="1961" actId="27636"/>
+          <ac:spMkLst>
+            <pc:docMk/>
+            <pc:sldMk cId="885607022" sldId="278"/>
+            <ac:spMk id="5" creationId="{2B13EA12-F42E-A14F-570D-C7B3FB0BA678}"/>
+          </ac:spMkLst>
+        </pc:spChg>
+      </pc:sldChg>
+      <pc:sldChg chg="modSp add mod">
+        <pc:chgData name="Matthieu De Mari" userId="dfb708c9-d8dc-439f-9a3b-c772bf4a311c" providerId="ADAL" clId="{5AF9E225-0E3D-4808-B523-40F6E9A1D59D}" dt="2023-03-02T07:41:39.244" v="2020" actId="27636"/>
+        <pc:sldMkLst>
+          <pc:docMk/>
+          <pc:sldMk cId="3941141626" sldId="279"/>
+        </pc:sldMkLst>
+        <pc:spChg chg="mod">
+          <ac:chgData name="Matthieu De Mari" userId="dfb708c9-d8dc-439f-9a3b-c772bf4a311c" providerId="ADAL" clId="{5AF9E225-0E3D-4808-B523-40F6E9A1D59D}" dt="2023-03-02T07:41:39.244" v="2020" actId="27636"/>
+          <ac:spMkLst>
+            <pc:docMk/>
+            <pc:sldMk cId="3941141626" sldId="279"/>
+            <ac:spMk id="3" creationId="{E1F7AF25-2360-31D8-D5BF-56EDDD31008D}"/>
+          </ac:spMkLst>
+        </pc:spChg>
+        <pc:spChg chg="mod">
+          <ac:chgData name="Matthieu De Mari" userId="dfb708c9-d8dc-439f-9a3b-c772bf4a311c" providerId="ADAL" clId="{5AF9E225-0E3D-4808-B523-40F6E9A1D59D}" dt="2023-03-02T07:41:39.243" v="2019" actId="27636"/>
+          <ac:spMkLst>
+            <pc:docMk/>
+            <pc:sldMk cId="3941141626" sldId="279"/>
+            <ac:spMk id="5" creationId="{2B13EA12-F42E-A14F-570D-C7B3FB0BA678}"/>
+          </ac:spMkLst>
+        </pc:spChg>
+      </pc:sldChg>
+      <pc:sldChg chg="modSp add mod">
+        <pc:chgData name="Matthieu De Mari" userId="dfb708c9-d8dc-439f-9a3b-c772bf4a311c" providerId="ADAL" clId="{5AF9E225-0E3D-4808-B523-40F6E9A1D59D}" dt="2023-03-02T07:42:09.869" v="2043" actId="14100"/>
+        <pc:sldMkLst>
+          <pc:docMk/>
+          <pc:sldMk cId="2409304258" sldId="280"/>
+        </pc:sldMkLst>
+        <pc:spChg chg="mod">
+          <ac:chgData name="Matthieu De Mari" userId="dfb708c9-d8dc-439f-9a3b-c772bf4a311c" providerId="ADAL" clId="{5AF9E225-0E3D-4808-B523-40F6E9A1D59D}" dt="2023-03-02T07:42:09.869" v="2043" actId="14100"/>
+          <ac:spMkLst>
+            <pc:docMk/>
+            <pc:sldMk cId="2409304258" sldId="280"/>
+            <ac:spMk id="3" creationId="{E1F7AF25-2360-31D8-D5BF-56EDDD31008D}"/>
+          </ac:spMkLst>
+        </pc:spChg>
+        <pc:spChg chg="mod">
+          <ac:chgData name="Matthieu De Mari" userId="dfb708c9-d8dc-439f-9a3b-c772bf4a311c" providerId="ADAL" clId="{5AF9E225-0E3D-4808-B523-40F6E9A1D59D}" dt="2023-03-02T07:38:04.822" v="1837" actId="27636"/>
+          <ac:spMkLst>
+            <pc:docMk/>
+            <pc:sldMk cId="2409304258" sldId="280"/>
+            <ac:spMk id="5" creationId="{2B13EA12-F42E-A14F-570D-C7B3FB0BA678}"/>
+          </ac:spMkLst>
+        </pc:spChg>
+      </pc:sldChg>
+      <pc:sldChg chg="modSp add mod">
+        <pc:chgData name="Matthieu De Mari" userId="dfb708c9-d8dc-439f-9a3b-c772bf4a311c" providerId="ADAL" clId="{5AF9E225-0E3D-4808-B523-40F6E9A1D59D}" dt="2023-03-02T07:43:05.203" v="2098" actId="27636"/>
+        <pc:sldMkLst>
+          <pc:docMk/>
+          <pc:sldMk cId="2949375831" sldId="281"/>
+        </pc:sldMkLst>
+        <pc:spChg chg="mod">
+          <ac:chgData name="Matthieu De Mari" userId="dfb708c9-d8dc-439f-9a3b-c772bf4a311c" providerId="ADAL" clId="{5AF9E225-0E3D-4808-B523-40F6E9A1D59D}" dt="2023-03-02T07:43:05.203" v="2098" actId="27636"/>
+          <ac:spMkLst>
+            <pc:docMk/>
+            <pc:sldMk cId="2949375831" sldId="281"/>
+            <ac:spMk id="3" creationId="{E1F7AF25-2360-31D8-D5BF-56EDDD31008D}"/>
+          </ac:spMkLst>
+        </pc:spChg>
+        <pc:spChg chg="mod">
+          <ac:chgData name="Matthieu De Mari" userId="dfb708c9-d8dc-439f-9a3b-c772bf4a311c" providerId="ADAL" clId="{5AF9E225-0E3D-4808-B523-40F6E9A1D59D}" dt="2023-03-02T07:43:05.202" v="2097" actId="27636"/>
+          <ac:spMkLst>
+            <pc:docMk/>
+            <pc:sldMk cId="2949375831" sldId="281"/>
+            <ac:spMk id="5" creationId="{2B13EA12-F42E-A14F-570D-C7B3FB0BA678}"/>
+          </ac:spMkLst>
+        </pc:spChg>
+      </pc:sldChg>
+      <pc:sldChg chg="addSp delSp modSp add mod modClrScheme chgLayout">
+        <pc:chgData name="Matthieu De Mari" userId="dfb708c9-d8dc-439f-9a3b-c772bf4a311c" providerId="ADAL" clId="{5AF9E225-0E3D-4808-B523-40F6E9A1D59D}" dt="2023-03-02T08:43:47.428" v="3024"/>
+        <pc:sldMkLst>
+          <pc:docMk/>
+          <pc:sldMk cId="2432782764" sldId="282"/>
+        </pc:sldMkLst>
+        <pc:spChg chg="mod ord">
+          <ac:chgData name="Matthieu De Mari" userId="dfb708c9-d8dc-439f-9a3b-c772bf4a311c" providerId="ADAL" clId="{5AF9E225-0E3D-4808-B523-40F6E9A1D59D}" dt="2023-03-02T07:46:22.611" v="2138" actId="700"/>
+          <ac:spMkLst>
+            <pc:docMk/>
+            <pc:sldMk cId="2432782764" sldId="282"/>
+            <ac:spMk id="2" creationId="{87657C29-1A3B-9090-2528-30E69AB94051}"/>
+          </ac:spMkLst>
+        </pc:spChg>
+        <pc:spChg chg="mod ord">
+          <ac:chgData name="Matthieu De Mari" userId="dfb708c9-d8dc-439f-9a3b-c772bf4a311c" providerId="ADAL" clId="{5AF9E225-0E3D-4808-B523-40F6E9A1D59D}" dt="2023-03-02T07:46:22.611" v="2138" actId="700"/>
+          <ac:spMkLst>
+            <pc:docMk/>
+            <pc:sldMk cId="2432782764" sldId="282"/>
+            <ac:spMk id="5" creationId="{2B13EA12-F42E-A14F-570D-C7B3FB0BA678}"/>
+          </ac:spMkLst>
+        </pc:spChg>
+        <pc:spChg chg="add mod">
+          <ac:chgData name="Matthieu De Mari" userId="dfb708c9-d8dc-439f-9a3b-c772bf4a311c" providerId="ADAL" clId="{5AF9E225-0E3D-4808-B523-40F6E9A1D59D}" dt="2023-03-02T07:47:45.570" v="2255" actId="207"/>
+          <ac:spMkLst>
+            <pc:docMk/>
+            <pc:sldMk cId="2432782764" sldId="282"/>
+            <ac:spMk id="7" creationId="{6CF83D07-FBDA-1E76-E13D-3426B0ACC273}"/>
+          </ac:spMkLst>
+        </pc:spChg>
+        <pc:spChg chg="add del mod">
+          <ac:chgData name="Matthieu De Mari" userId="dfb708c9-d8dc-439f-9a3b-c772bf4a311c" providerId="ADAL" clId="{5AF9E225-0E3D-4808-B523-40F6E9A1D59D}" dt="2023-03-02T08:43:47.159" v="3023" actId="478"/>
+          <ac:spMkLst>
+            <pc:docMk/>
+            <pc:sldMk cId="2432782764" sldId="282"/>
+            <ac:spMk id="8" creationId="{04EAF616-AA82-5F60-E888-F7F6AB6D0795}"/>
+          </ac:spMkLst>
+        </pc:spChg>
+        <pc:spChg chg="add del mod">
+          <ac:chgData name="Matthieu De Mari" userId="dfb708c9-d8dc-439f-9a3b-c772bf4a311c" providerId="ADAL" clId="{5AF9E225-0E3D-4808-B523-40F6E9A1D59D}" dt="2023-03-02T08:43:45.894" v="3022"/>
+          <ac:spMkLst>
+            <pc:docMk/>
+            <pc:sldMk cId="2432782764" sldId="282"/>
+            <ac:spMk id="9" creationId="{6B94BEC5-C520-DF1D-B129-0692B33C7FC4}"/>
+          </ac:spMkLst>
+        </pc:spChg>
+        <pc:spChg chg="add mod">
+          <ac:chgData name="Matthieu De Mari" userId="dfb708c9-d8dc-439f-9a3b-c772bf4a311c" providerId="ADAL" clId="{5AF9E225-0E3D-4808-B523-40F6E9A1D59D}" dt="2023-03-02T08:43:47.428" v="3024"/>
+          <ac:spMkLst>
+            <pc:docMk/>
+            <pc:sldMk cId="2432782764" sldId="282"/>
+            <ac:spMk id="10" creationId="{73593546-FFB2-D679-BBCF-20BC29CA5856}"/>
+          </ac:spMkLst>
+        </pc:spChg>
+        <pc:picChg chg="add del mod">
+          <ac:chgData name="Matthieu De Mari" userId="dfb708c9-d8dc-439f-9a3b-c772bf4a311c" providerId="ADAL" clId="{5AF9E225-0E3D-4808-B523-40F6E9A1D59D}" dt="2023-03-02T07:46:27.657" v="2142" actId="478"/>
+          <ac:picMkLst>
+            <pc:docMk/>
+            <pc:sldMk cId="2432782764" sldId="282"/>
+            <ac:picMk id="4" creationId="{C892ADDA-3564-C985-379F-45F5A4461107}"/>
+          </ac:picMkLst>
+        </pc:picChg>
+        <pc:picChg chg="add mod">
+          <ac:chgData name="Matthieu De Mari" userId="dfb708c9-d8dc-439f-9a3b-c772bf4a311c" providerId="ADAL" clId="{5AF9E225-0E3D-4808-B523-40F6E9A1D59D}" dt="2023-03-02T07:46:27.944" v="2143"/>
+          <ac:picMkLst>
+            <pc:docMk/>
+            <pc:sldMk cId="2432782764" sldId="282"/>
+            <ac:picMk id="6" creationId="{2480711A-E210-4C5D-D509-EF0C9E63A10A}"/>
+          </ac:picMkLst>
+        </pc:picChg>
+      </pc:sldChg>
+      <pc:sldChg chg="modSp add del mod modClrScheme chgLayout">
+        <pc:chgData name="Matthieu De Mari" userId="dfb708c9-d8dc-439f-9a3b-c772bf4a311c" providerId="ADAL" clId="{5AF9E225-0E3D-4808-B523-40F6E9A1D59D}" dt="2023-03-02T07:50:30.713" v="2314" actId="47"/>
+        <pc:sldMkLst>
+          <pc:docMk/>
+          <pc:sldMk cId="3346743662" sldId="283"/>
+        </pc:sldMkLst>
+        <pc:spChg chg="mod ord">
+          <ac:chgData name="Matthieu De Mari" userId="dfb708c9-d8dc-439f-9a3b-c772bf4a311c" providerId="ADAL" clId="{5AF9E225-0E3D-4808-B523-40F6E9A1D59D}" dt="2023-03-02T07:48:42.616" v="2276" actId="700"/>
+          <ac:spMkLst>
+            <pc:docMk/>
+            <pc:sldMk cId="3346743662" sldId="283"/>
+            <ac:spMk id="2" creationId="{87657C29-1A3B-9090-2528-30E69AB94051}"/>
+          </ac:spMkLst>
+        </pc:spChg>
+        <pc:spChg chg="mod ord">
+          <ac:chgData name="Matthieu De Mari" userId="dfb708c9-d8dc-439f-9a3b-c772bf4a311c" providerId="ADAL" clId="{5AF9E225-0E3D-4808-B523-40F6E9A1D59D}" dt="2023-03-02T07:49:41.866" v="2304" actId="27636"/>
+          <ac:spMkLst>
+            <pc:docMk/>
+            <pc:sldMk cId="3346743662" sldId="283"/>
+            <ac:spMk id="5" creationId="{2B13EA12-F42E-A14F-570D-C7B3FB0BA678}"/>
+          </ac:spMkLst>
+        </pc:spChg>
+      </pc:sldChg>
+      <pc:sldChg chg="modSp add mod">
+        <pc:chgData name="Matthieu De Mari" userId="dfb708c9-d8dc-439f-9a3b-c772bf4a311c" providerId="ADAL" clId="{5AF9E225-0E3D-4808-B523-40F6E9A1D59D}" dt="2023-03-02T08:49:01.268" v="3268" actId="20577"/>
+        <pc:sldMkLst>
+          <pc:docMk/>
+          <pc:sldMk cId="3869391851" sldId="284"/>
+        </pc:sldMkLst>
+        <pc:spChg chg="mod">
+          <ac:chgData name="Matthieu De Mari" userId="dfb708c9-d8dc-439f-9a3b-c772bf4a311c" providerId="ADAL" clId="{5AF9E225-0E3D-4808-B523-40F6E9A1D59D}" dt="2023-03-02T08:49:01.268" v="3268" actId="20577"/>
+          <ac:spMkLst>
+            <pc:docMk/>
+            <pc:sldMk cId="3869391851" sldId="284"/>
+            <ac:spMk id="2" creationId="{87657C29-1A3B-9090-2528-30E69AB94051}"/>
+          </ac:spMkLst>
+        </pc:spChg>
+        <pc:spChg chg="mod">
+          <ac:chgData name="Matthieu De Mari" userId="dfb708c9-d8dc-439f-9a3b-c772bf4a311c" providerId="ADAL" clId="{5AF9E225-0E3D-4808-B523-40F6E9A1D59D}" dt="2023-03-02T08:04:58.800" v="2394" actId="20577"/>
+          <ac:spMkLst>
+            <pc:docMk/>
+            <pc:sldMk cId="3869391851" sldId="284"/>
+            <ac:spMk id="5" creationId="{2B13EA12-F42E-A14F-570D-C7B3FB0BA678}"/>
+          </ac:spMkLst>
+        </pc:spChg>
+      </pc:sldChg>
+      <pc:sldChg chg="modSp add mod ord">
+        <pc:chgData name="Matthieu De Mari" userId="dfb708c9-d8dc-439f-9a3b-c772bf4a311c" providerId="ADAL" clId="{5AF9E225-0E3D-4808-B523-40F6E9A1D59D}" dt="2023-03-02T08:47:17.468" v="3221" actId="20577"/>
+        <pc:sldMkLst>
+          <pc:docMk/>
+          <pc:sldMk cId="1567445271" sldId="285"/>
+        </pc:sldMkLst>
+        <pc:spChg chg="mod">
+          <ac:chgData name="Matthieu De Mari" userId="dfb708c9-d8dc-439f-9a3b-c772bf4a311c" providerId="ADAL" clId="{5AF9E225-0E3D-4808-B523-40F6E9A1D59D}" dt="2023-03-02T07:52:47.820" v="2380" actId="20577"/>
+          <ac:spMkLst>
+            <pc:docMk/>
+            <pc:sldMk cId="1567445271" sldId="285"/>
+            <ac:spMk id="2" creationId="{87657C29-1A3B-9090-2528-30E69AB94051}"/>
+          </ac:spMkLst>
+        </pc:spChg>
+        <pc:spChg chg="mod">
+          <ac:chgData name="Matthieu De Mari" userId="dfb708c9-d8dc-439f-9a3b-c772bf4a311c" providerId="ADAL" clId="{5AF9E225-0E3D-4808-B523-40F6E9A1D59D}" dt="2023-03-02T08:47:17.468" v="3221" actId="20577"/>
+          <ac:spMkLst>
+            <pc:docMk/>
+            <pc:sldMk cId="1567445271" sldId="285"/>
+            <ac:spMk id="5" creationId="{2B13EA12-F42E-A14F-570D-C7B3FB0BA678}"/>
+          </ac:spMkLst>
+        </pc:spChg>
+      </pc:sldChg>
+      <pc:sldChg chg="new del">
+        <pc:chgData name="Matthieu De Mari" userId="dfb708c9-d8dc-439f-9a3b-c772bf4a311c" providerId="ADAL" clId="{5AF9E225-0E3D-4808-B523-40F6E9A1D59D}" dt="2023-03-02T09:20:57.277" v="4650" actId="47"/>
+        <pc:sldMkLst>
+          <pc:docMk/>
+          <pc:sldMk cId="1786940851" sldId="286"/>
+        </pc:sldMkLst>
+      </pc:sldChg>
+      <pc:sldChg chg="addSp delSp modSp add del mod">
+        <pc:chgData name="Matthieu De Mari" userId="dfb708c9-d8dc-439f-9a3b-c772bf4a311c" providerId="ADAL" clId="{5AF9E225-0E3D-4808-B523-40F6E9A1D59D}" dt="2023-03-02T07:52:04.495" v="2352" actId="47"/>
+        <pc:sldMkLst>
+          <pc:docMk/>
+          <pc:sldMk cId="2521085326" sldId="286"/>
+        </pc:sldMkLst>
+        <pc:spChg chg="add del mod">
+          <ac:chgData name="Matthieu De Mari" userId="dfb708c9-d8dc-439f-9a3b-c772bf4a311c" providerId="ADAL" clId="{5AF9E225-0E3D-4808-B523-40F6E9A1D59D}" dt="2023-03-02T07:51:48.309" v="2347" actId="478"/>
+          <ac:spMkLst>
+            <pc:docMk/>
+            <pc:sldMk cId="2521085326" sldId="286"/>
+            <ac:spMk id="4" creationId="{EC0267C5-FD87-53BD-23F2-95BC6424A451}"/>
+          </ac:spMkLst>
+        </pc:spChg>
+        <pc:spChg chg="del">
+          <ac:chgData name="Matthieu De Mari" userId="dfb708c9-d8dc-439f-9a3b-c772bf4a311c" providerId="ADAL" clId="{5AF9E225-0E3D-4808-B523-40F6E9A1D59D}" dt="2023-03-02T07:51:46.715" v="2346" actId="478"/>
+          <ac:spMkLst>
+            <pc:docMk/>
+            <pc:sldMk cId="2521085326" sldId="286"/>
+            <ac:spMk id="5" creationId="{2B13EA12-F42E-A14F-570D-C7B3FB0BA678}"/>
+          </ac:spMkLst>
+        </pc:spChg>
+        <pc:picChg chg="add mod">
+          <ac:chgData name="Matthieu De Mari" userId="dfb708c9-d8dc-439f-9a3b-c772bf4a311c" providerId="ADAL" clId="{5AF9E225-0E3D-4808-B523-40F6E9A1D59D}" dt="2023-03-02T07:51:57.677" v="2351" actId="1076"/>
+          <ac:picMkLst>
+            <pc:docMk/>
+            <pc:sldMk cId="2521085326" sldId="286"/>
+            <ac:picMk id="6" creationId="{54BD047C-34A8-A322-5C03-52E78A2B8D91}"/>
+          </ac:picMkLst>
+        </pc:picChg>
+      </pc:sldChg>
+      <pc:sldChg chg="add">
+        <pc:chgData name="Matthieu De Mari" userId="dfb708c9-d8dc-439f-9a3b-c772bf4a311c" providerId="ADAL" clId="{5AF9E225-0E3D-4808-B523-40F6E9A1D59D}" dt="2023-03-02T08:31:29.223" v="2595" actId="2890"/>
+        <pc:sldMkLst>
+          <pc:docMk/>
+          <pc:sldMk cId="2870852187" sldId="287"/>
+        </pc:sldMkLst>
+      </pc:sldChg>
+      <pc:sldChg chg="addSp delSp modSp new mod modClrScheme chgLayout">
+        <pc:chgData name="Matthieu De Mari" userId="dfb708c9-d8dc-439f-9a3b-c772bf4a311c" providerId="ADAL" clId="{5AF9E225-0E3D-4808-B523-40F6E9A1D59D}" dt="2023-03-02T08:35:16.091" v="2758" actId="20577"/>
+        <pc:sldMkLst>
+          <pc:docMk/>
+          <pc:sldMk cId="3486387661" sldId="288"/>
+        </pc:sldMkLst>
+        <pc:spChg chg="del mod ord">
+          <ac:chgData name="Matthieu De Mari" userId="dfb708c9-d8dc-439f-9a3b-c772bf4a311c" providerId="ADAL" clId="{5AF9E225-0E3D-4808-B523-40F6E9A1D59D}" dt="2023-03-02T08:34:37.767" v="2642" actId="700"/>
+          <ac:spMkLst>
+            <pc:docMk/>
+            <pc:sldMk cId="3486387661" sldId="288"/>
+            <ac:spMk id="2" creationId="{F4612675-FCDC-5B37-9029-719409627A5A}"/>
+          </ac:spMkLst>
+        </pc:spChg>
+        <pc:spChg chg="mod ord">
+          <ac:chgData name="Matthieu De Mari" userId="dfb708c9-d8dc-439f-9a3b-c772bf4a311c" providerId="ADAL" clId="{5AF9E225-0E3D-4808-B523-40F6E9A1D59D}" dt="2023-03-02T08:34:40.381" v="2647" actId="27636"/>
+          <ac:spMkLst>
+            <pc:docMk/>
+            <pc:sldMk cId="3486387661" sldId="288"/>
+            <ac:spMk id="3" creationId="{C138818D-C6AF-E451-6FCE-ED2A40154B7A}"/>
+          </ac:spMkLst>
+        </pc:spChg>
+        <pc:spChg chg="add mod ord">
+          <ac:chgData name="Matthieu De Mari" userId="dfb708c9-d8dc-439f-9a3b-c772bf4a311c" providerId="ADAL" clId="{5AF9E225-0E3D-4808-B523-40F6E9A1D59D}" dt="2023-03-02T08:35:16.091" v="2758" actId="20577"/>
+          <ac:spMkLst>
+            <pc:docMk/>
+            <pc:sldMk cId="3486387661" sldId="288"/>
+            <ac:spMk id="4" creationId="{FAA00B7A-D40D-50C7-609B-A59B4EFABF43}"/>
+          </ac:spMkLst>
+        </pc:spChg>
+        <pc:spChg chg="add mod ord">
+          <ac:chgData name="Matthieu De Mari" userId="dfb708c9-d8dc-439f-9a3b-c772bf4a311c" providerId="ADAL" clId="{5AF9E225-0E3D-4808-B523-40F6E9A1D59D}" dt="2023-03-02T08:34:57.910" v="2721" actId="20577"/>
+          <ac:spMkLst>
+            <pc:docMk/>
+            <pc:sldMk cId="3486387661" sldId="288"/>
+            <ac:spMk id="5" creationId="{DC5B08FF-7D05-A1F5-35B7-5B067BDD0835}"/>
+          </ac:spMkLst>
+        </pc:spChg>
+        <pc:picChg chg="add mod">
+          <ac:chgData name="Matthieu De Mari" userId="dfb708c9-d8dc-439f-9a3b-c772bf4a311c" providerId="ADAL" clId="{5AF9E225-0E3D-4808-B523-40F6E9A1D59D}" dt="2023-03-02T08:35:03.377" v="2725" actId="1076"/>
+          <ac:picMkLst>
+            <pc:docMk/>
+            <pc:sldMk cId="3486387661" sldId="288"/>
+            <ac:picMk id="7" creationId="{080BFE84-9981-5B49-533B-D646CBF01988}"/>
+          </ac:picMkLst>
+        </pc:picChg>
+      </pc:sldChg>
+      <pc:sldChg chg="addSp delSp modSp add mod">
+        <pc:chgData name="Matthieu De Mari" userId="dfb708c9-d8dc-439f-9a3b-c772bf4a311c" providerId="ADAL" clId="{5AF9E225-0E3D-4808-B523-40F6E9A1D59D}" dt="2023-03-02T08:38:16.072" v="2894" actId="113"/>
+        <pc:sldMkLst>
+          <pc:docMk/>
+          <pc:sldMk cId="2118681498" sldId="289"/>
+        </pc:sldMkLst>
+        <pc:spChg chg="mod">
+          <ac:chgData name="Matthieu De Mari" userId="dfb708c9-d8dc-439f-9a3b-c772bf4a311c" providerId="ADAL" clId="{5AF9E225-0E3D-4808-B523-40F6E9A1D59D}" dt="2023-03-02T08:38:16.072" v="2894" actId="113"/>
+          <ac:spMkLst>
+            <pc:docMk/>
+            <pc:sldMk cId="2118681498" sldId="289"/>
+            <ac:spMk id="5" creationId="{DC5B08FF-7D05-A1F5-35B7-5B067BDD0835}"/>
+          </ac:spMkLst>
+        </pc:spChg>
+        <pc:picChg chg="add mod">
+          <ac:chgData name="Matthieu De Mari" userId="dfb708c9-d8dc-439f-9a3b-c772bf4a311c" providerId="ADAL" clId="{5AF9E225-0E3D-4808-B523-40F6E9A1D59D}" dt="2023-03-02T08:37:16.689" v="2881" actId="1076"/>
+          <ac:picMkLst>
+            <pc:docMk/>
+            <pc:sldMk cId="2118681498" sldId="289"/>
+            <ac:picMk id="6" creationId="{B9B1F783-5C9B-1900-BC04-D7161A01A992}"/>
+          </ac:picMkLst>
+        </pc:picChg>
+        <pc:picChg chg="del">
+          <ac:chgData name="Matthieu De Mari" userId="dfb708c9-d8dc-439f-9a3b-c772bf4a311c" providerId="ADAL" clId="{5AF9E225-0E3D-4808-B523-40F6E9A1D59D}" dt="2023-03-02T08:35:52.991" v="2760" actId="478"/>
+          <ac:picMkLst>
+            <pc:docMk/>
+            <pc:sldMk cId="2118681498" sldId="289"/>
+            <ac:picMk id="7" creationId="{080BFE84-9981-5B49-533B-D646CBF01988}"/>
+          </ac:picMkLst>
+        </pc:picChg>
+      </pc:sldChg>
+      <pc:sldChg chg="addSp delSp modSp new mod modClrScheme chgLayout">
+        <pc:chgData name="Matthieu De Mari" userId="dfb708c9-d8dc-439f-9a3b-c772bf4a311c" providerId="ADAL" clId="{5AF9E225-0E3D-4808-B523-40F6E9A1D59D}" dt="2023-03-02T08:44:18.884" v="3062" actId="1036"/>
+        <pc:sldMkLst>
+          <pc:docMk/>
+          <pc:sldMk cId="2562857934" sldId="290"/>
+        </pc:sldMkLst>
+        <pc:spChg chg="mod ord">
+          <ac:chgData name="Matthieu De Mari" userId="dfb708c9-d8dc-439f-9a3b-c772bf4a311c" providerId="ADAL" clId="{5AF9E225-0E3D-4808-B523-40F6E9A1D59D}" dt="2023-03-02T08:42:02.491" v="3000" actId="700"/>
+          <ac:spMkLst>
+            <pc:docMk/>
+            <pc:sldMk cId="2562857934" sldId="290"/>
+            <ac:spMk id="2" creationId="{BCE0280D-E69E-AFD4-54DB-A0586F69E5B1}"/>
+          </ac:spMkLst>
+        </pc:spChg>
+        <pc:spChg chg="mod ord">
+          <ac:chgData name="Matthieu De Mari" userId="dfb708c9-d8dc-439f-9a3b-c772bf4a311c" providerId="ADAL" clId="{5AF9E225-0E3D-4808-B523-40F6E9A1D59D}" dt="2023-03-02T08:42:24.180" v="3008" actId="20577"/>
+          <ac:spMkLst>
+            <pc:docMk/>
+            <pc:sldMk cId="2562857934" sldId="290"/>
+            <ac:spMk id="3" creationId="{30506D83-108F-33EE-389E-86C33979129B}"/>
+          </ac:spMkLst>
+        </pc:spChg>
+        <pc:spChg chg="add del mod ord">
+          <ac:chgData name="Matthieu De Mari" userId="dfb708c9-d8dc-439f-9a3b-c772bf4a311c" providerId="ADAL" clId="{5AF9E225-0E3D-4808-B523-40F6E9A1D59D}" dt="2023-03-02T08:42:13.221" v="3005" actId="478"/>
+          <ac:spMkLst>
+            <pc:docMk/>
+            <pc:sldMk cId="2562857934" sldId="290"/>
+            <ac:spMk id="4" creationId="{428F5BFF-84CA-D49B-9A2E-E6F8DBB16F59}"/>
+          </ac:spMkLst>
+        </pc:spChg>
+        <pc:spChg chg="add del mod">
+          <ac:chgData name="Matthieu De Mari" userId="dfb708c9-d8dc-439f-9a3b-c772bf4a311c" providerId="ADAL" clId="{5AF9E225-0E3D-4808-B523-40F6E9A1D59D}" dt="2023-03-02T08:44:14.047" v="3056" actId="478"/>
+          <ac:spMkLst>
+            <pc:docMk/>
+            <pc:sldMk cId="2562857934" sldId="290"/>
+            <ac:spMk id="9" creationId="{E9B2B529-A121-72E0-AE95-1C3D84E20DB3}"/>
+          </ac:spMkLst>
+        </pc:spChg>
+        <pc:spChg chg="add mod">
+          <ac:chgData name="Matthieu De Mari" userId="dfb708c9-d8dc-439f-9a3b-c772bf4a311c" providerId="ADAL" clId="{5AF9E225-0E3D-4808-B523-40F6E9A1D59D}" dt="2023-03-02T08:44:18.884" v="3062" actId="1036"/>
+          <ac:spMkLst>
+            <pc:docMk/>
+            <pc:sldMk cId="2562857934" sldId="290"/>
+            <ac:spMk id="10" creationId="{7ED0F190-D3E4-F041-958D-F931C15664E6}"/>
+          </ac:spMkLst>
+        </pc:spChg>
+        <pc:picChg chg="add mod">
+          <ac:chgData name="Matthieu De Mari" userId="dfb708c9-d8dc-439f-9a3b-c772bf4a311c" providerId="ADAL" clId="{5AF9E225-0E3D-4808-B523-40F6E9A1D59D}" dt="2023-03-02T08:44:08.390" v="3054" actId="1038"/>
+          <ac:picMkLst>
+            <pc:docMk/>
+            <pc:sldMk cId="2562857934" sldId="290"/>
+            <ac:picMk id="6" creationId="{443F2A43-9B9A-30DD-287B-B34B57370886}"/>
+          </ac:picMkLst>
+        </pc:picChg>
+        <pc:picChg chg="add mod">
+          <ac:chgData name="Matthieu De Mari" userId="dfb708c9-d8dc-439f-9a3b-c772bf4a311c" providerId="ADAL" clId="{5AF9E225-0E3D-4808-B523-40F6E9A1D59D}" dt="2023-03-02T08:42:41.087" v="3013" actId="1076"/>
+          <ac:picMkLst>
+            <pc:docMk/>
+            <pc:sldMk cId="2562857934" sldId="290"/>
+            <ac:picMk id="8" creationId="{76B653B4-B1FF-34AB-F799-3C6DD7B2DB72}"/>
+          </ac:picMkLst>
+        </pc:picChg>
+      </pc:sldChg>
+      <pc:sldChg chg="delSp modSp add mod">
+        <pc:chgData name="Matthieu De Mari" userId="dfb708c9-d8dc-439f-9a3b-c772bf4a311c" providerId="ADAL" clId="{5AF9E225-0E3D-4808-B523-40F6E9A1D59D}" dt="2023-03-02T08:47:27.886" v="3225" actId="20577"/>
+        <pc:sldMkLst>
+          <pc:docMk/>
+          <pc:sldMk cId="3292482358" sldId="291"/>
+        </pc:sldMkLst>
+        <pc:spChg chg="mod">
+          <ac:chgData name="Matthieu De Mari" userId="dfb708c9-d8dc-439f-9a3b-c772bf4a311c" providerId="ADAL" clId="{5AF9E225-0E3D-4808-B523-40F6E9A1D59D}" dt="2023-03-02T08:47:27.886" v="3225" actId="20577"/>
+          <ac:spMkLst>
+            <pc:docMk/>
+            <pc:sldMk cId="3292482358" sldId="291"/>
+            <ac:spMk id="5" creationId="{DC5B08FF-7D05-A1F5-35B7-5B067BDD0835}"/>
+          </ac:spMkLst>
+        </pc:spChg>
+        <pc:picChg chg="del">
+          <ac:chgData name="Matthieu De Mari" userId="dfb708c9-d8dc-439f-9a3b-c772bf4a311c" providerId="ADAL" clId="{5AF9E225-0E3D-4808-B523-40F6E9A1D59D}" dt="2023-03-02T08:38:26.446" v="2896" actId="478"/>
+          <ac:picMkLst>
+            <pc:docMk/>
+            <pc:sldMk cId="3292482358" sldId="291"/>
+            <ac:picMk id="6" creationId="{B9B1F783-5C9B-1900-BC04-D7161A01A992}"/>
+          </ac:picMkLst>
+        </pc:picChg>
+      </pc:sldChg>
+      <pc:sldChg chg="addSp delSp modSp add mod">
+        <pc:chgData name="Matthieu De Mari" userId="dfb708c9-d8dc-439f-9a3b-c772bf4a311c" providerId="ADAL" clId="{5AF9E225-0E3D-4808-B523-40F6E9A1D59D}" dt="2023-03-02T08:44:21.897" v="3064"/>
+        <pc:sldMkLst>
+          <pc:docMk/>
+          <pc:sldMk cId="3520355124" sldId="292"/>
+        </pc:sldMkLst>
+        <pc:spChg chg="add del mod">
+          <ac:chgData name="Matthieu De Mari" userId="dfb708c9-d8dc-439f-9a3b-c772bf4a311c" providerId="ADAL" clId="{5AF9E225-0E3D-4808-B523-40F6E9A1D59D}" dt="2023-03-02T08:44:21.697" v="3063" actId="478"/>
+          <ac:spMkLst>
+            <pc:docMk/>
+            <pc:sldMk cId="3520355124" sldId="292"/>
+            <ac:spMk id="7" creationId="{59793ECA-8173-3D7A-F8AB-A7491EF717F7}"/>
+          </ac:spMkLst>
+        </pc:spChg>
+        <pc:spChg chg="add mod">
+          <ac:chgData name="Matthieu De Mari" userId="dfb708c9-d8dc-439f-9a3b-c772bf4a311c" providerId="ADAL" clId="{5AF9E225-0E3D-4808-B523-40F6E9A1D59D}" dt="2023-03-02T08:44:21.897" v="3064"/>
+          <ac:spMkLst>
+            <pc:docMk/>
+            <pc:sldMk cId="3520355124" sldId="292"/>
+            <ac:spMk id="9" creationId="{79D6F656-72E0-A2BA-03EB-373E523ACD6B}"/>
+          </ac:spMkLst>
+        </pc:spChg>
+        <pc:picChg chg="add mod">
+          <ac:chgData name="Matthieu De Mari" userId="dfb708c9-d8dc-439f-9a3b-c772bf4a311c" providerId="ADAL" clId="{5AF9E225-0E3D-4808-B523-40F6E9A1D59D}" dt="2023-03-02T08:43:31.904" v="3019" actId="1076"/>
+          <ac:picMkLst>
+            <pc:docMk/>
+            <pc:sldMk cId="3520355124" sldId="292"/>
+            <ac:picMk id="5" creationId="{D902306C-37FB-ECEE-99FA-743032E028F6}"/>
+          </ac:picMkLst>
+        </pc:picChg>
+        <pc:picChg chg="del">
+          <ac:chgData name="Matthieu De Mari" userId="dfb708c9-d8dc-439f-9a3b-c772bf4a311c" providerId="ADAL" clId="{5AF9E225-0E3D-4808-B523-40F6E9A1D59D}" dt="2023-03-02T08:43:25.131" v="3015" actId="478"/>
+          <ac:picMkLst>
+            <pc:docMk/>
+            <pc:sldMk cId="3520355124" sldId="292"/>
+            <ac:picMk id="6" creationId="{443F2A43-9B9A-30DD-287B-B34B57370886}"/>
+          </ac:picMkLst>
+        </pc:picChg>
+      </pc:sldChg>
+      <pc:sldChg chg="modSp new mod">
+        <pc:chgData name="Matthieu De Mari" userId="dfb708c9-d8dc-439f-9a3b-c772bf4a311c" providerId="ADAL" clId="{5AF9E225-0E3D-4808-B523-40F6E9A1D59D}" dt="2023-03-02T08:47:53.024" v="3226" actId="114"/>
+        <pc:sldMkLst>
+          <pc:docMk/>
+          <pc:sldMk cId="3046349634" sldId="293"/>
+        </pc:sldMkLst>
+        <pc:spChg chg="mod">
+          <ac:chgData name="Matthieu De Mari" userId="dfb708c9-d8dc-439f-9a3b-c772bf4a311c" providerId="ADAL" clId="{5AF9E225-0E3D-4808-B523-40F6E9A1D59D}" dt="2023-03-02T08:45:29.243" v="3125" actId="20577"/>
+          <ac:spMkLst>
+            <pc:docMk/>
+            <pc:sldMk cId="3046349634" sldId="293"/>
+            <ac:spMk id="2" creationId="{3BD544E6-22B2-D018-F02A-B886B1BC209B}"/>
+          </ac:spMkLst>
+        </pc:spChg>
+        <pc:spChg chg="mod">
+          <ac:chgData name="Matthieu De Mari" userId="dfb708c9-d8dc-439f-9a3b-c772bf4a311c" providerId="ADAL" clId="{5AF9E225-0E3D-4808-B523-40F6E9A1D59D}" dt="2023-03-02T08:47:53.024" v="3226" actId="114"/>
+          <ac:spMkLst>
+            <pc:docMk/>
+            <pc:sldMk cId="3046349634" sldId="293"/>
+            <ac:spMk id="3" creationId="{0B4790D0-53F9-363F-B6B5-FCCD143331AF}"/>
+          </ac:spMkLst>
+        </pc:spChg>
+      </pc:sldChg>
+      <pc:sldChg chg="modSp add mod">
+        <pc:chgData name="Matthieu De Mari" userId="dfb708c9-d8dc-439f-9a3b-c772bf4a311c" providerId="ADAL" clId="{5AF9E225-0E3D-4808-B523-40F6E9A1D59D}" dt="2023-03-02T09:04:46.904" v="4174" actId="27636"/>
+        <pc:sldMkLst>
+          <pc:docMk/>
+          <pc:sldMk cId="427136966" sldId="294"/>
+        </pc:sldMkLst>
+        <pc:spChg chg="mod">
+          <ac:chgData name="Matthieu De Mari" userId="dfb708c9-d8dc-439f-9a3b-c772bf4a311c" providerId="ADAL" clId="{5AF9E225-0E3D-4808-B523-40F6E9A1D59D}" dt="2023-03-02T08:49:12.400" v="3273" actId="20577"/>
+          <ac:spMkLst>
+            <pc:docMk/>
+            <pc:sldMk cId="427136966" sldId="294"/>
+            <ac:spMk id="2" creationId="{3BD544E6-22B2-D018-F02A-B886B1BC209B}"/>
+          </ac:spMkLst>
+        </pc:spChg>
+        <pc:spChg chg="mod">
+          <ac:chgData name="Matthieu De Mari" userId="dfb708c9-d8dc-439f-9a3b-c772bf4a311c" providerId="ADAL" clId="{5AF9E225-0E3D-4808-B523-40F6E9A1D59D}" dt="2023-03-02T09:04:46.904" v="4174" actId="27636"/>
+          <ac:spMkLst>
+            <pc:docMk/>
+            <pc:sldMk cId="427136966" sldId="294"/>
+            <ac:spMk id="3" creationId="{0B4790D0-53F9-363F-B6B5-FCCD143331AF}"/>
+          </ac:spMkLst>
+        </pc:spChg>
+      </pc:sldChg>
+      <pc:sldChg chg="addSp delSp modSp new mod modClrScheme chgLayout">
+        <pc:chgData name="Matthieu De Mari" userId="dfb708c9-d8dc-439f-9a3b-c772bf4a311c" providerId="ADAL" clId="{5AF9E225-0E3D-4808-B523-40F6E9A1D59D}" dt="2023-03-02T09:05:33.864" v="4216" actId="20577"/>
+        <pc:sldMkLst>
+          <pc:docMk/>
+          <pc:sldMk cId="323951598" sldId="295"/>
+        </pc:sldMkLst>
+        <pc:spChg chg="del mod ord">
+          <ac:chgData name="Matthieu De Mari" userId="dfb708c9-d8dc-439f-9a3b-c772bf4a311c" providerId="ADAL" clId="{5AF9E225-0E3D-4808-B523-40F6E9A1D59D}" dt="2023-03-02T08:50:53.075" v="3299" actId="700"/>
+          <ac:spMkLst>
+            <pc:docMk/>
+            <pc:sldMk cId="323951598" sldId="295"/>
+            <ac:spMk id="2" creationId="{DB628DF2-220C-014A-227A-AFCDA83BA19A}"/>
+          </ac:spMkLst>
+        </pc:spChg>
+        <pc:spChg chg="del mod ord">
+          <ac:chgData name="Matthieu De Mari" userId="dfb708c9-d8dc-439f-9a3b-c772bf4a311c" providerId="ADAL" clId="{5AF9E225-0E3D-4808-B523-40F6E9A1D59D}" dt="2023-03-02T08:50:53.075" v="3299" actId="700"/>
+          <ac:spMkLst>
+            <pc:docMk/>
+            <pc:sldMk cId="323951598" sldId="295"/>
+            <ac:spMk id="3" creationId="{F8F906A2-A4EE-7C99-5656-6C1167A2BFF8}"/>
+          </ac:spMkLst>
+        </pc:spChg>
+        <pc:spChg chg="del">
+          <ac:chgData name="Matthieu De Mari" userId="dfb708c9-d8dc-439f-9a3b-c772bf4a311c" providerId="ADAL" clId="{5AF9E225-0E3D-4808-B523-40F6E9A1D59D}" dt="2023-03-02T08:50:53.075" v="3299" actId="700"/>
+          <ac:spMkLst>
+            <pc:docMk/>
+            <pc:sldMk cId="323951598" sldId="295"/>
+            <ac:spMk id="4" creationId="{AD936443-007E-F3D4-CBCF-09B865B5A94B}"/>
+          </ac:spMkLst>
+        </pc:spChg>
+        <pc:spChg chg="add mod ord">
+          <ac:chgData name="Matthieu De Mari" userId="dfb708c9-d8dc-439f-9a3b-c772bf4a311c" providerId="ADAL" clId="{5AF9E225-0E3D-4808-B523-40F6E9A1D59D}" dt="2023-03-02T08:52:46.848" v="3375" actId="20577"/>
+          <ac:spMkLst>
+            <pc:docMk/>
+            <pc:sldMk cId="323951598" sldId="295"/>
+            <ac:spMk id="5" creationId="{612AEEA9-41B6-ED03-6C32-23B2219F119B}"/>
+          </ac:spMkLst>
+        </pc:spChg>
+        <pc:spChg chg="add mod ord">
+          <ac:chgData name="Matthieu De Mari" userId="dfb708c9-d8dc-439f-9a3b-c772bf4a311c" providerId="ADAL" clId="{5AF9E225-0E3D-4808-B523-40F6E9A1D59D}" dt="2023-03-02T09:05:33.864" v="4216" actId="20577"/>
+          <ac:spMkLst>
+            <pc:docMk/>
+            <pc:sldMk cId="323951598" sldId="295"/>
+            <ac:spMk id="6" creationId="{59E73361-8759-0080-17AE-8FB69DE2B9FF}"/>
+          </ac:spMkLst>
+        </pc:spChg>
+      </pc:sldChg>
+      <pc:sldChg chg="addSp delSp modSp new mod modClrScheme chgLayout">
+        <pc:chgData name="Matthieu De Mari" userId="dfb708c9-d8dc-439f-9a3b-c772bf4a311c" providerId="ADAL" clId="{5AF9E225-0E3D-4808-B523-40F6E9A1D59D}" dt="2023-03-02T09:06:28.328" v="4228" actId="20577"/>
+        <pc:sldMkLst>
+          <pc:docMk/>
+          <pc:sldMk cId="1855779909" sldId="296"/>
+        </pc:sldMkLst>
+        <pc:spChg chg="del mod ord">
+          <ac:chgData name="Matthieu De Mari" userId="dfb708c9-d8dc-439f-9a3b-c772bf4a311c" providerId="ADAL" clId="{5AF9E225-0E3D-4808-B523-40F6E9A1D59D}" dt="2023-03-02T08:51:35.309" v="3321" actId="700"/>
+          <ac:spMkLst>
+            <pc:docMk/>
+            <pc:sldMk cId="1855779909" sldId="296"/>
+            <ac:spMk id="2" creationId="{E999589A-FBC7-ED2C-F0E6-CAC4138FA6F3}"/>
+          </ac:spMkLst>
+        </pc:spChg>
+        <pc:spChg chg="mod ord">
+          <ac:chgData name="Matthieu De Mari" userId="dfb708c9-d8dc-439f-9a3b-c772bf4a311c" providerId="ADAL" clId="{5AF9E225-0E3D-4808-B523-40F6E9A1D59D}" dt="2023-03-02T09:06:28.328" v="4228" actId="20577"/>
+          <ac:spMkLst>
+            <pc:docMk/>
+            <pc:sldMk cId="1855779909" sldId="296"/>
+            <ac:spMk id="3" creationId="{2AA71324-43A9-3773-A9F6-00EC1B6AE4B5}"/>
+          </ac:spMkLst>
+        </pc:spChg>
+        <pc:spChg chg="del mod">
+          <ac:chgData name="Matthieu De Mari" userId="dfb708c9-d8dc-439f-9a3b-c772bf4a311c" providerId="ADAL" clId="{5AF9E225-0E3D-4808-B523-40F6E9A1D59D}" dt="2023-03-02T08:51:35.309" v="3321" actId="700"/>
+          <ac:spMkLst>
+            <pc:docMk/>
+            <pc:sldMk cId="1855779909" sldId="296"/>
+            <ac:spMk id="4" creationId="{BE8E1445-FAEE-DA2A-EC42-9250F7E19885}"/>
+          </ac:spMkLst>
+        </pc:spChg>
+        <pc:spChg chg="add mod ord">
+          <ac:chgData name="Matthieu De Mari" userId="dfb708c9-d8dc-439f-9a3b-c772bf4a311c" providerId="ADAL" clId="{5AF9E225-0E3D-4808-B523-40F6E9A1D59D}" dt="2023-03-02T09:04:20.369" v="4159" actId="20577"/>
+          <ac:spMkLst>
+            <pc:docMk/>
+            <pc:sldMk cId="1855779909" sldId="296"/>
+            <ac:spMk id="5" creationId="{099CC6C1-BA31-E246-8AF2-1BFB1D218A2D}"/>
+          </ac:spMkLst>
+        </pc:spChg>
+      </pc:sldChg>
+      <pc:sldChg chg="modSp add mod">
+        <pc:chgData name="Matthieu De Mari" userId="dfb708c9-d8dc-439f-9a3b-c772bf4a311c" providerId="ADAL" clId="{5AF9E225-0E3D-4808-B523-40F6E9A1D59D}" dt="2023-03-02T08:56:04.515" v="3607" actId="20577"/>
+        <pc:sldMkLst>
+          <pc:docMk/>
+          <pc:sldMk cId="1514077654" sldId="297"/>
+        </pc:sldMkLst>
+        <pc:spChg chg="mod">
+          <ac:chgData name="Matthieu De Mari" userId="dfb708c9-d8dc-439f-9a3b-c772bf4a311c" providerId="ADAL" clId="{5AF9E225-0E3D-4808-B523-40F6E9A1D59D}" dt="2023-03-02T08:55:17.286" v="3543" actId="20577"/>
+          <ac:spMkLst>
+            <pc:docMk/>
+            <pc:sldMk cId="1514077654" sldId="297"/>
+            <ac:spMk id="5" creationId="{612AEEA9-41B6-ED03-6C32-23B2219F119B}"/>
+          </ac:spMkLst>
+        </pc:spChg>
+        <pc:spChg chg="mod">
+          <ac:chgData name="Matthieu De Mari" userId="dfb708c9-d8dc-439f-9a3b-c772bf4a311c" providerId="ADAL" clId="{5AF9E225-0E3D-4808-B523-40F6E9A1D59D}" dt="2023-03-02T08:56:04.515" v="3607" actId="20577"/>
+          <ac:spMkLst>
+            <pc:docMk/>
+            <pc:sldMk cId="1514077654" sldId="297"/>
+            <ac:spMk id="6" creationId="{59E73361-8759-0080-17AE-8FB69DE2B9FF}"/>
+          </ac:spMkLst>
+        </pc:spChg>
+      </pc:sldChg>
+      <pc:sldChg chg="modSp new mod">
+        <pc:chgData name="Matthieu De Mari" userId="dfb708c9-d8dc-439f-9a3b-c772bf4a311c" providerId="ADAL" clId="{5AF9E225-0E3D-4808-B523-40F6E9A1D59D}" dt="2023-03-02T08:56:36.889" v="3652" actId="14100"/>
+        <pc:sldMkLst>
+          <pc:docMk/>
+          <pc:sldMk cId="2514894683" sldId="298"/>
+        </pc:sldMkLst>
+        <pc:spChg chg="mod">
+          <ac:chgData name="Matthieu De Mari" userId="dfb708c9-d8dc-439f-9a3b-c772bf4a311c" providerId="ADAL" clId="{5AF9E225-0E3D-4808-B523-40F6E9A1D59D}" dt="2023-03-02T08:55:24.262" v="3557" actId="20577"/>
+          <ac:spMkLst>
+            <pc:docMk/>
+            <pc:sldMk cId="2514894683" sldId="298"/>
+            <ac:spMk id="2" creationId="{B7D73546-6348-08E1-9138-D596DEE29A4C}"/>
+          </ac:spMkLst>
+        </pc:spChg>
+        <pc:spChg chg="mod">
+          <ac:chgData name="Matthieu De Mari" userId="dfb708c9-d8dc-439f-9a3b-c772bf4a311c" providerId="ADAL" clId="{5AF9E225-0E3D-4808-B523-40F6E9A1D59D}" dt="2023-03-02T08:56:36.889" v="3652" actId="14100"/>
+          <ac:spMkLst>
+            <pc:docMk/>
+            <pc:sldMk cId="2514894683" sldId="298"/>
+            <ac:spMk id="3" creationId="{56048AC0-FB9F-12B1-4F29-670572903CBF}"/>
+          </ac:spMkLst>
+        </pc:spChg>
+      </pc:sldChg>
+      <pc:sldChg chg="addSp delSp modSp new mod">
+        <pc:chgData name="Matthieu De Mari" userId="dfb708c9-d8dc-439f-9a3b-c772bf4a311c" providerId="ADAL" clId="{5AF9E225-0E3D-4808-B523-40F6E9A1D59D}" dt="2023-03-02T08:59:30.392" v="3889" actId="21"/>
+        <pc:sldMkLst>
+          <pc:docMk/>
+          <pc:sldMk cId="1452574487" sldId="299"/>
+        </pc:sldMkLst>
+        <pc:spChg chg="mod">
+          <ac:chgData name="Matthieu De Mari" userId="dfb708c9-d8dc-439f-9a3b-c772bf4a311c" providerId="ADAL" clId="{5AF9E225-0E3D-4808-B523-40F6E9A1D59D}" dt="2023-03-02T08:56:43.413" v="3669" actId="20577"/>
+          <ac:spMkLst>
+            <pc:docMk/>
+            <pc:sldMk cId="1452574487" sldId="299"/>
+            <ac:spMk id="2" creationId="{6C228B34-D86C-5095-EA4A-9B10343FA620}"/>
+          </ac:spMkLst>
+        </pc:spChg>
+        <pc:spChg chg="mod">
+          <ac:chgData name="Matthieu De Mari" userId="dfb708c9-d8dc-439f-9a3b-c772bf4a311c" providerId="ADAL" clId="{5AF9E225-0E3D-4808-B523-40F6E9A1D59D}" dt="2023-03-02T08:59:28.252" v="3888"/>
+          <ac:spMkLst>
+            <pc:docMk/>
+            <pc:sldMk cId="1452574487" sldId="299"/>
+            <ac:spMk id="3" creationId="{C7C49193-D5B6-610B-EEA3-E2A025BD75D6}"/>
+          </ac:spMkLst>
+        </pc:spChg>
+        <pc:picChg chg="add del">
+          <ac:chgData name="Matthieu De Mari" userId="dfb708c9-d8dc-439f-9a3b-c772bf4a311c" providerId="ADAL" clId="{5AF9E225-0E3D-4808-B523-40F6E9A1D59D}" dt="2023-03-02T08:59:30.392" v="3889" actId="21"/>
+          <ac:picMkLst>
+            <pc:docMk/>
+            <pc:sldMk cId="1452574487" sldId="299"/>
+            <ac:picMk id="5" creationId="{FD51391D-B5FC-9A86-227B-0A7DF7CB378F}"/>
+          </ac:picMkLst>
+        </pc:picChg>
+      </pc:sldChg>
+      <pc:sldChg chg="addSp delSp modSp add mod modClrScheme chgLayout">
+        <pc:chgData name="Matthieu De Mari" userId="dfb708c9-d8dc-439f-9a3b-c772bf4a311c" providerId="ADAL" clId="{5AF9E225-0E3D-4808-B523-40F6E9A1D59D}" dt="2023-03-02T09:03:33.636" v="4087" actId="20577"/>
+        <pc:sldMkLst>
+          <pc:docMk/>
+          <pc:sldMk cId="1699114457" sldId="300"/>
+        </pc:sldMkLst>
+        <pc:spChg chg="add del mod ord">
+          <ac:chgData name="Matthieu De Mari" userId="dfb708c9-d8dc-439f-9a3b-c772bf4a311c" providerId="ADAL" clId="{5AF9E225-0E3D-4808-B523-40F6E9A1D59D}" dt="2023-03-02T09:02:30.185" v="4010" actId="478"/>
+          <ac:spMkLst>
+            <pc:docMk/>
+            <pc:sldMk cId="1699114457" sldId="300"/>
+            <ac:spMk id="2" creationId="{B43CB63D-D1F8-4E1D-F2D1-F72202E9AC6B}"/>
+          </ac:spMkLst>
+        </pc:spChg>
+        <pc:spChg chg="mod ord">
+          <ac:chgData name="Matthieu De Mari" userId="dfb708c9-d8dc-439f-9a3b-c772bf4a311c" providerId="ADAL" clId="{5AF9E225-0E3D-4808-B523-40F6E9A1D59D}" dt="2023-03-02T09:01:57.080" v="3970" actId="700"/>
+          <ac:spMkLst>
+            <pc:docMk/>
+            <pc:sldMk cId="1699114457" sldId="300"/>
+            <ac:spMk id="5" creationId="{612AEEA9-41B6-ED03-6C32-23B2219F119B}"/>
+          </ac:spMkLst>
+        </pc:spChg>
+        <pc:spChg chg="mod ord">
+          <ac:chgData name="Matthieu De Mari" userId="dfb708c9-d8dc-439f-9a3b-c772bf4a311c" providerId="ADAL" clId="{5AF9E225-0E3D-4808-B523-40F6E9A1D59D}" dt="2023-03-02T09:03:33.636" v="4087" actId="20577"/>
+          <ac:spMkLst>
+            <pc:docMk/>
+            <pc:sldMk cId="1699114457" sldId="300"/>
+            <ac:spMk id="6" creationId="{59E73361-8759-0080-17AE-8FB69DE2B9FF}"/>
+          </ac:spMkLst>
+        </pc:spChg>
+        <pc:picChg chg="add mod">
+          <ac:chgData name="Matthieu De Mari" userId="dfb708c9-d8dc-439f-9a3b-c772bf4a311c" providerId="ADAL" clId="{5AF9E225-0E3D-4808-B523-40F6E9A1D59D}" dt="2023-03-02T09:03:14.022" v="4014" actId="1076"/>
+          <ac:picMkLst>
+            <pc:docMk/>
+            <pc:sldMk cId="1699114457" sldId="300"/>
+            <ac:picMk id="4" creationId="{1C1CB572-15DF-A789-FAEA-D70859E67A0E}"/>
+          </ac:picMkLst>
+        </pc:picChg>
+      </pc:sldChg>
+      <pc:sldChg chg="addSp delSp modSp add mod modClrScheme chgLayout">
+        <pc:chgData name="Matthieu De Mari" userId="dfb708c9-d8dc-439f-9a3b-c772bf4a311c" providerId="ADAL" clId="{5AF9E225-0E3D-4808-B523-40F6E9A1D59D}" dt="2023-03-02T09:03:43.897" v="4104" actId="20577"/>
+        <pc:sldMkLst>
+          <pc:docMk/>
+          <pc:sldMk cId="1276239023" sldId="301"/>
+        </pc:sldMkLst>
+        <pc:spChg chg="mod ord">
+          <ac:chgData name="Matthieu De Mari" userId="dfb708c9-d8dc-439f-9a3b-c772bf4a311c" providerId="ADAL" clId="{5AF9E225-0E3D-4808-B523-40F6E9A1D59D}" dt="2023-03-02T09:00:45.091" v="3955" actId="700"/>
+          <ac:spMkLst>
+            <pc:docMk/>
+            <pc:sldMk cId="1276239023" sldId="301"/>
+            <ac:spMk id="2" creationId="{B7D73546-6348-08E1-9138-D596DEE29A4C}"/>
+          </ac:spMkLst>
+        </pc:spChg>
+        <pc:spChg chg="mod ord">
+          <ac:chgData name="Matthieu De Mari" userId="dfb708c9-d8dc-439f-9a3b-c772bf4a311c" providerId="ADAL" clId="{5AF9E225-0E3D-4808-B523-40F6E9A1D59D}" dt="2023-03-02T09:03:43.897" v="4104" actId="20577"/>
+          <ac:spMkLst>
+            <pc:docMk/>
+            <pc:sldMk cId="1276239023" sldId="301"/>
+            <ac:spMk id="3" creationId="{56048AC0-FB9F-12B1-4F29-670572903CBF}"/>
+          </ac:spMkLst>
+        </pc:spChg>
+        <pc:spChg chg="add del mod ord">
+          <ac:chgData name="Matthieu De Mari" userId="dfb708c9-d8dc-439f-9a3b-c772bf4a311c" providerId="ADAL" clId="{5AF9E225-0E3D-4808-B523-40F6E9A1D59D}" dt="2023-03-02T09:01:03.993" v="3965" actId="478"/>
+          <ac:spMkLst>
+            <pc:docMk/>
+            <pc:sldMk cId="1276239023" sldId="301"/>
+            <ac:spMk id="4" creationId="{EE4FAF28-634E-901F-1BF2-0D02218F64F6}"/>
+          </ac:spMkLst>
+        </pc:spChg>
+        <pc:picChg chg="add mod">
+          <ac:chgData name="Matthieu De Mari" userId="dfb708c9-d8dc-439f-9a3b-c772bf4a311c" providerId="ADAL" clId="{5AF9E225-0E3D-4808-B523-40F6E9A1D59D}" dt="2023-03-02T09:01:42.639" v="3969" actId="1076"/>
+          <ac:picMkLst>
+            <pc:docMk/>
+            <pc:sldMk cId="1276239023" sldId="301"/>
+            <ac:picMk id="6" creationId="{B268E989-9B7A-B232-3315-31834458E4CF}"/>
+          </ac:picMkLst>
+        </pc:picChg>
+      </pc:sldChg>
+      <pc:sldChg chg="addSp delSp modSp add mod modClrScheme chgLayout">
+        <pc:chgData name="Matthieu De Mari" userId="dfb708c9-d8dc-439f-9a3b-c772bf4a311c" providerId="ADAL" clId="{5AF9E225-0E3D-4808-B523-40F6E9A1D59D}" dt="2023-03-02T09:04:08.494" v="4134" actId="20577"/>
+        <pc:sldMkLst>
+          <pc:docMk/>
+          <pc:sldMk cId="3968924669" sldId="302"/>
+        </pc:sldMkLst>
+        <pc:spChg chg="mod ord">
+          <ac:chgData name="Matthieu De Mari" userId="dfb708c9-d8dc-439f-9a3b-c772bf4a311c" providerId="ADAL" clId="{5AF9E225-0E3D-4808-B523-40F6E9A1D59D}" dt="2023-03-02T08:59:53.356" v="3893" actId="700"/>
+          <ac:spMkLst>
+            <pc:docMk/>
+            <pc:sldMk cId="3968924669" sldId="302"/>
+            <ac:spMk id="2" creationId="{6C228B34-D86C-5095-EA4A-9B10343FA620}"/>
+          </ac:spMkLst>
+        </pc:spChg>
+        <pc:spChg chg="mod ord">
+          <ac:chgData name="Matthieu De Mari" userId="dfb708c9-d8dc-439f-9a3b-c772bf4a311c" providerId="ADAL" clId="{5AF9E225-0E3D-4808-B523-40F6E9A1D59D}" dt="2023-03-02T09:04:08.494" v="4134" actId="20577"/>
+          <ac:spMkLst>
+            <pc:docMk/>
+            <pc:sldMk cId="3968924669" sldId="302"/>
+            <ac:spMk id="3" creationId="{C7C49193-D5B6-610B-EEA3-E2A025BD75D6}"/>
+          </ac:spMkLst>
+        </pc:spChg>
+        <pc:spChg chg="add del mod ord">
+          <ac:chgData name="Matthieu De Mari" userId="dfb708c9-d8dc-439f-9a3b-c772bf4a311c" providerId="ADAL" clId="{5AF9E225-0E3D-4808-B523-40F6E9A1D59D}" dt="2023-03-02T08:59:58.873" v="3899" actId="478"/>
+          <ac:spMkLst>
+            <pc:docMk/>
+            <pc:sldMk cId="3968924669" sldId="302"/>
+            <ac:spMk id="4" creationId="{90B548F9-A663-2056-5AD0-BDC679C9C01E}"/>
+          </ac:spMkLst>
+        </pc:spChg>
+        <pc:picChg chg="add mod">
+          <ac:chgData name="Matthieu De Mari" userId="dfb708c9-d8dc-439f-9a3b-c772bf4a311c" providerId="ADAL" clId="{5AF9E225-0E3D-4808-B523-40F6E9A1D59D}" dt="2023-03-02T09:00:03.657" v="3903" actId="1076"/>
+          <ac:picMkLst>
+            <pc:docMk/>
+            <pc:sldMk cId="3968924669" sldId="302"/>
+            <ac:picMk id="5" creationId="{608741EA-45BF-0A5E-D113-B97931DDBA08}"/>
+          </ac:picMkLst>
+        </pc:picChg>
+      </pc:sldChg>
+      <pc:sldChg chg="modSp new mod">
+        <pc:chgData name="Matthieu De Mari" userId="dfb708c9-d8dc-439f-9a3b-c772bf4a311c" providerId="ADAL" clId="{5AF9E225-0E3D-4808-B523-40F6E9A1D59D}" dt="2023-03-02T09:09:23.148" v="4269" actId="113"/>
+        <pc:sldMkLst>
+          <pc:docMk/>
+          <pc:sldMk cId="4232115997" sldId="303"/>
+        </pc:sldMkLst>
+        <pc:spChg chg="mod">
+          <ac:chgData name="Matthieu De Mari" userId="dfb708c9-d8dc-439f-9a3b-c772bf4a311c" providerId="ADAL" clId="{5AF9E225-0E3D-4808-B523-40F6E9A1D59D}" dt="2023-03-02T09:07:07.544" v="4240" actId="20577"/>
+          <ac:spMkLst>
+            <pc:docMk/>
+            <pc:sldMk cId="4232115997" sldId="303"/>
+            <ac:spMk id="2" creationId="{508FB456-9B7D-F6FA-8CFF-A89108724F4A}"/>
+          </ac:spMkLst>
+        </pc:spChg>
+        <pc:spChg chg="mod">
+          <ac:chgData name="Matthieu De Mari" userId="dfb708c9-d8dc-439f-9a3b-c772bf4a311c" providerId="ADAL" clId="{5AF9E225-0E3D-4808-B523-40F6E9A1D59D}" dt="2023-03-02T09:09:23.148" v="4269" actId="113"/>
+          <ac:spMkLst>
+            <pc:docMk/>
+            <pc:sldMk cId="4232115997" sldId="303"/>
+            <ac:spMk id="3" creationId="{60ECB68E-5BF7-D3CC-11B5-DA1468BBE623}"/>
+          </ac:spMkLst>
+        </pc:spChg>
+      </pc:sldChg>
+      <pc:sldChg chg="modSp add mod">
+        <pc:chgData name="Matthieu De Mari" userId="dfb708c9-d8dc-439f-9a3b-c772bf4a311c" providerId="ADAL" clId="{5AF9E225-0E3D-4808-B523-40F6E9A1D59D}" dt="2023-03-02T09:06:47.611" v="4234" actId="20577"/>
+        <pc:sldMkLst>
+          <pc:docMk/>
+          <pc:sldMk cId="354883896" sldId="304"/>
+        </pc:sldMkLst>
+        <pc:spChg chg="mod">
+          <ac:chgData name="Matthieu De Mari" userId="dfb708c9-d8dc-439f-9a3b-c772bf4a311c" providerId="ADAL" clId="{5AF9E225-0E3D-4808-B523-40F6E9A1D59D}" dt="2023-03-02T09:06:47.611" v="4234" actId="20577"/>
+          <ac:spMkLst>
+            <pc:docMk/>
+            <pc:sldMk cId="354883896" sldId="304"/>
+            <ac:spMk id="5" creationId="{2B13EA12-F42E-A14F-570D-C7B3FB0BA678}"/>
+          </ac:spMkLst>
+        </pc:spChg>
+      </pc:sldChg>
+      <pc:sldChg chg="modSp add mod">
+        <pc:chgData name="Matthieu De Mari" userId="dfb708c9-d8dc-439f-9a3b-c772bf4a311c" providerId="ADAL" clId="{5AF9E225-0E3D-4808-B523-40F6E9A1D59D}" dt="2023-03-02T09:10:35.361" v="4304" actId="27636"/>
+        <pc:sldMkLst>
+          <pc:docMk/>
+          <pc:sldMk cId="4099824996" sldId="305"/>
+        </pc:sldMkLst>
+        <pc:spChg chg="mod">
+          <ac:chgData name="Matthieu De Mari" userId="dfb708c9-d8dc-439f-9a3b-c772bf4a311c" providerId="ADAL" clId="{5AF9E225-0E3D-4808-B523-40F6E9A1D59D}" dt="2023-03-02T09:10:35.361" v="4304" actId="27636"/>
+          <ac:spMkLst>
+            <pc:docMk/>
+            <pc:sldMk cId="4099824996" sldId="305"/>
+            <ac:spMk id="3" creationId="{60ECB68E-5BF7-D3CC-11B5-DA1468BBE623}"/>
+          </ac:spMkLst>
+        </pc:spChg>
+      </pc:sldChg>
+      <pc:sldChg chg="modSp add mod">
+        <pc:chgData name="Matthieu De Mari" userId="dfb708c9-d8dc-439f-9a3b-c772bf4a311c" providerId="ADAL" clId="{5AF9E225-0E3D-4808-B523-40F6E9A1D59D}" dt="2023-03-02T09:09:27.720" v="4270" actId="207"/>
+        <pc:sldMkLst>
+          <pc:docMk/>
+          <pc:sldMk cId="4051912021" sldId="306"/>
+        </pc:sldMkLst>
+        <pc:spChg chg="mod">
+          <ac:chgData name="Matthieu De Mari" userId="dfb708c9-d8dc-439f-9a3b-c772bf4a311c" providerId="ADAL" clId="{5AF9E225-0E3D-4808-B523-40F6E9A1D59D}" dt="2023-03-02T09:09:27.720" v="4270" actId="207"/>
+          <ac:spMkLst>
+            <pc:docMk/>
+            <pc:sldMk cId="4051912021" sldId="306"/>
+            <ac:spMk id="3" creationId="{60ECB68E-5BF7-D3CC-11B5-DA1468BBE623}"/>
+          </ac:spMkLst>
+        </pc:spChg>
+      </pc:sldChg>
+      <pc:sldChg chg="modSp add mod">
+        <pc:chgData name="Matthieu De Mari" userId="dfb708c9-d8dc-439f-9a3b-c772bf4a311c" providerId="ADAL" clId="{5AF9E225-0E3D-4808-B523-40F6E9A1D59D}" dt="2023-03-02T09:11:43.126" v="4415" actId="20577"/>
+        <pc:sldMkLst>
+          <pc:docMk/>
+          <pc:sldMk cId="2900176786" sldId="307"/>
+        </pc:sldMkLst>
+        <pc:spChg chg="mod">
+          <ac:chgData name="Matthieu De Mari" userId="dfb708c9-d8dc-439f-9a3b-c772bf4a311c" providerId="ADAL" clId="{5AF9E225-0E3D-4808-B523-40F6E9A1D59D}" dt="2023-03-02T09:11:43.126" v="4415" actId="20577"/>
+          <ac:spMkLst>
+            <pc:docMk/>
+            <pc:sldMk cId="2900176786" sldId="307"/>
+            <ac:spMk id="3" creationId="{60ECB68E-5BF7-D3CC-11B5-DA1468BBE623}"/>
+          </ac:spMkLst>
+        </pc:spChg>
+      </pc:sldChg>
+      <pc:sldChg chg="modSp add mod">
+        <pc:chgData name="Matthieu De Mari" userId="dfb708c9-d8dc-439f-9a3b-c772bf4a311c" providerId="ADAL" clId="{5AF9E225-0E3D-4808-B523-40F6E9A1D59D}" dt="2023-03-02T09:10:43.209" v="4307" actId="207"/>
+        <pc:sldMkLst>
+          <pc:docMk/>
+          <pc:sldMk cId="1601297533" sldId="308"/>
+        </pc:sldMkLst>
+        <pc:spChg chg="mod">
+          <ac:chgData name="Matthieu De Mari" userId="dfb708c9-d8dc-439f-9a3b-c772bf4a311c" providerId="ADAL" clId="{5AF9E225-0E3D-4808-B523-40F6E9A1D59D}" dt="2023-03-02T09:10:43.209" v="4307" actId="207"/>
+          <ac:spMkLst>
+            <pc:docMk/>
+            <pc:sldMk cId="1601297533" sldId="308"/>
+            <ac:spMk id="3" creationId="{60ECB68E-5BF7-D3CC-11B5-DA1468BBE623}"/>
+          </ac:spMkLst>
+        </pc:spChg>
+      </pc:sldChg>
+      <pc:sldChg chg="modSp add mod ord">
+        <pc:chgData name="Matthieu De Mari" userId="dfb708c9-d8dc-439f-9a3b-c772bf4a311c" providerId="ADAL" clId="{5AF9E225-0E3D-4808-B523-40F6E9A1D59D}" dt="2023-03-02T09:20:16.513" v="4645"/>
+        <pc:sldMkLst>
+          <pc:docMk/>
+          <pc:sldMk cId="3331075550" sldId="309"/>
+        </pc:sldMkLst>
+        <pc:spChg chg="mod">
+          <ac:chgData name="Matthieu De Mari" userId="dfb708c9-d8dc-439f-9a3b-c772bf4a311c" providerId="ADAL" clId="{5AF9E225-0E3D-4808-B523-40F6E9A1D59D}" dt="2023-03-02T09:13:45.782" v="4477"/>
+          <ac:spMkLst>
+            <pc:docMk/>
+            <pc:sldMk cId="3331075550" sldId="309"/>
+            <ac:spMk id="3" creationId="{60ECB68E-5BF7-D3CC-11B5-DA1468BBE623}"/>
+          </ac:spMkLst>
+        </pc:spChg>
+      </pc:sldChg>
+      <pc:sldChg chg="modSp add mod">
+        <pc:chgData name="Matthieu De Mari" userId="dfb708c9-d8dc-439f-9a3b-c772bf4a311c" providerId="ADAL" clId="{5AF9E225-0E3D-4808-B523-40F6E9A1D59D}" dt="2023-03-02T09:13:28.270" v="4475" actId="20577"/>
+        <pc:sldMkLst>
+          <pc:docMk/>
+          <pc:sldMk cId="4251184714" sldId="310"/>
+        </pc:sldMkLst>
+        <pc:spChg chg="mod">
+          <ac:chgData name="Matthieu De Mari" userId="dfb708c9-d8dc-439f-9a3b-c772bf4a311c" providerId="ADAL" clId="{5AF9E225-0E3D-4808-B523-40F6E9A1D59D}" dt="2023-03-02T09:13:28.270" v="4475" actId="20577"/>
+          <ac:spMkLst>
+            <pc:docMk/>
+            <pc:sldMk cId="4251184714" sldId="310"/>
+            <ac:spMk id="3" creationId="{60ECB68E-5BF7-D3CC-11B5-DA1468BBE623}"/>
+          </ac:spMkLst>
+        </pc:spChg>
+      </pc:sldChg>
+      <pc:sldChg chg="modSp add mod ord">
+        <pc:chgData name="Matthieu De Mari" userId="dfb708c9-d8dc-439f-9a3b-c772bf4a311c" providerId="ADAL" clId="{5AF9E225-0E3D-4808-B523-40F6E9A1D59D}" dt="2023-03-02T09:20:16.513" v="4645"/>
+        <pc:sldMkLst>
+          <pc:docMk/>
+          <pc:sldMk cId="3629183510" sldId="311"/>
+        </pc:sldMkLst>
+        <pc:spChg chg="mod">
+          <ac:chgData name="Matthieu De Mari" userId="dfb708c9-d8dc-439f-9a3b-c772bf4a311c" providerId="ADAL" clId="{5AF9E225-0E3D-4808-B523-40F6E9A1D59D}" dt="2023-03-02T09:13:49.894" v="4479"/>
+          <ac:spMkLst>
+            <pc:docMk/>
+            <pc:sldMk cId="3629183510" sldId="311"/>
+            <ac:spMk id="3" creationId="{60ECB68E-5BF7-D3CC-11B5-DA1468BBE623}"/>
+          </ac:spMkLst>
+        </pc:spChg>
+      </pc:sldChg>
+      <pc:sldChg chg="modSp add mod">
+        <pc:chgData name="Matthieu De Mari" userId="dfb708c9-d8dc-439f-9a3b-c772bf4a311c" providerId="ADAL" clId="{5AF9E225-0E3D-4808-B523-40F6E9A1D59D}" dt="2023-03-02T09:14:09.472" v="4486" actId="207"/>
+        <pc:sldMkLst>
+          <pc:docMk/>
+          <pc:sldMk cId="7996884" sldId="312"/>
+        </pc:sldMkLst>
+        <pc:spChg chg="mod">
+          <ac:chgData name="Matthieu De Mari" userId="dfb708c9-d8dc-439f-9a3b-c772bf4a311c" providerId="ADAL" clId="{5AF9E225-0E3D-4808-B523-40F6E9A1D59D}" dt="2023-03-02T09:14:09.472" v="4486" actId="207"/>
+          <ac:spMkLst>
+            <pc:docMk/>
+            <pc:sldMk cId="7996884" sldId="312"/>
+            <ac:spMk id="3" creationId="{60ECB68E-5BF7-D3CC-11B5-DA1468BBE623}"/>
+          </ac:spMkLst>
+        </pc:spChg>
+      </pc:sldChg>
+      <pc:sldChg chg="add">
+        <pc:chgData name="Matthieu De Mari" userId="dfb708c9-d8dc-439f-9a3b-c772bf4a311c" providerId="ADAL" clId="{5AF9E225-0E3D-4808-B523-40F6E9A1D59D}" dt="2023-03-02T09:14:04.028" v="4484" actId="2890"/>
+        <pc:sldMkLst>
+          <pc:docMk/>
+          <pc:sldMk cId="1140638742" sldId="313"/>
+        </pc:sldMkLst>
+      </pc:sldChg>
+      <pc:sldChg chg="modSp new mod">
+        <pc:chgData name="Matthieu De Mari" userId="dfb708c9-d8dc-439f-9a3b-c772bf4a311c" providerId="ADAL" clId="{5AF9E225-0E3D-4808-B523-40F6E9A1D59D}" dt="2023-03-02T09:19:43.572" v="4643" actId="20577"/>
+        <pc:sldMkLst>
+          <pc:docMk/>
+          <pc:sldMk cId="2858358615" sldId="314"/>
+        </pc:sldMkLst>
+        <pc:spChg chg="mod">
+          <ac:chgData name="Matthieu De Mari" userId="dfb708c9-d8dc-439f-9a3b-c772bf4a311c" providerId="ADAL" clId="{5AF9E225-0E3D-4808-B523-40F6E9A1D59D}" dt="2023-03-02T09:15:03.737" v="4518" actId="20577"/>
+          <ac:spMkLst>
+            <pc:docMk/>
+            <pc:sldMk cId="2858358615" sldId="314"/>
+            <ac:spMk id="2" creationId="{8D13B38D-6896-4496-58F6-35E02213C6ED}"/>
+          </ac:spMkLst>
+        </pc:spChg>
+        <pc:spChg chg="mod">
+          <ac:chgData name="Matthieu De Mari" userId="dfb708c9-d8dc-439f-9a3b-c772bf4a311c" providerId="ADAL" clId="{5AF9E225-0E3D-4808-B523-40F6E9A1D59D}" dt="2023-03-02T09:19:43.572" v="4643" actId="20577"/>
+          <ac:spMkLst>
+            <pc:docMk/>
+            <pc:sldMk cId="2858358615" sldId="314"/>
+            <ac:spMk id="3" creationId="{FC4A93C0-0CAD-4BA5-9658-F523BC4C732F}"/>
+          </ac:spMkLst>
+        </pc:spChg>
+      </pc:sldChg>
+      <pc:sldChg chg="modSp add mod ord">
+        <pc:chgData name="Matthieu De Mari" userId="dfb708c9-d8dc-439f-9a3b-c772bf4a311c" providerId="ADAL" clId="{5AF9E225-0E3D-4808-B523-40F6E9A1D59D}" dt="2023-03-02T09:21:38.413" v="4685" actId="20577"/>
+        <pc:sldMkLst>
+          <pc:docMk/>
+          <pc:sldMk cId="1040156172" sldId="377"/>
+        </pc:sldMkLst>
+        <pc:spChg chg="mod">
+          <ac:chgData name="Matthieu De Mari" userId="dfb708c9-d8dc-439f-9a3b-c772bf4a311c" providerId="ADAL" clId="{5AF9E225-0E3D-4808-B523-40F6E9A1D59D}" dt="2023-03-02T09:21:38.413" v="4685" actId="20577"/>
+          <ac:spMkLst>
+            <pc:docMk/>
+            <pc:sldMk cId="1040156172" sldId="377"/>
+            <ac:spMk id="2" creationId="{080CEB46-CC16-4D19-8C2C-AEE9471D8168}"/>
+          </ac:spMkLst>
+        </pc:spChg>
+      </pc:sldChg>
+      <pc:sldChg chg="add ord">
+        <pc:chgData name="Matthieu De Mari" userId="dfb708c9-d8dc-439f-9a3b-c772bf4a311c" providerId="ADAL" clId="{5AF9E225-0E3D-4808-B523-40F6E9A1D59D}" dt="2023-03-02T09:20:56.065" v="4649" actId="20578"/>
+        <pc:sldMkLst>
+          <pc:docMk/>
+          <pc:sldMk cId="3338565690" sldId="378"/>
+        </pc:sldMkLst>
+      </pc:sldChg>
+      <pc:sldMasterChg chg="addSp mod">
+        <pc:chgData name="Matthieu De Mari" userId="dfb708c9-d8dc-439f-9a3b-c772bf4a311c" providerId="ADAL" clId="{5AF9E225-0E3D-4808-B523-40F6E9A1D59D}" dt="2023-03-02T06:54:28.184" v="0" actId="33475"/>
+        <pc:sldMasterMkLst>
+          <pc:docMk/>
+          <pc:sldMasterMk cId="1162895350" sldId="2147483648"/>
+        </pc:sldMasterMkLst>
+        <pc:spChg chg="add">
+          <ac:chgData name="Matthieu De Mari" userId="dfb708c9-d8dc-439f-9a3b-c772bf4a311c" providerId="ADAL" clId="{5AF9E225-0E3D-4808-B523-40F6E9A1D59D}" dt="2023-03-02T06:54:28.184" v="0" actId="33475"/>
+          <ac:spMkLst>
+            <pc:docMk/>
+            <pc:sldMasterMk cId="1162895350" sldId="2147483648"/>
+            <ac:spMk id="9" creationId="{487321BB-4993-C3D7-45BA-3941EB0C1E33}"/>
+          </ac:spMkLst>
+        </pc:spChg>
+        <pc:spChg chg="add">
+          <ac:chgData name="Matthieu De Mari" userId="dfb708c9-d8dc-439f-9a3b-c772bf4a311c" providerId="ADAL" clId="{5AF9E225-0E3D-4808-B523-40F6E9A1D59D}" dt="2023-03-02T06:54:28.184" v="0" actId="33475"/>
+          <ac:spMkLst>
+            <pc:docMk/>
+            <pc:sldMasterMk cId="1162895350" sldId="2147483648"/>
+            <ac:spMk id="10" creationId="{1EEF943D-E5F8-C50D-F37B-649E0AB3F320}"/>
+          </ac:spMkLst>
+        </pc:spChg>
+      </pc:sldMasterChg>
     </pc:docChg>
   </pc:docChgLst>
   <pc:docChgLst>
@@ -9294,1824 +11094,6 @@
           </ac:spMkLst>
         </pc:spChg>
       </pc:sldChg>
-    </pc:docChg>
-  </pc:docChgLst>
-  <pc:docChgLst>
-    <pc:chgData name="Matthieu De Mari" userId="dfb708c9-d8dc-439f-9a3b-c772bf4a311c" providerId="ADAL" clId="{5AF9E225-0E3D-4808-B523-40F6E9A1D59D}"/>
-    <pc:docChg chg="undo custSel mod addSld delSld modSld sldOrd modMainMaster addSection modSection">
-      <pc:chgData name="Matthieu De Mari" userId="dfb708c9-d8dc-439f-9a3b-c772bf4a311c" providerId="ADAL" clId="{5AF9E225-0E3D-4808-B523-40F6E9A1D59D}" dt="2023-03-02T09:21:50.474" v="4687" actId="17846"/>
-      <pc:docMkLst>
-        <pc:docMk/>
-      </pc:docMkLst>
-      <pc:sldChg chg="modSp add del mod">
-        <pc:chgData name="Matthieu De Mari" userId="dfb708c9-d8dc-439f-9a3b-c772bf4a311c" providerId="ADAL" clId="{5AF9E225-0E3D-4808-B523-40F6E9A1D59D}" dt="2023-03-02T09:21:44.969" v="4686" actId="47"/>
-        <pc:sldMkLst>
-          <pc:docMk/>
-          <pc:sldMk cId="901767542" sldId="256"/>
-        </pc:sldMkLst>
-        <pc:spChg chg="mod">
-          <ac:chgData name="Matthieu De Mari" userId="dfb708c9-d8dc-439f-9a3b-c772bf4a311c" providerId="ADAL" clId="{5AF9E225-0E3D-4808-B523-40F6E9A1D59D}" dt="2023-03-02T06:54:38.562" v="26" actId="20577"/>
-          <ac:spMkLst>
-            <pc:docMk/>
-            <pc:sldMk cId="901767542" sldId="256"/>
-            <ac:spMk id="2" creationId="{2A670A59-7759-7B00-8247-A16BA5AC8105}"/>
-          </ac:spMkLst>
-        </pc:spChg>
-      </pc:sldChg>
-      <pc:sldChg chg="addSp delSp modSp add mod chgLayout">
-        <pc:chgData name="Matthieu De Mari" userId="dfb708c9-d8dc-439f-9a3b-c772bf4a311c" providerId="ADAL" clId="{5AF9E225-0E3D-4808-B523-40F6E9A1D59D}" dt="2023-03-02T07:05:19.188" v="526" actId="20577"/>
-        <pc:sldMkLst>
-          <pc:docMk/>
-          <pc:sldMk cId="3239548726" sldId="257"/>
-        </pc:sldMkLst>
-        <pc:spChg chg="mod ord">
-          <ac:chgData name="Matthieu De Mari" userId="dfb708c9-d8dc-439f-9a3b-c772bf4a311c" providerId="ADAL" clId="{5AF9E225-0E3D-4808-B523-40F6E9A1D59D}" dt="2023-03-02T06:57:42.999" v="278" actId="700"/>
-          <ac:spMkLst>
-            <pc:docMk/>
-            <pc:sldMk cId="3239548726" sldId="257"/>
-            <ac:spMk id="2" creationId="{B50B574F-C933-4F2A-F08D-3E476DF2C874}"/>
-          </ac:spMkLst>
-        </pc:spChg>
-        <pc:spChg chg="add del mod ord">
-          <ac:chgData name="Matthieu De Mari" userId="dfb708c9-d8dc-439f-9a3b-c772bf4a311c" providerId="ADAL" clId="{5AF9E225-0E3D-4808-B523-40F6E9A1D59D}" dt="2023-03-02T06:58:16.230" v="292" actId="478"/>
-          <ac:spMkLst>
-            <pc:docMk/>
-            <pc:sldMk cId="3239548726" sldId="257"/>
-            <ac:spMk id="3" creationId="{D2DC9FEB-9B75-AB4D-B5F1-F78585CE0DE0}"/>
-          </ac:spMkLst>
-        </pc:spChg>
-        <pc:spChg chg="mod ord">
-          <ac:chgData name="Matthieu De Mari" userId="dfb708c9-d8dc-439f-9a3b-c772bf4a311c" providerId="ADAL" clId="{5AF9E225-0E3D-4808-B523-40F6E9A1D59D}" dt="2023-03-02T07:05:19.188" v="526" actId="20577"/>
-          <ac:spMkLst>
-            <pc:docMk/>
-            <pc:sldMk cId="3239548726" sldId="257"/>
-            <ac:spMk id="4" creationId="{11B5C143-F936-00BC-44EE-7E05A29966EA}"/>
-          </ac:spMkLst>
-        </pc:spChg>
-        <pc:spChg chg="mod">
-          <ac:chgData name="Matthieu De Mari" userId="dfb708c9-d8dc-439f-9a3b-c772bf4a311c" providerId="ADAL" clId="{5AF9E225-0E3D-4808-B523-40F6E9A1D59D}" dt="2023-03-02T06:57:36.942" v="277" actId="1035"/>
-          <ac:spMkLst>
-            <pc:docMk/>
-            <pc:sldMk cId="3239548726" sldId="257"/>
-            <ac:spMk id="5" creationId="{7F5DEAE6-D202-B325-C159-0845A73F1131}"/>
-          </ac:spMkLst>
-        </pc:spChg>
-        <pc:spChg chg="mod">
-          <ac:chgData name="Matthieu De Mari" userId="dfb708c9-d8dc-439f-9a3b-c772bf4a311c" providerId="ADAL" clId="{5AF9E225-0E3D-4808-B523-40F6E9A1D59D}" dt="2023-03-02T06:57:36.942" v="277" actId="1035"/>
-          <ac:spMkLst>
-            <pc:docMk/>
-            <pc:sldMk cId="3239548726" sldId="257"/>
-            <ac:spMk id="7" creationId="{05B98F52-283E-8873-3A86-F4B6625D7C1D}"/>
-          </ac:spMkLst>
-        </pc:spChg>
-        <pc:spChg chg="mod">
-          <ac:chgData name="Matthieu De Mari" userId="dfb708c9-d8dc-439f-9a3b-c772bf4a311c" providerId="ADAL" clId="{5AF9E225-0E3D-4808-B523-40F6E9A1D59D}" dt="2023-03-02T06:57:36.942" v="277" actId="1035"/>
-          <ac:spMkLst>
-            <pc:docMk/>
-            <pc:sldMk cId="3239548726" sldId="257"/>
-            <ac:spMk id="8" creationId="{B49EF664-3365-8344-2224-91A3BF11359E}"/>
-          </ac:spMkLst>
-        </pc:spChg>
-        <pc:spChg chg="mod">
-          <ac:chgData name="Matthieu De Mari" userId="dfb708c9-d8dc-439f-9a3b-c772bf4a311c" providerId="ADAL" clId="{5AF9E225-0E3D-4808-B523-40F6E9A1D59D}" dt="2023-03-02T06:57:36.942" v="277" actId="1035"/>
-          <ac:spMkLst>
-            <pc:docMk/>
-            <pc:sldMk cId="3239548726" sldId="257"/>
-            <ac:spMk id="9" creationId="{46800871-91B7-4097-1AEE-239AAB61FD10}"/>
-          </ac:spMkLst>
-        </pc:spChg>
-        <pc:spChg chg="mod">
-          <ac:chgData name="Matthieu De Mari" userId="dfb708c9-d8dc-439f-9a3b-c772bf4a311c" providerId="ADAL" clId="{5AF9E225-0E3D-4808-B523-40F6E9A1D59D}" dt="2023-03-02T06:57:36.942" v="277" actId="1035"/>
-          <ac:spMkLst>
-            <pc:docMk/>
-            <pc:sldMk cId="3239548726" sldId="257"/>
-            <ac:spMk id="10" creationId="{D69CD5E0-172F-06FD-35CD-C47EA4676A31}"/>
-          </ac:spMkLst>
-        </pc:spChg>
-        <pc:spChg chg="add del mod">
-          <ac:chgData name="Matthieu De Mari" userId="dfb708c9-d8dc-439f-9a3b-c772bf4a311c" providerId="ADAL" clId="{5AF9E225-0E3D-4808-B523-40F6E9A1D59D}" dt="2023-03-02T06:58:13.715" v="290" actId="478"/>
-          <ac:spMkLst>
-            <pc:docMk/>
-            <pc:sldMk cId="3239548726" sldId="257"/>
-            <ac:spMk id="11" creationId="{B6DF1EB1-6668-ABCF-B896-D3812A5087F3}"/>
-          </ac:spMkLst>
-        </pc:spChg>
-      </pc:sldChg>
-      <pc:sldChg chg="modSp add mod">
-        <pc:chgData name="Matthieu De Mari" userId="dfb708c9-d8dc-439f-9a3b-c772bf4a311c" providerId="ADAL" clId="{5AF9E225-0E3D-4808-B523-40F6E9A1D59D}" dt="2023-03-02T07:01:55.363" v="524" actId="20577"/>
-        <pc:sldMkLst>
-          <pc:docMk/>
-          <pc:sldMk cId="1495819743" sldId="258"/>
-        </pc:sldMkLst>
-        <pc:spChg chg="mod">
-          <ac:chgData name="Matthieu De Mari" userId="dfb708c9-d8dc-439f-9a3b-c772bf4a311c" providerId="ADAL" clId="{5AF9E225-0E3D-4808-B523-40F6E9A1D59D}" dt="2023-03-02T07:01:55.363" v="524" actId="20577"/>
-          <ac:spMkLst>
-            <pc:docMk/>
-            <pc:sldMk cId="1495819743" sldId="258"/>
-            <ac:spMk id="3" creationId="{F23BB8E2-2C5A-6D2B-E7FF-F55104DECF62}"/>
-          </ac:spMkLst>
-        </pc:spChg>
-      </pc:sldChg>
-      <pc:sldChg chg="addSp modSp add mod modClrScheme chgLayout">
-        <pc:chgData name="Matthieu De Mari" userId="dfb708c9-d8dc-439f-9a3b-c772bf4a311c" providerId="ADAL" clId="{5AF9E225-0E3D-4808-B523-40F6E9A1D59D}" dt="2023-03-02T07:07:22.195" v="628" actId="20577"/>
-        <pc:sldMkLst>
-          <pc:docMk/>
-          <pc:sldMk cId="609186567" sldId="259"/>
-        </pc:sldMkLst>
-        <pc:spChg chg="mod ord">
-          <ac:chgData name="Matthieu De Mari" userId="dfb708c9-d8dc-439f-9a3b-c772bf4a311c" providerId="ADAL" clId="{5AF9E225-0E3D-4808-B523-40F6E9A1D59D}" dt="2023-03-02T07:07:02.911" v="616" actId="700"/>
-          <ac:spMkLst>
-            <pc:docMk/>
-            <pc:sldMk cId="609186567" sldId="259"/>
-            <ac:spMk id="2" creationId="{28DE36AE-A7BD-B2D6-D7DE-EBE0834C1A93}"/>
-          </ac:spMkLst>
-        </pc:spChg>
-        <pc:spChg chg="mod ord">
-          <ac:chgData name="Matthieu De Mari" userId="dfb708c9-d8dc-439f-9a3b-c772bf4a311c" providerId="ADAL" clId="{5AF9E225-0E3D-4808-B523-40F6E9A1D59D}" dt="2023-03-02T07:07:22.195" v="628" actId="20577"/>
-          <ac:spMkLst>
-            <pc:docMk/>
-            <pc:sldMk cId="609186567" sldId="259"/>
-            <ac:spMk id="3" creationId="{B20362F6-0A45-1821-AD14-0E3C760A995E}"/>
-          </ac:spMkLst>
-        </pc:spChg>
-        <pc:spChg chg="add mod ord">
-          <ac:chgData name="Matthieu De Mari" userId="dfb708c9-d8dc-439f-9a3b-c772bf4a311c" providerId="ADAL" clId="{5AF9E225-0E3D-4808-B523-40F6E9A1D59D}" dt="2023-03-02T07:07:18.146" v="627" actId="20577"/>
-          <ac:spMkLst>
-            <pc:docMk/>
-            <pc:sldMk cId="609186567" sldId="259"/>
-            <ac:spMk id="4" creationId="{353D99B7-5312-BFF8-1D5D-BEF7B953B9D9}"/>
-          </ac:spMkLst>
-        </pc:spChg>
-      </pc:sldChg>
-      <pc:sldChg chg="modSp add mod">
-        <pc:chgData name="Matthieu De Mari" userId="dfb708c9-d8dc-439f-9a3b-c772bf4a311c" providerId="ADAL" clId="{5AF9E225-0E3D-4808-B523-40F6E9A1D59D}" dt="2023-03-02T07:05:58.205" v="582" actId="20577"/>
-        <pc:sldMkLst>
-          <pc:docMk/>
-          <pc:sldMk cId="1812694891" sldId="260"/>
-        </pc:sldMkLst>
-        <pc:spChg chg="mod">
-          <ac:chgData name="Matthieu De Mari" userId="dfb708c9-d8dc-439f-9a3b-c772bf4a311c" providerId="ADAL" clId="{5AF9E225-0E3D-4808-B523-40F6E9A1D59D}" dt="2023-03-02T07:05:58.205" v="582" actId="20577"/>
-          <ac:spMkLst>
-            <pc:docMk/>
-            <pc:sldMk cId="1812694891" sldId="260"/>
-            <ac:spMk id="4" creationId="{11B5C143-F936-00BC-44EE-7E05A29966EA}"/>
-          </ac:spMkLst>
-        </pc:spChg>
-      </pc:sldChg>
-      <pc:sldChg chg="modSp add mod">
-        <pc:chgData name="Matthieu De Mari" userId="dfb708c9-d8dc-439f-9a3b-c772bf4a311c" providerId="ADAL" clId="{5AF9E225-0E3D-4808-B523-40F6E9A1D59D}" dt="2023-03-02T07:08:41.284" v="667" actId="20577"/>
-        <pc:sldMkLst>
-          <pc:docMk/>
-          <pc:sldMk cId="2172647381" sldId="261"/>
-        </pc:sldMkLst>
-        <pc:spChg chg="mod">
-          <ac:chgData name="Matthieu De Mari" userId="dfb708c9-d8dc-439f-9a3b-c772bf4a311c" providerId="ADAL" clId="{5AF9E225-0E3D-4808-B523-40F6E9A1D59D}" dt="2023-03-02T07:08:41.284" v="667" actId="20577"/>
-          <ac:spMkLst>
-            <pc:docMk/>
-            <pc:sldMk cId="2172647381" sldId="261"/>
-            <ac:spMk id="3" creationId="{097D872E-3486-FBAD-9B1E-6412E4F0FB9B}"/>
-          </ac:spMkLst>
-        </pc:spChg>
-      </pc:sldChg>
-      <pc:sldChg chg="modSp add mod">
-        <pc:chgData name="Matthieu De Mari" userId="dfb708c9-d8dc-439f-9a3b-c772bf4a311c" providerId="ADAL" clId="{5AF9E225-0E3D-4808-B523-40F6E9A1D59D}" dt="2023-03-02T07:09:13.009" v="690" actId="20577"/>
-        <pc:sldMkLst>
-          <pc:docMk/>
-          <pc:sldMk cId="3166947328" sldId="262"/>
-        </pc:sldMkLst>
-        <pc:spChg chg="mod">
-          <ac:chgData name="Matthieu De Mari" userId="dfb708c9-d8dc-439f-9a3b-c772bf4a311c" providerId="ADAL" clId="{5AF9E225-0E3D-4808-B523-40F6E9A1D59D}" dt="2023-03-02T07:09:13.009" v="690" actId="20577"/>
-          <ac:spMkLst>
-            <pc:docMk/>
-            <pc:sldMk cId="3166947328" sldId="262"/>
-            <ac:spMk id="3" creationId="{A61FAA42-106F-39F5-DD78-BB04653C3A81}"/>
-          </ac:spMkLst>
-        </pc:spChg>
-      </pc:sldChg>
-      <pc:sldChg chg="modSp add mod">
-        <pc:chgData name="Matthieu De Mari" userId="dfb708c9-d8dc-439f-9a3b-c772bf4a311c" providerId="ADAL" clId="{5AF9E225-0E3D-4808-B523-40F6E9A1D59D}" dt="2023-03-02T07:09:44.442" v="694" actId="20577"/>
-        <pc:sldMkLst>
-          <pc:docMk/>
-          <pc:sldMk cId="2723458640" sldId="263"/>
-        </pc:sldMkLst>
-        <pc:spChg chg="mod">
-          <ac:chgData name="Matthieu De Mari" userId="dfb708c9-d8dc-439f-9a3b-c772bf4a311c" providerId="ADAL" clId="{5AF9E225-0E3D-4808-B523-40F6E9A1D59D}" dt="2023-03-02T07:09:44.442" v="694" actId="20577"/>
-          <ac:spMkLst>
-            <pc:docMk/>
-            <pc:sldMk cId="2723458640" sldId="263"/>
-            <ac:spMk id="3" creationId="{C085ED28-5440-9734-066D-069B39F29AEB}"/>
-          </ac:spMkLst>
-        </pc:spChg>
-      </pc:sldChg>
-      <pc:sldChg chg="add">
-        <pc:chgData name="Matthieu De Mari" userId="dfb708c9-d8dc-439f-9a3b-c772bf4a311c" providerId="ADAL" clId="{5AF9E225-0E3D-4808-B523-40F6E9A1D59D}" dt="2023-03-02T06:54:29.623" v="2"/>
-        <pc:sldMkLst>
-          <pc:docMk/>
-          <pc:sldMk cId="649892368" sldId="264"/>
-        </pc:sldMkLst>
-      </pc:sldChg>
-      <pc:sldChg chg="add">
-        <pc:chgData name="Matthieu De Mari" userId="dfb708c9-d8dc-439f-9a3b-c772bf4a311c" providerId="ADAL" clId="{5AF9E225-0E3D-4808-B523-40F6E9A1D59D}" dt="2023-03-02T06:54:29.623" v="2"/>
-        <pc:sldMkLst>
-          <pc:docMk/>
-          <pc:sldMk cId="4127898596" sldId="265"/>
-        </pc:sldMkLst>
-      </pc:sldChg>
-      <pc:sldChg chg="addSp delSp modSp add mod modClrScheme chgLayout">
-        <pc:chgData name="Matthieu De Mari" userId="dfb708c9-d8dc-439f-9a3b-c772bf4a311c" providerId="ADAL" clId="{5AF9E225-0E3D-4808-B523-40F6E9A1D59D}" dt="2023-03-02T08:47:11.979" v="3217" actId="20577"/>
-        <pc:sldMkLst>
-          <pc:docMk/>
-          <pc:sldMk cId="256269341" sldId="266"/>
-        </pc:sldMkLst>
-        <pc:spChg chg="mod ord">
-          <ac:chgData name="Matthieu De Mari" userId="dfb708c9-d8dc-439f-9a3b-c772bf4a311c" providerId="ADAL" clId="{5AF9E225-0E3D-4808-B523-40F6E9A1D59D}" dt="2023-03-02T07:16:25.110" v="867" actId="700"/>
-          <ac:spMkLst>
-            <pc:docMk/>
-            <pc:sldMk cId="256269341" sldId="266"/>
-            <ac:spMk id="2" creationId="{D83D78A6-5213-F5DF-FAC1-B6D18B0BB4F5}"/>
-          </ac:spMkLst>
-        </pc:spChg>
-        <pc:spChg chg="del mod">
-          <ac:chgData name="Matthieu De Mari" userId="dfb708c9-d8dc-439f-9a3b-c772bf4a311c" providerId="ADAL" clId="{5AF9E225-0E3D-4808-B523-40F6E9A1D59D}" dt="2023-03-02T07:16:11.714" v="855" actId="478"/>
-          <ac:spMkLst>
-            <pc:docMk/>
-            <pc:sldMk cId="256269341" sldId="266"/>
-            <ac:spMk id="4" creationId="{9BFCB341-9C36-5FBD-32A6-099F6A5E5940}"/>
-          </ac:spMkLst>
-        </pc:spChg>
-        <pc:spChg chg="add mod ord">
-          <ac:chgData name="Matthieu De Mari" userId="dfb708c9-d8dc-439f-9a3b-c772bf4a311c" providerId="ADAL" clId="{5AF9E225-0E3D-4808-B523-40F6E9A1D59D}" dt="2023-03-02T08:47:11.979" v="3217" actId="20577"/>
-          <ac:spMkLst>
-            <pc:docMk/>
-            <pc:sldMk cId="256269341" sldId="266"/>
-            <ac:spMk id="5" creationId="{6649BB52-89C3-E6CD-F1B2-2D67B477189C}"/>
-          </ac:spMkLst>
-        </pc:spChg>
-        <pc:spChg chg="add mod ord">
-          <ac:chgData name="Matthieu De Mari" userId="dfb708c9-d8dc-439f-9a3b-c772bf4a311c" providerId="ADAL" clId="{5AF9E225-0E3D-4808-B523-40F6E9A1D59D}" dt="2023-03-02T07:21:24.421" v="1179" actId="20577"/>
-          <ac:spMkLst>
-            <pc:docMk/>
-            <pc:sldMk cId="256269341" sldId="266"/>
-            <ac:spMk id="6" creationId="{FDD2EC50-CDA1-1B6E-AE8B-50784F3D4430}"/>
-          </ac:spMkLst>
-        </pc:spChg>
-        <pc:spChg chg="add mod ord">
-          <ac:chgData name="Matthieu De Mari" userId="dfb708c9-d8dc-439f-9a3b-c772bf4a311c" providerId="ADAL" clId="{5AF9E225-0E3D-4808-B523-40F6E9A1D59D}" dt="2023-03-02T07:17:52.154" v="984" actId="1035"/>
-          <ac:spMkLst>
-            <pc:docMk/>
-            <pc:sldMk cId="256269341" sldId="266"/>
-            <ac:spMk id="7" creationId="{CE64D9DC-283B-4657-7206-690C8044C929}"/>
-          </ac:spMkLst>
-        </pc:spChg>
-        <pc:spChg chg="add mod ord">
-          <ac:chgData name="Matthieu De Mari" userId="dfb708c9-d8dc-439f-9a3b-c772bf4a311c" providerId="ADAL" clId="{5AF9E225-0E3D-4808-B523-40F6E9A1D59D}" dt="2023-03-02T07:17:52.154" v="984" actId="1035"/>
-          <ac:spMkLst>
-            <pc:docMk/>
-            <pc:sldMk cId="256269341" sldId="266"/>
-            <ac:spMk id="8" creationId="{8D7715D0-7C6F-FE4B-319D-81CC8F353AF3}"/>
-          </ac:spMkLst>
-        </pc:spChg>
-        <pc:graphicFrameChg chg="del">
-          <ac:chgData name="Matthieu De Mari" userId="dfb708c9-d8dc-439f-9a3b-c772bf4a311c" providerId="ADAL" clId="{5AF9E225-0E3D-4808-B523-40F6E9A1D59D}" dt="2023-03-02T07:16:09.629" v="854" actId="478"/>
-          <ac:graphicFrameMkLst>
-            <pc:docMk/>
-            <pc:sldMk cId="256269341" sldId="266"/>
-            <ac:graphicFrameMk id="3" creationId="{F7ED8123-9CA8-E8C5-65C0-70940FFAF010}"/>
-          </ac:graphicFrameMkLst>
-        </pc:graphicFrameChg>
-      </pc:sldChg>
-      <pc:sldChg chg="modSp add mod">
-        <pc:chgData name="Matthieu De Mari" userId="dfb708c9-d8dc-439f-9a3b-c772bf4a311c" providerId="ADAL" clId="{5AF9E225-0E3D-4808-B523-40F6E9A1D59D}" dt="2023-03-02T07:01:21.208" v="484" actId="115"/>
-        <pc:sldMkLst>
-          <pc:docMk/>
-          <pc:sldMk cId="2566504203" sldId="267"/>
-        </pc:sldMkLst>
-        <pc:spChg chg="mod">
-          <ac:chgData name="Matthieu De Mari" userId="dfb708c9-d8dc-439f-9a3b-c772bf4a311c" providerId="ADAL" clId="{5AF9E225-0E3D-4808-B523-40F6E9A1D59D}" dt="2023-03-02T07:01:21.208" v="484" actId="115"/>
-          <ac:spMkLst>
-            <pc:docMk/>
-            <pc:sldMk cId="2566504203" sldId="267"/>
-            <ac:spMk id="4" creationId="{AAD607B1-0264-F96B-5344-F51B4AD661EC}"/>
-          </ac:spMkLst>
-        </pc:spChg>
-      </pc:sldChg>
-      <pc:sldChg chg="addSp delSp modSp add mod chgLayout">
-        <pc:chgData name="Matthieu De Mari" userId="dfb708c9-d8dc-439f-9a3b-c772bf4a311c" providerId="ADAL" clId="{5AF9E225-0E3D-4808-B523-40F6E9A1D59D}" dt="2023-03-02T07:00:12.794" v="471" actId="115"/>
-        <pc:sldMkLst>
-          <pc:docMk/>
-          <pc:sldMk cId="1205920737" sldId="268"/>
-        </pc:sldMkLst>
-        <pc:spChg chg="mod ord">
-          <ac:chgData name="Matthieu De Mari" userId="dfb708c9-d8dc-439f-9a3b-c772bf4a311c" providerId="ADAL" clId="{5AF9E225-0E3D-4808-B523-40F6E9A1D59D}" dt="2023-03-02T06:58:21.739" v="294" actId="700"/>
-          <ac:spMkLst>
-            <pc:docMk/>
-            <pc:sldMk cId="1205920737" sldId="268"/>
-            <ac:spMk id="2" creationId="{B50B574F-C933-4F2A-F08D-3E476DF2C874}"/>
-          </ac:spMkLst>
-        </pc:spChg>
-        <pc:spChg chg="add mod ord">
-          <ac:chgData name="Matthieu De Mari" userId="dfb708c9-d8dc-439f-9a3b-c772bf4a311c" providerId="ADAL" clId="{5AF9E225-0E3D-4808-B523-40F6E9A1D59D}" dt="2023-03-02T06:59:48.417" v="468" actId="113"/>
-          <ac:spMkLst>
-            <pc:docMk/>
-            <pc:sldMk cId="1205920737" sldId="268"/>
-            <ac:spMk id="3" creationId="{D09C5ECE-F6D7-98F1-D7D9-BD7455F1F759}"/>
-          </ac:spMkLst>
-        </pc:spChg>
-        <pc:spChg chg="mod ord">
-          <ac:chgData name="Matthieu De Mari" userId="dfb708c9-d8dc-439f-9a3b-c772bf4a311c" providerId="ADAL" clId="{5AF9E225-0E3D-4808-B523-40F6E9A1D59D}" dt="2023-03-02T07:00:12.794" v="471" actId="115"/>
-          <ac:spMkLst>
-            <pc:docMk/>
-            <pc:sldMk cId="1205920737" sldId="268"/>
-            <ac:spMk id="4" creationId="{11B5C143-F936-00BC-44EE-7E05A29966EA}"/>
-          </ac:spMkLst>
-        </pc:spChg>
-        <pc:spChg chg="del">
-          <ac:chgData name="Matthieu De Mari" userId="dfb708c9-d8dc-439f-9a3b-c772bf4a311c" providerId="ADAL" clId="{5AF9E225-0E3D-4808-B523-40F6E9A1D59D}" dt="2023-03-02T06:58:24.807" v="297" actId="478"/>
-          <ac:spMkLst>
-            <pc:docMk/>
-            <pc:sldMk cId="1205920737" sldId="268"/>
-            <ac:spMk id="5" creationId="{7F5DEAE6-D202-B325-C159-0845A73F1131}"/>
-          </ac:spMkLst>
-        </pc:spChg>
-        <pc:spChg chg="del">
-          <ac:chgData name="Matthieu De Mari" userId="dfb708c9-d8dc-439f-9a3b-c772bf4a311c" providerId="ADAL" clId="{5AF9E225-0E3D-4808-B523-40F6E9A1D59D}" dt="2023-03-02T06:58:24.807" v="297" actId="478"/>
-          <ac:spMkLst>
-            <pc:docMk/>
-            <pc:sldMk cId="1205920737" sldId="268"/>
-            <ac:spMk id="7" creationId="{05B98F52-283E-8873-3A86-F4B6625D7C1D}"/>
-          </ac:spMkLst>
-        </pc:spChg>
-        <pc:spChg chg="del">
-          <ac:chgData name="Matthieu De Mari" userId="dfb708c9-d8dc-439f-9a3b-c772bf4a311c" providerId="ADAL" clId="{5AF9E225-0E3D-4808-B523-40F6E9A1D59D}" dt="2023-03-02T06:58:24.807" v="297" actId="478"/>
-          <ac:spMkLst>
-            <pc:docMk/>
-            <pc:sldMk cId="1205920737" sldId="268"/>
-            <ac:spMk id="8" creationId="{B49EF664-3365-8344-2224-91A3BF11359E}"/>
-          </ac:spMkLst>
-        </pc:spChg>
-        <pc:spChg chg="del">
-          <ac:chgData name="Matthieu De Mari" userId="dfb708c9-d8dc-439f-9a3b-c772bf4a311c" providerId="ADAL" clId="{5AF9E225-0E3D-4808-B523-40F6E9A1D59D}" dt="2023-03-02T06:58:24.807" v="297" actId="478"/>
-          <ac:spMkLst>
-            <pc:docMk/>
-            <pc:sldMk cId="1205920737" sldId="268"/>
-            <ac:spMk id="9" creationId="{46800871-91B7-4097-1AEE-239AAB61FD10}"/>
-          </ac:spMkLst>
-        </pc:spChg>
-        <pc:spChg chg="del">
-          <ac:chgData name="Matthieu De Mari" userId="dfb708c9-d8dc-439f-9a3b-c772bf4a311c" providerId="ADAL" clId="{5AF9E225-0E3D-4808-B523-40F6E9A1D59D}" dt="2023-03-02T06:58:24.807" v="297" actId="478"/>
-          <ac:spMkLst>
-            <pc:docMk/>
-            <pc:sldMk cId="1205920737" sldId="268"/>
-            <ac:spMk id="10" creationId="{D69CD5E0-172F-06FD-35CD-C47EA4676A31}"/>
-          </ac:spMkLst>
-        </pc:spChg>
-      </pc:sldChg>
-      <pc:sldChg chg="delSp modSp add mod modClrScheme chgLayout">
-        <pc:chgData name="Matthieu De Mari" userId="dfb708c9-d8dc-439f-9a3b-c772bf4a311c" providerId="ADAL" clId="{5AF9E225-0E3D-4808-B523-40F6E9A1D59D}" dt="2023-03-02T07:13:38.493" v="793" actId="114"/>
-        <pc:sldMkLst>
-          <pc:docMk/>
-          <pc:sldMk cId="4188287311" sldId="269"/>
-        </pc:sldMkLst>
-        <pc:spChg chg="mod ord">
-          <ac:chgData name="Matthieu De Mari" userId="dfb708c9-d8dc-439f-9a3b-c772bf4a311c" providerId="ADAL" clId="{5AF9E225-0E3D-4808-B523-40F6E9A1D59D}" dt="2023-03-02T07:12:03.175" v="700" actId="700"/>
-          <ac:spMkLst>
-            <pc:docMk/>
-            <pc:sldMk cId="4188287311" sldId="269"/>
-            <ac:spMk id="2" creationId="{4C82E11B-DFFC-C58E-D85D-43F29962418C}"/>
-          </ac:spMkLst>
-        </pc:spChg>
-        <pc:spChg chg="mod ord">
-          <ac:chgData name="Matthieu De Mari" userId="dfb708c9-d8dc-439f-9a3b-c772bf4a311c" providerId="ADAL" clId="{5AF9E225-0E3D-4808-B523-40F6E9A1D59D}" dt="2023-03-02T07:13:38.493" v="793" actId="114"/>
-          <ac:spMkLst>
-            <pc:docMk/>
-            <pc:sldMk cId="4188287311" sldId="269"/>
-            <ac:spMk id="4" creationId="{AAD607B1-0264-F96B-5344-F51B4AD661EC}"/>
-          </ac:spMkLst>
-        </pc:spChg>
-        <pc:spChg chg="del">
-          <ac:chgData name="Matthieu De Mari" userId="dfb708c9-d8dc-439f-9a3b-c772bf4a311c" providerId="ADAL" clId="{5AF9E225-0E3D-4808-B523-40F6E9A1D59D}" dt="2023-03-02T07:12:08.307" v="702" actId="478"/>
-          <ac:spMkLst>
-            <pc:docMk/>
-            <pc:sldMk cId="4188287311" sldId="269"/>
-            <ac:spMk id="6" creationId="{74BA015B-2BA6-D38E-6EF5-512EDEABFC5E}"/>
-          </ac:spMkLst>
-        </pc:spChg>
-        <pc:spChg chg="del">
-          <ac:chgData name="Matthieu De Mari" userId="dfb708c9-d8dc-439f-9a3b-c772bf4a311c" providerId="ADAL" clId="{5AF9E225-0E3D-4808-B523-40F6E9A1D59D}" dt="2023-03-02T07:12:08.307" v="702" actId="478"/>
-          <ac:spMkLst>
-            <pc:docMk/>
-            <pc:sldMk cId="4188287311" sldId="269"/>
-            <ac:spMk id="7" creationId="{1D88D58E-B29B-60D4-269B-69C46DA2E57F}"/>
-          </ac:spMkLst>
-        </pc:spChg>
-        <pc:spChg chg="del">
-          <ac:chgData name="Matthieu De Mari" userId="dfb708c9-d8dc-439f-9a3b-c772bf4a311c" providerId="ADAL" clId="{5AF9E225-0E3D-4808-B523-40F6E9A1D59D}" dt="2023-03-02T07:12:08.307" v="702" actId="478"/>
-          <ac:spMkLst>
-            <pc:docMk/>
-            <pc:sldMk cId="4188287311" sldId="269"/>
-            <ac:spMk id="8" creationId="{690F1F1E-F5F4-43D4-D4AE-A1566EEC4481}"/>
-          </ac:spMkLst>
-        </pc:spChg>
-        <pc:spChg chg="del">
-          <ac:chgData name="Matthieu De Mari" userId="dfb708c9-d8dc-439f-9a3b-c772bf4a311c" providerId="ADAL" clId="{5AF9E225-0E3D-4808-B523-40F6E9A1D59D}" dt="2023-03-02T07:12:08.307" v="702" actId="478"/>
-          <ac:spMkLst>
-            <pc:docMk/>
-            <pc:sldMk cId="4188287311" sldId="269"/>
-            <ac:spMk id="10" creationId="{7A8B5180-F7BF-4E44-A517-D1FA6FDC2BDD}"/>
-          </ac:spMkLst>
-        </pc:spChg>
-        <pc:spChg chg="del">
-          <ac:chgData name="Matthieu De Mari" userId="dfb708c9-d8dc-439f-9a3b-c772bf4a311c" providerId="ADAL" clId="{5AF9E225-0E3D-4808-B523-40F6E9A1D59D}" dt="2023-03-02T07:12:08.307" v="702" actId="478"/>
-          <ac:spMkLst>
-            <pc:docMk/>
-            <pc:sldMk cId="4188287311" sldId="269"/>
-            <ac:spMk id="11" creationId="{56167DA6-6D54-C592-1B14-073D45E80E56}"/>
-          </ac:spMkLst>
-        </pc:spChg>
-        <pc:spChg chg="del">
-          <ac:chgData name="Matthieu De Mari" userId="dfb708c9-d8dc-439f-9a3b-c772bf4a311c" providerId="ADAL" clId="{5AF9E225-0E3D-4808-B523-40F6E9A1D59D}" dt="2023-03-02T07:12:08.307" v="702" actId="478"/>
-          <ac:spMkLst>
-            <pc:docMk/>
-            <pc:sldMk cId="4188287311" sldId="269"/>
-            <ac:spMk id="12" creationId="{79BD6F7A-8253-7AB5-41BC-724970D5C542}"/>
-          </ac:spMkLst>
-        </pc:spChg>
-        <pc:spChg chg="del">
-          <ac:chgData name="Matthieu De Mari" userId="dfb708c9-d8dc-439f-9a3b-c772bf4a311c" providerId="ADAL" clId="{5AF9E225-0E3D-4808-B523-40F6E9A1D59D}" dt="2023-03-02T07:12:08.307" v="702" actId="478"/>
-          <ac:spMkLst>
-            <pc:docMk/>
-            <pc:sldMk cId="4188287311" sldId="269"/>
-            <ac:spMk id="13" creationId="{7DD25C2B-16C3-B5FF-6184-818C0572FD6A}"/>
-          </ac:spMkLst>
-        </pc:spChg>
-        <pc:spChg chg="del">
-          <ac:chgData name="Matthieu De Mari" userId="dfb708c9-d8dc-439f-9a3b-c772bf4a311c" providerId="ADAL" clId="{5AF9E225-0E3D-4808-B523-40F6E9A1D59D}" dt="2023-03-02T07:12:08.307" v="702" actId="478"/>
-          <ac:spMkLst>
-            <pc:docMk/>
-            <pc:sldMk cId="4188287311" sldId="269"/>
-            <ac:spMk id="14" creationId="{9A5504DC-1A8A-6D7C-11CC-4EB02613A364}"/>
-          </ac:spMkLst>
-        </pc:spChg>
-        <pc:spChg chg="del">
-          <ac:chgData name="Matthieu De Mari" userId="dfb708c9-d8dc-439f-9a3b-c772bf4a311c" providerId="ADAL" clId="{5AF9E225-0E3D-4808-B523-40F6E9A1D59D}" dt="2023-03-02T07:12:08.307" v="702" actId="478"/>
-          <ac:spMkLst>
-            <pc:docMk/>
-            <pc:sldMk cId="4188287311" sldId="269"/>
-            <ac:spMk id="15" creationId="{1F3398C0-72E8-4ED9-A8A5-E15959805EEB}"/>
-          </ac:spMkLst>
-        </pc:spChg>
-      </pc:sldChg>
-      <pc:sldChg chg="modSp add mod">
-        <pc:chgData name="Matthieu De Mari" userId="dfb708c9-d8dc-439f-9a3b-c772bf4a311c" providerId="ADAL" clId="{5AF9E225-0E3D-4808-B523-40F6E9A1D59D}" dt="2023-03-02T07:25:33.827" v="1288" actId="1076"/>
-        <pc:sldMkLst>
-          <pc:docMk/>
-          <pc:sldMk cId="997896339" sldId="270"/>
-        </pc:sldMkLst>
-        <pc:spChg chg="mod">
-          <ac:chgData name="Matthieu De Mari" userId="dfb708c9-d8dc-439f-9a3b-c772bf4a311c" providerId="ADAL" clId="{5AF9E225-0E3D-4808-B523-40F6E9A1D59D}" dt="2023-03-02T07:15:53.623" v="810" actId="20577"/>
-          <ac:spMkLst>
-            <pc:docMk/>
-            <pc:sldMk cId="997896339" sldId="270"/>
-            <ac:spMk id="2" creationId="{D83D78A6-5213-F5DF-FAC1-B6D18B0BB4F5}"/>
-          </ac:spMkLst>
-        </pc:spChg>
-        <pc:spChg chg="mod">
-          <ac:chgData name="Matthieu De Mari" userId="dfb708c9-d8dc-439f-9a3b-c772bf4a311c" providerId="ADAL" clId="{5AF9E225-0E3D-4808-B523-40F6E9A1D59D}" dt="2023-03-02T07:25:33.827" v="1288" actId="1076"/>
-          <ac:spMkLst>
-            <pc:docMk/>
-            <pc:sldMk cId="997896339" sldId="270"/>
-            <ac:spMk id="4" creationId="{9BFCB341-9C36-5FBD-32A6-099F6A5E5940}"/>
-          </ac:spMkLst>
-        </pc:spChg>
-        <pc:graphicFrameChg chg="mod modGraphic">
-          <ac:chgData name="Matthieu De Mari" userId="dfb708c9-d8dc-439f-9a3b-c772bf4a311c" providerId="ADAL" clId="{5AF9E225-0E3D-4808-B523-40F6E9A1D59D}" dt="2023-03-02T07:25:09.419" v="1282" actId="14100"/>
-          <ac:graphicFrameMkLst>
-            <pc:docMk/>
-            <pc:sldMk cId="997896339" sldId="270"/>
-            <ac:graphicFrameMk id="3" creationId="{F7ED8123-9CA8-E8C5-65C0-70940FFAF010}"/>
-          </ac:graphicFrameMkLst>
-        </pc:graphicFrameChg>
-      </pc:sldChg>
-      <pc:sldChg chg="modSp add mod">
-        <pc:chgData name="Matthieu De Mari" userId="dfb708c9-d8dc-439f-9a3b-c772bf4a311c" providerId="ADAL" clId="{5AF9E225-0E3D-4808-B523-40F6E9A1D59D}" dt="2023-03-02T07:23:39.008" v="1244" actId="113"/>
-        <pc:sldMkLst>
-          <pc:docMk/>
-          <pc:sldMk cId="961845771" sldId="271"/>
-        </pc:sldMkLst>
-        <pc:spChg chg="mod">
-          <ac:chgData name="Matthieu De Mari" userId="dfb708c9-d8dc-439f-9a3b-c772bf4a311c" providerId="ADAL" clId="{5AF9E225-0E3D-4808-B523-40F6E9A1D59D}" dt="2023-03-02T07:21:38.014" v="1192" actId="20577"/>
-          <ac:spMkLst>
-            <pc:docMk/>
-            <pc:sldMk cId="961845771" sldId="271"/>
-            <ac:spMk id="2" creationId="{D83D78A6-5213-F5DF-FAC1-B6D18B0BB4F5}"/>
-          </ac:spMkLst>
-        </pc:spChg>
-        <pc:spChg chg="mod">
-          <ac:chgData name="Matthieu De Mari" userId="dfb708c9-d8dc-439f-9a3b-c772bf4a311c" providerId="ADAL" clId="{5AF9E225-0E3D-4808-B523-40F6E9A1D59D}" dt="2023-03-02T07:22:53.792" v="1234" actId="20577"/>
-          <ac:spMkLst>
-            <pc:docMk/>
-            <pc:sldMk cId="961845771" sldId="271"/>
-            <ac:spMk id="5" creationId="{6649BB52-89C3-E6CD-F1B2-2D67B477189C}"/>
-          </ac:spMkLst>
-        </pc:spChg>
-        <pc:spChg chg="mod">
-          <ac:chgData name="Matthieu De Mari" userId="dfb708c9-d8dc-439f-9a3b-c772bf4a311c" providerId="ADAL" clId="{5AF9E225-0E3D-4808-B523-40F6E9A1D59D}" dt="2023-03-02T07:23:39.008" v="1244" actId="113"/>
-          <ac:spMkLst>
-            <pc:docMk/>
-            <pc:sldMk cId="961845771" sldId="271"/>
-            <ac:spMk id="6" creationId="{FDD2EC50-CDA1-1B6E-AE8B-50784F3D4430}"/>
-          </ac:spMkLst>
-        </pc:spChg>
-        <pc:spChg chg="mod">
-          <ac:chgData name="Matthieu De Mari" userId="dfb708c9-d8dc-439f-9a3b-c772bf4a311c" providerId="ADAL" clId="{5AF9E225-0E3D-4808-B523-40F6E9A1D59D}" dt="2023-03-02T07:21:41.708" v="1204" actId="20577"/>
-          <ac:spMkLst>
-            <pc:docMk/>
-            <pc:sldMk cId="961845771" sldId="271"/>
-            <ac:spMk id="7" creationId="{CE64D9DC-283B-4657-7206-690C8044C929}"/>
-          </ac:spMkLst>
-        </pc:spChg>
-        <pc:spChg chg="mod">
-          <ac:chgData name="Matthieu De Mari" userId="dfb708c9-d8dc-439f-9a3b-c772bf4a311c" providerId="ADAL" clId="{5AF9E225-0E3D-4808-B523-40F6E9A1D59D}" dt="2023-03-02T07:21:45.407" v="1205"/>
-          <ac:spMkLst>
-            <pc:docMk/>
-            <pc:sldMk cId="961845771" sldId="271"/>
-            <ac:spMk id="8" creationId="{8D7715D0-7C6F-FE4B-319D-81CC8F353AF3}"/>
-          </ac:spMkLst>
-        </pc:spChg>
-      </pc:sldChg>
-      <pc:sldChg chg="addSp delSp modSp new mod ord modClrScheme chgLayout">
-        <pc:chgData name="Matthieu De Mari" userId="dfb708c9-d8dc-439f-9a3b-c772bf4a311c" providerId="ADAL" clId="{5AF9E225-0E3D-4808-B523-40F6E9A1D59D}" dt="2023-03-02T07:31:21.011" v="1491" actId="20577"/>
-        <pc:sldMkLst>
-          <pc:docMk/>
-          <pc:sldMk cId="1628130454" sldId="272"/>
-        </pc:sldMkLst>
-        <pc:spChg chg="mod ord">
-          <ac:chgData name="Matthieu De Mari" userId="dfb708c9-d8dc-439f-9a3b-c772bf4a311c" providerId="ADAL" clId="{5AF9E225-0E3D-4808-B523-40F6E9A1D59D}" dt="2023-03-02T07:27:42.339" v="1322" actId="700"/>
-          <ac:spMkLst>
-            <pc:docMk/>
-            <pc:sldMk cId="1628130454" sldId="272"/>
-            <ac:spMk id="2" creationId="{A5B0BCE0-A549-1A7B-6F4B-B0C1C98DE2A1}"/>
-          </ac:spMkLst>
-        </pc:spChg>
-        <pc:spChg chg="mod ord">
-          <ac:chgData name="Matthieu De Mari" userId="dfb708c9-d8dc-439f-9a3b-c772bf4a311c" providerId="ADAL" clId="{5AF9E225-0E3D-4808-B523-40F6E9A1D59D}" dt="2023-03-02T07:31:21.011" v="1491" actId="20577"/>
-          <ac:spMkLst>
-            <pc:docMk/>
-            <pc:sldMk cId="1628130454" sldId="272"/>
-            <ac:spMk id="3" creationId="{047FD354-275A-C734-E17F-FED0638E05F9}"/>
-          </ac:spMkLst>
-        </pc:spChg>
-        <pc:spChg chg="add del mod ord">
-          <ac:chgData name="Matthieu De Mari" userId="dfb708c9-d8dc-439f-9a3b-c772bf4a311c" providerId="ADAL" clId="{5AF9E225-0E3D-4808-B523-40F6E9A1D59D}" dt="2023-03-02T07:28:28.867" v="1352" actId="478"/>
-          <ac:spMkLst>
-            <pc:docMk/>
-            <pc:sldMk cId="1628130454" sldId="272"/>
-            <ac:spMk id="4" creationId="{9F1CFCE2-90FF-701C-0226-3759FF2D030B}"/>
-          </ac:spMkLst>
-        </pc:spChg>
-        <pc:picChg chg="add mod">
-          <ac:chgData name="Matthieu De Mari" userId="dfb708c9-d8dc-439f-9a3b-c772bf4a311c" providerId="ADAL" clId="{5AF9E225-0E3D-4808-B523-40F6E9A1D59D}" dt="2023-03-02T07:29:17.928" v="1360" actId="14100"/>
-          <ac:picMkLst>
-            <pc:docMk/>
-            <pc:sldMk cId="1628130454" sldId="272"/>
-            <ac:picMk id="6" creationId="{55CD7F81-A6B6-798E-DD89-DC8670C0DE2C}"/>
-          </ac:picMkLst>
-        </pc:picChg>
-      </pc:sldChg>
-      <pc:sldChg chg="addSp delSp modSp add mod modClrScheme chgLayout">
-        <pc:chgData name="Matthieu De Mari" userId="dfb708c9-d8dc-439f-9a3b-c772bf4a311c" providerId="ADAL" clId="{5AF9E225-0E3D-4808-B523-40F6E9A1D59D}" dt="2023-03-02T07:30:59.874" v="1470" actId="1076"/>
-        <pc:sldMkLst>
-          <pc:docMk/>
-          <pc:sldMk cId="3014069118" sldId="273"/>
-        </pc:sldMkLst>
-        <pc:spChg chg="mod ord">
-          <ac:chgData name="Matthieu De Mari" userId="dfb708c9-d8dc-439f-9a3b-c772bf4a311c" providerId="ADAL" clId="{5AF9E225-0E3D-4808-B523-40F6E9A1D59D}" dt="2023-03-02T07:29:57.759" v="1365" actId="700"/>
-          <ac:spMkLst>
-            <pc:docMk/>
-            <pc:sldMk cId="3014069118" sldId="273"/>
-            <ac:spMk id="2" creationId="{A5B0BCE0-A549-1A7B-6F4B-B0C1C98DE2A1}"/>
-          </ac:spMkLst>
-        </pc:spChg>
-        <pc:spChg chg="mod ord">
-          <ac:chgData name="Matthieu De Mari" userId="dfb708c9-d8dc-439f-9a3b-c772bf4a311c" providerId="ADAL" clId="{5AF9E225-0E3D-4808-B523-40F6E9A1D59D}" dt="2023-03-02T07:30:54.086" v="1468" actId="113"/>
-          <ac:spMkLst>
-            <pc:docMk/>
-            <pc:sldMk cId="3014069118" sldId="273"/>
-            <ac:spMk id="3" creationId="{047FD354-275A-C734-E17F-FED0638E05F9}"/>
-          </ac:spMkLst>
-        </pc:spChg>
-        <pc:picChg chg="add mod">
-          <ac:chgData name="Matthieu De Mari" userId="dfb708c9-d8dc-439f-9a3b-c772bf4a311c" providerId="ADAL" clId="{5AF9E225-0E3D-4808-B523-40F6E9A1D59D}" dt="2023-03-02T07:30:59.874" v="1470" actId="1076"/>
-          <ac:picMkLst>
-            <pc:docMk/>
-            <pc:sldMk cId="3014069118" sldId="273"/>
-            <ac:picMk id="5" creationId="{EABBBED6-4EB2-7ACD-C156-5A730591D325}"/>
-          </ac:picMkLst>
-        </pc:picChg>
-        <pc:picChg chg="del">
-          <ac:chgData name="Matthieu De Mari" userId="dfb708c9-d8dc-439f-9a3b-c772bf4a311c" providerId="ADAL" clId="{5AF9E225-0E3D-4808-B523-40F6E9A1D59D}" dt="2023-03-02T07:29:43.179" v="1362" actId="478"/>
-          <ac:picMkLst>
-            <pc:docMk/>
-            <pc:sldMk cId="3014069118" sldId="273"/>
-            <ac:picMk id="6" creationId="{55CD7F81-A6B6-798E-DD89-DC8670C0DE2C}"/>
-          </ac:picMkLst>
-        </pc:picChg>
-      </pc:sldChg>
-      <pc:sldChg chg="addSp delSp modSp new mod modClrScheme chgLayout">
-        <pc:chgData name="Matthieu De Mari" userId="dfb708c9-d8dc-439f-9a3b-c772bf4a311c" providerId="ADAL" clId="{5AF9E225-0E3D-4808-B523-40F6E9A1D59D}" dt="2023-03-02T09:06:53.193" v="4236" actId="20577"/>
-        <pc:sldMkLst>
-          <pc:docMk/>
-          <pc:sldMk cId="1813455260" sldId="274"/>
-        </pc:sldMkLst>
-        <pc:spChg chg="mod ord">
-          <ac:chgData name="Matthieu De Mari" userId="dfb708c9-d8dc-439f-9a3b-c772bf4a311c" providerId="ADAL" clId="{5AF9E225-0E3D-4808-B523-40F6E9A1D59D}" dt="2023-03-02T07:32:29.963" v="1598" actId="700"/>
-          <ac:spMkLst>
-            <pc:docMk/>
-            <pc:sldMk cId="1813455260" sldId="274"/>
-            <ac:spMk id="2" creationId="{87657C29-1A3B-9090-2528-30E69AB94051}"/>
-          </ac:spMkLst>
-        </pc:spChg>
-        <pc:spChg chg="del mod ord">
-          <ac:chgData name="Matthieu De Mari" userId="dfb708c9-d8dc-439f-9a3b-c772bf4a311c" providerId="ADAL" clId="{5AF9E225-0E3D-4808-B523-40F6E9A1D59D}" dt="2023-03-02T07:31:51.685" v="1527" actId="700"/>
-          <ac:spMkLst>
-            <pc:docMk/>
-            <pc:sldMk cId="1813455260" sldId="274"/>
-            <ac:spMk id="3" creationId="{AC40E2B5-7E38-9BFA-56AD-20E1020751DC}"/>
-          </ac:spMkLst>
-        </pc:spChg>
-        <pc:spChg chg="del">
-          <ac:chgData name="Matthieu De Mari" userId="dfb708c9-d8dc-439f-9a3b-c772bf4a311c" providerId="ADAL" clId="{5AF9E225-0E3D-4808-B523-40F6E9A1D59D}" dt="2023-03-02T07:31:51.685" v="1527" actId="700"/>
-          <ac:spMkLst>
-            <pc:docMk/>
-            <pc:sldMk cId="1813455260" sldId="274"/>
-            <ac:spMk id="4" creationId="{2639C806-2795-6959-3B91-90B6BF904949}"/>
-          </ac:spMkLst>
-        </pc:spChg>
-        <pc:spChg chg="add mod ord">
-          <ac:chgData name="Matthieu De Mari" userId="dfb708c9-d8dc-439f-9a3b-c772bf4a311c" providerId="ADAL" clId="{5AF9E225-0E3D-4808-B523-40F6E9A1D59D}" dt="2023-03-02T09:06:53.193" v="4236" actId="20577"/>
-          <ac:spMkLst>
-            <pc:docMk/>
-            <pc:sldMk cId="1813455260" sldId="274"/>
-            <ac:spMk id="5" creationId="{2B13EA12-F42E-A14F-570D-C7B3FB0BA678}"/>
-          </ac:spMkLst>
-        </pc:spChg>
-        <pc:spChg chg="add del mod ord">
-          <ac:chgData name="Matthieu De Mari" userId="dfb708c9-d8dc-439f-9a3b-c772bf4a311c" providerId="ADAL" clId="{5AF9E225-0E3D-4808-B523-40F6E9A1D59D}" dt="2023-03-02T07:33:05.793" v="1635" actId="478"/>
-          <ac:spMkLst>
-            <pc:docMk/>
-            <pc:sldMk cId="1813455260" sldId="274"/>
-            <ac:spMk id="6" creationId="{FCCBF918-C626-4BAB-C761-B4C7DCCDB4C7}"/>
-          </ac:spMkLst>
-        </pc:spChg>
-        <pc:picChg chg="add mod">
-          <ac:chgData name="Matthieu De Mari" userId="dfb708c9-d8dc-439f-9a3b-c772bf4a311c" providerId="ADAL" clId="{5AF9E225-0E3D-4808-B523-40F6E9A1D59D}" dt="2023-03-02T07:33:14.798" v="1639"/>
-          <ac:picMkLst>
-            <pc:docMk/>
-            <pc:sldMk cId="1813455260" sldId="274"/>
-            <ac:picMk id="7" creationId="{8D7AE188-3FCF-9638-BCBC-D80FAEB83789}"/>
-          </ac:picMkLst>
-        </pc:picChg>
-      </pc:sldChg>
-      <pc:sldChg chg="addSp modSp add mod modClrScheme chgLayout">
-        <pc:chgData name="Matthieu De Mari" userId="dfb708c9-d8dc-439f-9a3b-c772bf4a311c" providerId="ADAL" clId="{5AF9E225-0E3D-4808-B523-40F6E9A1D59D}" dt="2023-03-02T08:43:42.183" v="3020" actId="13822"/>
-        <pc:sldMkLst>
-          <pc:docMk/>
-          <pc:sldMk cId="144954399" sldId="275"/>
-        </pc:sldMkLst>
-        <pc:spChg chg="mod ord">
-          <ac:chgData name="Matthieu De Mari" userId="dfb708c9-d8dc-439f-9a3b-c772bf4a311c" providerId="ADAL" clId="{5AF9E225-0E3D-4808-B523-40F6E9A1D59D}" dt="2023-03-02T07:46:08.814" v="2131" actId="700"/>
-          <ac:spMkLst>
-            <pc:docMk/>
-            <pc:sldMk cId="144954399" sldId="275"/>
-            <ac:spMk id="2" creationId="{87657C29-1A3B-9090-2528-30E69AB94051}"/>
-          </ac:spMkLst>
-        </pc:spChg>
-        <pc:spChg chg="mod ord">
-          <ac:chgData name="Matthieu De Mari" userId="dfb708c9-d8dc-439f-9a3b-c772bf4a311c" providerId="ADAL" clId="{5AF9E225-0E3D-4808-B523-40F6E9A1D59D}" dt="2023-03-02T07:46:08.814" v="2131" actId="700"/>
-          <ac:spMkLst>
-            <pc:docMk/>
-            <pc:sldMk cId="144954399" sldId="275"/>
-            <ac:spMk id="5" creationId="{2B13EA12-F42E-A14F-570D-C7B3FB0BA678}"/>
-          </ac:spMkLst>
-        </pc:spChg>
-        <pc:spChg chg="add mod">
-          <ac:chgData name="Matthieu De Mari" userId="dfb708c9-d8dc-439f-9a3b-c772bf4a311c" providerId="ADAL" clId="{5AF9E225-0E3D-4808-B523-40F6E9A1D59D}" dt="2023-03-02T07:48:05.307" v="2259"/>
-          <ac:spMkLst>
-            <pc:docMk/>
-            <pc:sldMk cId="144954399" sldId="275"/>
-            <ac:spMk id="6" creationId="{57C7ED51-0A97-1822-42FD-5AA2C9F30400}"/>
-          </ac:spMkLst>
-        </pc:spChg>
-        <pc:spChg chg="add mod">
-          <ac:chgData name="Matthieu De Mari" userId="dfb708c9-d8dc-439f-9a3b-c772bf4a311c" providerId="ADAL" clId="{5AF9E225-0E3D-4808-B523-40F6E9A1D59D}" dt="2023-03-02T08:43:42.183" v="3020" actId="13822"/>
-          <ac:spMkLst>
-            <pc:docMk/>
-            <pc:sldMk cId="144954399" sldId="275"/>
-            <ac:spMk id="7" creationId="{ECF836CD-AD6D-AE6D-BD12-76C872F50BA1}"/>
-          </ac:spMkLst>
-        </pc:spChg>
-        <pc:picChg chg="add mod">
-          <ac:chgData name="Matthieu De Mari" userId="dfb708c9-d8dc-439f-9a3b-c772bf4a311c" providerId="ADAL" clId="{5AF9E225-0E3D-4808-B523-40F6E9A1D59D}" dt="2023-03-02T07:46:16.390" v="2137" actId="1076"/>
-          <ac:picMkLst>
-            <pc:docMk/>
-            <pc:sldMk cId="144954399" sldId="275"/>
-            <ac:picMk id="4" creationId="{516B1709-7CCB-DAA9-4D13-D59FB8BB267D}"/>
-          </ac:picMkLst>
-        </pc:picChg>
-      </pc:sldChg>
-      <pc:sldChg chg="modSp add mod modClrScheme chgLayout">
-        <pc:chgData name="Matthieu De Mari" userId="dfb708c9-d8dc-439f-9a3b-c772bf4a311c" providerId="ADAL" clId="{5AF9E225-0E3D-4808-B523-40F6E9A1D59D}" dt="2023-03-02T08:31:32.489" v="2596" actId="20577"/>
-        <pc:sldMkLst>
-          <pc:docMk/>
-          <pc:sldMk cId="4217769597" sldId="276"/>
-        </pc:sldMkLst>
-        <pc:spChg chg="mod ord">
-          <ac:chgData name="Matthieu De Mari" userId="dfb708c9-d8dc-439f-9a3b-c772bf4a311c" providerId="ADAL" clId="{5AF9E225-0E3D-4808-B523-40F6E9A1D59D}" dt="2023-03-02T08:27:57.452" v="2453" actId="700"/>
-          <ac:spMkLst>
-            <pc:docMk/>
-            <pc:sldMk cId="4217769597" sldId="276"/>
-            <ac:spMk id="2" creationId="{87657C29-1A3B-9090-2528-30E69AB94051}"/>
-          </ac:spMkLst>
-        </pc:spChg>
-        <pc:spChg chg="mod ord">
-          <ac:chgData name="Matthieu De Mari" userId="dfb708c9-d8dc-439f-9a3b-c772bf4a311c" providerId="ADAL" clId="{5AF9E225-0E3D-4808-B523-40F6E9A1D59D}" dt="2023-03-02T08:31:32.489" v="2596" actId="20577"/>
-          <ac:spMkLst>
-            <pc:docMk/>
-            <pc:sldMk cId="4217769597" sldId="276"/>
-            <ac:spMk id="5" creationId="{2B13EA12-F42E-A14F-570D-C7B3FB0BA678}"/>
-          </ac:spMkLst>
-        </pc:spChg>
-      </pc:sldChg>
-      <pc:sldChg chg="modSp add mod modClrScheme chgLayout">
-        <pc:chgData name="Matthieu De Mari" userId="dfb708c9-d8dc-439f-9a3b-c772bf4a311c" providerId="ADAL" clId="{5AF9E225-0E3D-4808-B523-40F6E9A1D59D}" dt="2023-03-02T09:05:04.931" v="4179" actId="207"/>
-        <pc:sldMkLst>
-          <pc:docMk/>
-          <pc:sldMk cId="1233188664" sldId="277"/>
-        </pc:sldMkLst>
-        <pc:spChg chg="mod ord">
-          <ac:chgData name="Matthieu De Mari" userId="dfb708c9-d8dc-439f-9a3b-c772bf4a311c" providerId="ADAL" clId="{5AF9E225-0E3D-4808-B523-40F6E9A1D59D}" dt="2023-03-02T08:51:43.961" v="3323" actId="700"/>
-          <ac:spMkLst>
-            <pc:docMk/>
-            <pc:sldMk cId="1233188664" sldId="277"/>
-            <ac:spMk id="2" creationId="{87657C29-1A3B-9090-2528-30E69AB94051}"/>
-          </ac:spMkLst>
-        </pc:spChg>
-        <pc:spChg chg="mod ord">
-          <ac:chgData name="Matthieu De Mari" userId="dfb708c9-d8dc-439f-9a3b-c772bf4a311c" providerId="ADAL" clId="{5AF9E225-0E3D-4808-B523-40F6E9A1D59D}" dt="2023-03-02T09:05:04.931" v="4179" actId="207"/>
-          <ac:spMkLst>
-            <pc:docMk/>
-            <pc:sldMk cId="1233188664" sldId="277"/>
-            <ac:spMk id="5" creationId="{2B13EA12-F42E-A14F-570D-C7B3FB0BA678}"/>
-          </ac:spMkLst>
-        </pc:spChg>
-      </pc:sldChg>
-      <pc:sldChg chg="addSp modSp add mod chgLayout">
-        <pc:chgData name="Matthieu De Mari" userId="dfb708c9-d8dc-439f-9a3b-c772bf4a311c" providerId="ADAL" clId="{5AF9E225-0E3D-4808-B523-40F6E9A1D59D}" dt="2023-03-02T07:40:29.138" v="1964" actId="20577"/>
-        <pc:sldMkLst>
-          <pc:docMk/>
-          <pc:sldMk cId="885607022" sldId="278"/>
-        </pc:sldMkLst>
-        <pc:spChg chg="mod ord">
-          <ac:chgData name="Matthieu De Mari" userId="dfb708c9-d8dc-439f-9a3b-c772bf4a311c" providerId="ADAL" clId="{5AF9E225-0E3D-4808-B523-40F6E9A1D59D}" dt="2023-03-02T07:37:04.336" v="1795" actId="700"/>
-          <ac:spMkLst>
-            <pc:docMk/>
-            <pc:sldMk cId="885607022" sldId="278"/>
-            <ac:spMk id="2" creationId="{87657C29-1A3B-9090-2528-30E69AB94051}"/>
-          </ac:spMkLst>
-        </pc:spChg>
-        <pc:spChg chg="add mod ord">
-          <ac:chgData name="Matthieu De Mari" userId="dfb708c9-d8dc-439f-9a3b-c772bf4a311c" providerId="ADAL" clId="{5AF9E225-0E3D-4808-B523-40F6E9A1D59D}" dt="2023-03-02T07:40:29.138" v="1964" actId="20577"/>
-          <ac:spMkLst>
-            <pc:docMk/>
-            <pc:sldMk cId="885607022" sldId="278"/>
-            <ac:spMk id="3" creationId="{E1F7AF25-2360-31D8-D5BF-56EDDD31008D}"/>
-          </ac:spMkLst>
-        </pc:spChg>
-        <pc:spChg chg="mod ord">
-          <ac:chgData name="Matthieu De Mari" userId="dfb708c9-d8dc-439f-9a3b-c772bf4a311c" providerId="ADAL" clId="{5AF9E225-0E3D-4808-B523-40F6E9A1D59D}" dt="2023-03-02T07:40:27.571" v="1961" actId="27636"/>
-          <ac:spMkLst>
-            <pc:docMk/>
-            <pc:sldMk cId="885607022" sldId="278"/>
-            <ac:spMk id="5" creationId="{2B13EA12-F42E-A14F-570D-C7B3FB0BA678}"/>
-          </ac:spMkLst>
-        </pc:spChg>
-      </pc:sldChg>
-      <pc:sldChg chg="modSp add mod">
-        <pc:chgData name="Matthieu De Mari" userId="dfb708c9-d8dc-439f-9a3b-c772bf4a311c" providerId="ADAL" clId="{5AF9E225-0E3D-4808-B523-40F6E9A1D59D}" dt="2023-03-02T07:41:39.244" v="2020" actId="27636"/>
-        <pc:sldMkLst>
-          <pc:docMk/>
-          <pc:sldMk cId="3941141626" sldId="279"/>
-        </pc:sldMkLst>
-        <pc:spChg chg="mod">
-          <ac:chgData name="Matthieu De Mari" userId="dfb708c9-d8dc-439f-9a3b-c772bf4a311c" providerId="ADAL" clId="{5AF9E225-0E3D-4808-B523-40F6E9A1D59D}" dt="2023-03-02T07:41:39.244" v="2020" actId="27636"/>
-          <ac:spMkLst>
-            <pc:docMk/>
-            <pc:sldMk cId="3941141626" sldId="279"/>
-            <ac:spMk id="3" creationId="{E1F7AF25-2360-31D8-D5BF-56EDDD31008D}"/>
-          </ac:spMkLst>
-        </pc:spChg>
-        <pc:spChg chg="mod">
-          <ac:chgData name="Matthieu De Mari" userId="dfb708c9-d8dc-439f-9a3b-c772bf4a311c" providerId="ADAL" clId="{5AF9E225-0E3D-4808-B523-40F6E9A1D59D}" dt="2023-03-02T07:41:39.243" v="2019" actId="27636"/>
-          <ac:spMkLst>
-            <pc:docMk/>
-            <pc:sldMk cId="3941141626" sldId="279"/>
-            <ac:spMk id="5" creationId="{2B13EA12-F42E-A14F-570D-C7B3FB0BA678}"/>
-          </ac:spMkLst>
-        </pc:spChg>
-      </pc:sldChg>
-      <pc:sldChg chg="modSp add mod">
-        <pc:chgData name="Matthieu De Mari" userId="dfb708c9-d8dc-439f-9a3b-c772bf4a311c" providerId="ADAL" clId="{5AF9E225-0E3D-4808-B523-40F6E9A1D59D}" dt="2023-03-02T07:42:09.869" v="2043" actId="14100"/>
-        <pc:sldMkLst>
-          <pc:docMk/>
-          <pc:sldMk cId="2409304258" sldId="280"/>
-        </pc:sldMkLst>
-        <pc:spChg chg="mod">
-          <ac:chgData name="Matthieu De Mari" userId="dfb708c9-d8dc-439f-9a3b-c772bf4a311c" providerId="ADAL" clId="{5AF9E225-0E3D-4808-B523-40F6E9A1D59D}" dt="2023-03-02T07:42:09.869" v="2043" actId="14100"/>
-          <ac:spMkLst>
-            <pc:docMk/>
-            <pc:sldMk cId="2409304258" sldId="280"/>
-            <ac:spMk id="3" creationId="{E1F7AF25-2360-31D8-D5BF-56EDDD31008D}"/>
-          </ac:spMkLst>
-        </pc:spChg>
-        <pc:spChg chg="mod">
-          <ac:chgData name="Matthieu De Mari" userId="dfb708c9-d8dc-439f-9a3b-c772bf4a311c" providerId="ADAL" clId="{5AF9E225-0E3D-4808-B523-40F6E9A1D59D}" dt="2023-03-02T07:38:04.822" v="1837" actId="27636"/>
-          <ac:spMkLst>
-            <pc:docMk/>
-            <pc:sldMk cId="2409304258" sldId="280"/>
-            <ac:spMk id="5" creationId="{2B13EA12-F42E-A14F-570D-C7B3FB0BA678}"/>
-          </ac:spMkLst>
-        </pc:spChg>
-      </pc:sldChg>
-      <pc:sldChg chg="modSp add mod">
-        <pc:chgData name="Matthieu De Mari" userId="dfb708c9-d8dc-439f-9a3b-c772bf4a311c" providerId="ADAL" clId="{5AF9E225-0E3D-4808-B523-40F6E9A1D59D}" dt="2023-03-02T07:43:05.203" v="2098" actId="27636"/>
-        <pc:sldMkLst>
-          <pc:docMk/>
-          <pc:sldMk cId="2949375831" sldId="281"/>
-        </pc:sldMkLst>
-        <pc:spChg chg="mod">
-          <ac:chgData name="Matthieu De Mari" userId="dfb708c9-d8dc-439f-9a3b-c772bf4a311c" providerId="ADAL" clId="{5AF9E225-0E3D-4808-B523-40F6E9A1D59D}" dt="2023-03-02T07:43:05.203" v="2098" actId="27636"/>
-          <ac:spMkLst>
-            <pc:docMk/>
-            <pc:sldMk cId="2949375831" sldId="281"/>
-            <ac:spMk id="3" creationId="{E1F7AF25-2360-31D8-D5BF-56EDDD31008D}"/>
-          </ac:spMkLst>
-        </pc:spChg>
-        <pc:spChg chg="mod">
-          <ac:chgData name="Matthieu De Mari" userId="dfb708c9-d8dc-439f-9a3b-c772bf4a311c" providerId="ADAL" clId="{5AF9E225-0E3D-4808-B523-40F6E9A1D59D}" dt="2023-03-02T07:43:05.202" v="2097" actId="27636"/>
-          <ac:spMkLst>
-            <pc:docMk/>
-            <pc:sldMk cId="2949375831" sldId="281"/>
-            <ac:spMk id="5" creationId="{2B13EA12-F42E-A14F-570D-C7B3FB0BA678}"/>
-          </ac:spMkLst>
-        </pc:spChg>
-      </pc:sldChg>
-      <pc:sldChg chg="addSp delSp modSp add mod modClrScheme chgLayout">
-        <pc:chgData name="Matthieu De Mari" userId="dfb708c9-d8dc-439f-9a3b-c772bf4a311c" providerId="ADAL" clId="{5AF9E225-0E3D-4808-B523-40F6E9A1D59D}" dt="2023-03-02T08:43:47.428" v="3024"/>
-        <pc:sldMkLst>
-          <pc:docMk/>
-          <pc:sldMk cId="2432782764" sldId="282"/>
-        </pc:sldMkLst>
-        <pc:spChg chg="mod ord">
-          <ac:chgData name="Matthieu De Mari" userId="dfb708c9-d8dc-439f-9a3b-c772bf4a311c" providerId="ADAL" clId="{5AF9E225-0E3D-4808-B523-40F6E9A1D59D}" dt="2023-03-02T07:46:22.611" v="2138" actId="700"/>
-          <ac:spMkLst>
-            <pc:docMk/>
-            <pc:sldMk cId="2432782764" sldId="282"/>
-            <ac:spMk id="2" creationId="{87657C29-1A3B-9090-2528-30E69AB94051}"/>
-          </ac:spMkLst>
-        </pc:spChg>
-        <pc:spChg chg="mod ord">
-          <ac:chgData name="Matthieu De Mari" userId="dfb708c9-d8dc-439f-9a3b-c772bf4a311c" providerId="ADAL" clId="{5AF9E225-0E3D-4808-B523-40F6E9A1D59D}" dt="2023-03-02T07:46:22.611" v="2138" actId="700"/>
-          <ac:spMkLst>
-            <pc:docMk/>
-            <pc:sldMk cId="2432782764" sldId="282"/>
-            <ac:spMk id="5" creationId="{2B13EA12-F42E-A14F-570D-C7B3FB0BA678}"/>
-          </ac:spMkLst>
-        </pc:spChg>
-        <pc:spChg chg="add mod">
-          <ac:chgData name="Matthieu De Mari" userId="dfb708c9-d8dc-439f-9a3b-c772bf4a311c" providerId="ADAL" clId="{5AF9E225-0E3D-4808-B523-40F6E9A1D59D}" dt="2023-03-02T07:47:45.570" v="2255" actId="207"/>
-          <ac:spMkLst>
-            <pc:docMk/>
-            <pc:sldMk cId="2432782764" sldId="282"/>
-            <ac:spMk id="7" creationId="{6CF83D07-FBDA-1E76-E13D-3426B0ACC273}"/>
-          </ac:spMkLst>
-        </pc:spChg>
-        <pc:spChg chg="add del mod">
-          <ac:chgData name="Matthieu De Mari" userId="dfb708c9-d8dc-439f-9a3b-c772bf4a311c" providerId="ADAL" clId="{5AF9E225-0E3D-4808-B523-40F6E9A1D59D}" dt="2023-03-02T08:43:47.159" v="3023" actId="478"/>
-          <ac:spMkLst>
-            <pc:docMk/>
-            <pc:sldMk cId="2432782764" sldId="282"/>
-            <ac:spMk id="8" creationId="{04EAF616-AA82-5F60-E888-F7F6AB6D0795}"/>
-          </ac:spMkLst>
-        </pc:spChg>
-        <pc:spChg chg="add del mod">
-          <ac:chgData name="Matthieu De Mari" userId="dfb708c9-d8dc-439f-9a3b-c772bf4a311c" providerId="ADAL" clId="{5AF9E225-0E3D-4808-B523-40F6E9A1D59D}" dt="2023-03-02T08:43:45.894" v="3022"/>
-          <ac:spMkLst>
-            <pc:docMk/>
-            <pc:sldMk cId="2432782764" sldId="282"/>
-            <ac:spMk id="9" creationId="{6B94BEC5-C520-DF1D-B129-0692B33C7FC4}"/>
-          </ac:spMkLst>
-        </pc:spChg>
-        <pc:spChg chg="add mod">
-          <ac:chgData name="Matthieu De Mari" userId="dfb708c9-d8dc-439f-9a3b-c772bf4a311c" providerId="ADAL" clId="{5AF9E225-0E3D-4808-B523-40F6E9A1D59D}" dt="2023-03-02T08:43:47.428" v="3024"/>
-          <ac:spMkLst>
-            <pc:docMk/>
-            <pc:sldMk cId="2432782764" sldId="282"/>
-            <ac:spMk id="10" creationId="{73593546-FFB2-D679-BBCF-20BC29CA5856}"/>
-          </ac:spMkLst>
-        </pc:spChg>
-        <pc:picChg chg="add del mod">
-          <ac:chgData name="Matthieu De Mari" userId="dfb708c9-d8dc-439f-9a3b-c772bf4a311c" providerId="ADAL" clId="{5AF9E225-0E3D-4808-B523-40F6E9A1D59D}" dt="2023-03-02T07:46:27.657" v="2142" actId="478"/>
-          <ac:picMkLst>
-            <pc:docMk/>
-            <pc:sldMk cId="2432782764" sldId="282"/>
-            <ac:picMk id="4" creationId="{C892ADDA-3564-C985-379F-45F5A4461107}"/>
-          </ac:picMkLst>
-        </pc:picChg>
-        <pc:picChg chg="add mod">
-          <ac:chgData name="Matthieu De Mari" userId="dfb708c9-d8dc-439f-9a3b-c772bf4a311c" providerId="ADAL" clId="{5AF9E225-0E3D-4808-B523-40F6E9A1D59D}" dt="2023-03-02T07:46:27.944" v="2143"/>
-          <ac:picMkLst>
-            <pc:docMk/>
-            <pc:sldMk cId="2432782764" sldId="282"/>
-            <ac:picMk id="6" creationId="{2480711A-E210-4C5D-D509-EF0C9E63A10A}"/>
-          </ac:picMkLst>
-        </pc:picChg>
-      </pc:sldChg>
-      <pc:sldChg chg="modSp add del mod modClrScheme chgLayout">
-        <pc:chgData name="Matthieu De Mari" userId="dfb708c9-d8dc-439f-9a3b-c772bf4a311c" providerId="ADAL" clId="{5AF9E225-0E3D-4808-B523-40F6E9A1D59D}" dt="2023-03-02T07:50:30.713" v="2314" actId="47"/>
-        <pc:sldMkLst>
-          <pc:docMk/>
-          <pc:sldMk cId="3346743662" sldId="283"/>
-        </pc:sldMkLst>
-        <pc:spChg chg="mod ord">
-          <ac:chgData name="Matthieu De Mari" userId="dfb708c9-d8dc-439f-9a3b-c772bf4a311c" providerId="ADAL" clId="{5AF9E225-0E3D-4808-B523-40F6E9A1D59D}" dt="2023-03-02T07:48:42.616" v="2276" actId="700"/>
-          <ac:spMkLst>
-            <pc:docMk/>
-            <pc:sldMk cId="3346743662" sldId="283"/>
-            <ac:spMk id="2" creationId="{87657C29-1A3B-9090-2528-30E69AB94051}"/>
-          </ac:spMkLst>
-        </pc:spChg>
-        <pc:spChg chg="mod ord">
-          <ac:chgData name="Matthieu De Mari" userId="dfb708c9-d8dc-439f-9a3b-c772bf4a311c" providerId="ADAL" clId="{5AF9E225-0E3D-4808-B523-40F6E9A1D59D}" dt="2023-03-02T07:49:41.866" v="2304" actId="27636"/>
-          <ac:spMkLst>
-            <pc:docMk/>
-            <pc:sldMk cId="3346743662" sldId="283"/>
-            <ac:spMk id="5" creationId="{2B13EA12-F42E-A14F-570D-C7B3FB0BA678}"/>
-          </ac:spMkLst>
-        </pc:spChg>
-      </pc:sldChg>
-      <pc:sldChg chg="modSp add mod">
-        <pc:chgData name="Matthieu De Mari" userId="dfb708c9-d8dc-439f-9a3b-c772bf4a311c" providerId="ADAL" clId="{5AF9E225-0E3D-4808-B523-40F6E9A1D59D}" dt="2023-03-02T08:49:01.268" v="3268" actId="20577"/>
-        <pc:sldMkLst>
-          <pc:docMk/>
-          <pc:sldMk cId="3869391851" sldId="284"/>
-        </pc:sldMkLst>
-        <pc:spChg chg="mod">
-          <ac:chgData name="Matthieu De Mari" userId="dfb708c9-d8dc-439f-9a3b-c772bf4a311c" providerId="ADAL" clId="{5AF9E225-0E3D-4808-B523-40F6E9A1D59D}" dt="2023-03-02T08:49:01.268" v="3268" actId="20577"/>
-          <ac:spMkLst>
-            <pc:docMk/>
-            <pc:sldMk cId="3869391851" sldId="284"/>
-            <ac:spMk id="2" creationId="{87657C29-1A3B-9090-2528-30E69AB94051}"/>
-          </ac:spMkLst>
-        </pc:spChg>
-        <pc:spChg chg="mod">
-          <ac:chgData name="Matthieu De Mari" userId="dfb708c9-d8dc-439f-9a3b-c772bf4a311c" providerId="ADAL" clId="{5AF9E225-0E3D-4808-B523-40F6E9A1D59D}" dt="2023-03-02T08:04:58.800" v="2394" actId="20577"/>
-          <ac:spMkLst>
-            <pc:docMk/>
-            <pc:sldMk cId="3869391851" sldId="284"/>
-            <ac:spMk id="5" creationId="{2B13EA12-F42E-A14F-570D-C7B3FB0BA678}"/>
-          </ac:spMkLst>
-        </pc:spChg>
-      </pc:sldChg>
-      <pc:sldChg chg="modSp add mod ord">
-        <pc:chgData name="Matthieu De Mari" userId="dfb708c9-d8dc-439f-9a3b-c772bf4a311c" providerId="ADAL" clId="{5AF9E225-0E3D-4808-B523-40F6E9A1D59D}" dt="2023-03-02T08:47:17.468" v="3221" actId="20577"/>
-        <pc:sldMkLst>
-          <pc:docMk/>
-          <pc:sldMk cId="1567445271" sldId="285"/>
-        </pc:sldMkLst>
-        <pc:spChg chg="mod">
-          <ac:chgData name="Matthieu De Mari" userId="dfb708c9-d8dc-439f-9a3b-c772bf4a311c" providerId="ADAL" clId="{5AF9E225-0E3D-4808-B523-40F6E9A1D59D}" dt="2023-03-02T07:52:47.820" v="2380" actId="20577"/>
-          <ac:spMkLst>
-            <pc:docMk/>
-            <pc:sldMk cId="1567445271" sldId="285"/>
-            <ac:spMk id="2" creationId="{87657C29-1A3B-9090-2528-30E69AB94051}"/>
-          </ac:spMkLst>
-        </pc:spChg>
-        <pc:spChg chg="mod">
-          <ac:chgData name="Matthieu De Mari" userId="dfb708c9-d8dc-439f-9a3b-c772bf4a311c" providerId="ADAL" clId="{5AF9E225-0E3D-4808-B523-40F6E9A1D59D}" dt="2023-03-02T08:47:17.468" v="3221" actId="20577"/>
-          <ac:spMkLst>
-            <pc:docMk/>
-            <pc:sldMk cId="1567445271" sldId="285"/>
-            <ac:spMk id="5" creationId="{2B13EA12-F42E-A14F-570D-C7B3FB0BA678}"/>
-          </ac:spMkLst>
-        </pc:spChg>
-      </pc:sldChg>
-      <pc:sldChg chg="new del">
-        <pc:chgData name="Matthieu De Mari" userId="dfb708c9-d8dc-439f-9a3b-c772bf4a311c" providerId="ADAL" clId="{5AF9E225-0E3D-4808-B523-40F6E9A1D59D}" dt="2023-03-02T09:20:57.277" v="4650" actId="47"/>
-        <pc:sldMkLst>
-          <pc:docMk/>
-          <pc:sldMk cId="1786940851" sldId="286"/>
-        </pc:sldMkLst>
-      </pc:sldChg>
-      <pc:sldChg chg="addSp delSp modSp add del mod">
-        <pc:chgData name="Matthieu De Mari" userId="dfb708c9-d8dc-439f-9a3b-c772bf4a311c" providerId="ADAL" clId="{5AF9E225-0E3D-4808-B523-40F6E9A1D59D}" dt="2023-03-02T07:52:04.495" v="2352" actId="47"/>
-        <pc:sldMkLst>
-          <pc:docMk/>
-          <pc:sldMk cId="2521085326" sldId="286"/>
-        </pc:sldMkLst>
-        <pc:spChg chg="add del mod">
-          <ac:chgData name="Matthieu De Mari" userId="dfb708c9-d8dc-439f-9a3b-c772bf4a311c" providerId="ADAL" clId="{5AF9E225-0E3D-4808-B523-40F6E9A1D59D}" dt="2023-03-02T07:51:48.309" v="2347" actId="478"/>
-          <ac:spMkLst>
-            <pc:docMk/>
-            <pc:sldMk cId="2521085326" sldId="286"/>
-            <ac:spMk id="4" creationId="{EC0267C5-FD87-53BD-23F2-95BC6424A451}"/>
-          </ac:spMkLst>
-        </pc:spChg>
-        <pc:spChg chg="del">
-          <ac:chgData name="Matthieu De Mari" userId="dfb708c9-d8dc-439f-9a3b-c772bf4a311c" providerId="ADAL" clId="{5AF9E225-0E3D-4808-B523-40F6E9A1D59D}" dt="2023-03-02T07:51:46.715" v="2346" actId="478"/>
-          <ac:spMkLst>
-            <pc:docMk/>
-            <pc:sldMk cId="2521085326" sldId="286"/>
-            <ac:spMk id="5" creationId="{2B13EA12-F42E-A14F-570D-C7B3FB0BA678}"/>
-          </ac:spMkLst>
-        </pc:spChg>
-        <pc:picChg chg="add mod">
-          <ac:chgData name="Matthieu De Mari" userId="dfb708c9-d8dc-439f-9a3b-c772bf4a311c" providerId="ADAL" clId="{5AF9E225-0E3D-4808-B523-40F6E9A1D59D}" dt="2023-03-02T07:51:57.677" v="2351" actId="1076"/>
-          <ac:picMkLst>
-            <pc:docMk/>
-            <pc:sldMk cId="2521085326" sldId="286"/>
-            <ac:picMk id="6" creationId="{54BD047C-34A8-A322-5C03-52E78A2B8D91}"/>
-          </ac:picMkLst>
-        </pc:picChg>
-      </pc:sldChg>
-      <pc:sldChg chg="add">
-        <pc:chgData name="Matthieu De Mari" userId="dfb708c9-d8dc-439f-9a3b-c772bf4a311c" providerId="ADAL" clId="{5AF9E225-0E3D-4808-B523-40F6E9A1D59D}" dt="2023-03-02T08:31:29.223" v="2595" actId="2890"/>
-        <pc:sldMkLst>
-          <pc:docMk/>
-          <pc:sldMk cId="2870852187" sldId="287"/>
-        </pc:sldMkLst>
-      </pc:sldChg>
-      <pc:sldChg chg="addSp delSp modSp new mod modClrScheme chgLayout">
-        <pc:chgData name="Matthieu De Mari" userId="dfb708c9-d8dc-439f-9a3b-c772bf4a311c" providerId="ADAL" clId="{5AF9E225-0E3D-4808-B523-40F6E9A1D59D}" dt="2023-03-02T08:35:16.091" v="2758" actId="20577"/>
-        <pc:sldMkLst>
-          <pc:docMk/>
-          <pc:sldMk cId="3486387661" sldId="288"/>
-        </pc:sldMkLst>
-        <pc:spChg chg="del mod ord">
-          <ac:chgData name="Matthieu De Mari" userId="dfb708c9-d8dc-439f-9a3b-c772bf4a311c" providerId="ADAL" clId="{5AF9E225-0E3D-4808-B523-40F6E9A1D59D}" dt="2023-03-02T08:34:37.767" v="2642" actId="700"/>
-          <ac:spMkLst>
-            <pc:docMk/>
-            <pc:sldMk cId="3486387661" sldId="288"/>
-            <ac:spMk id="2" creationId="{F4612675-FCDC-5B37-9029-719409627A5A}"/>
-          </ac:spMkLst>
-        </pc:spChg>
-        <pc:spChg chg="mod ord">
-          <ac:chgData name="Matthieu De Mari" userId="dfb708c9-d8dc-439f-9a3b-c772bf4a311c" providerId="ADAL" clId="{5AF9E225-0E3D-4808-B523-40F6E9A1D59D}" dt="2023-03-02T08:34:40.381" v="2647" actId="27636"/>
-          <ac:spMkLst>
-            <pc:docMk/>
-            <pc:sldMk cId="3486387661" sldId="288"/>
-            <ac:spMk id="3" creationId="{C138818D-C6AF-E451-6FCE-ED2A40154B7A}"/>
-          </ac:spMkLst>
-        </pc:spChg>
-        <pc:spChg chg="add mod ord">
-          <ac:chgData name="Matthieu De Mari" userId="dfb708c9-d8dc-439f-9a3b-c772bf4a311c" providerId="ADAL" clId="{5AF9E225-0E3D-4808-B523-40F6E9A1D59D}" dt="2023-03-02T08:35:16.091" v="2758" actId="20577"/>
-          <ac:spMkLst>
-            <pc:docMk/>
-            <pc:sldMk cId="3486387661" sldId="288"/>
-            <ac:spMk id="4" creationId="{FAA00B7A-D40D-50C7-609B-A59B4EFABF43}"/>
-          </ac:spMkLst>
-        </pc:spChg>
-        <pc:spChg chg="add mod ord">
-          <ac:chgData name="Matthieu De Mari" userId="dfb708c9-d8dc-439f-9a3b-c772bf4a311c" providerId="ADAL" clId="{5AF9E225-0E3D-4808-B523-40F6E9A1D59D}" dt="2023-03-02T08:34:57.910" v="2721" actId="20577"/>
-          <ac:spMkLst>
-            <pc:docMk/>
-            <pc:sldMk cId="3486387661" sldId="288"/>
-            <ac:spMk id="5" creationId="{DC5B08FF-7D05-A1F5-35B7-5B067BDD0835}"/>
-          </ac:spMkLst>
-        </pc:spChg>
-        <pc:picChg chg="add mod">
-          <ac:chgData name="Matthieu De Mari" userId="dfb708c9-d8dc-439f-9a3b-c772bf4a311c" providerId="ADAL" clId="{5AF9E225-0E3D-4808-B523-40F6E9A1D59D}" dt="2023-03-02T08:35:03.377" v="2725" actId="1076"/>
-          <ac:picMkLst>
-            <pc:docMk/>
-            <pc:sldMk cId="3486387661" sldId="288"/>
-            <ac:picMk id="7" creationId="{080BFE84-9981-5B49-533B-D646CBF01988}"/>
-          </ac:picMkLst>
-        </pc:picChg>
-      </pc:sldChg>
-      <pc:sldChg chg="addSp delSp modSp add mod">
-        <pc:chgData name="Matthieu De Mari" userId="dfb708c9-d8dc-439f-9a3b-c772bf4a311c" providerId="ADAL" clId="{5AF9E225-0E3D-4808-B523-40F6E9A1D59D}" dt="2023-03-02T08:38:16.072" v="2894" actId="113"/>
-        <pc:sldMkLst>
-          <pc:docMk/>
-          <pc:sldMk cId="2118681498" sldId="289"/>
-        </pc:sldMkLst>
-        <pc:spChg chg="mod">
-          <ac:chgData name="Matthieu De Mari" userId="dfb708c9-d8dc-439f-9a3b-c772bf4a311c" providerId="ADAL" clId="{5AF9E225-0E3D-4808-B523-40F6E9A1D59D}" dt="2023-03-02T08:38:16.072" v="2894" actId="113"/>
-          <ac:spMkLst>
-            <pc:docMk/>
-            <pc:sldMk cId="2118681498" sldId="289"/>
-            <ac:spMk id="5" creationId="{DC5B08FF-7D05-A1F5-35B7-5B067BDD0835}"/>
-          </ac:spMkLst>
-        </pc:spChg>
-        <pc:picChg chg="add mod">
-          <ac:chgData name="Matthieu De Mari" userId="dfb708c9-d8dc-439f-9a3b-c772bf4a311c" providerId="ADAL" clId="{5AF9E225-0E3D-4808-B523-40F6E9A1D59D}" dt="2023-03-02T08:37:16.689" v="2881" actId="1076"/>
-          <ac:picMkLst>
-            <pc:docMk/>
-            <pc:sldMk cId="2118681498" sldId="289"/>
-            <ac:picMk id="6" creationId="{B9B1F783-5C9B-1900-BC04-D7161A01A992}"/>
-          </ac:picMkLst>
-        </pc:picChg>
-        <pc:picChg chg="del">
-          <ac:chgData name="Matthieu De Mari" userId="dfb708c9-d8dc-439f-9a3b-c772bf4a311c" providerId="ADAL" clId="{5AF9E225-0E3D-4808-B523-40F6E9A1D59D}" dt="2023-03-02T08:35:52.991" v="2760" actId="478"/>
-          <ac:picMkLst>
-            <pc:docMk/>
-            <pc:sldMk cId="2118681498" sldId="289"/>
-            <ac:picMk id="7" creationId="{080BFE84-9981-5B49-533B-D646CBF01988}"/>
-          </ac:picMkLst>
-        </pc:picChg>
-      </pc:sldChg>
-      <pc:sldChg chg="addSp delSp modSp new mod modClrScheme chgLayout">
-        <pc:chgData name="Matthieu De Mari" userId="dfb708c9-d8dc-439f-9a3b-c772bf4a311c" providerId="ADAL" clId="{5AF9E225-0E3D-4808-B523-40F6E9A1D59D}" dt="2023-03-02T08:44:18.884" v="3062" actId="1036"/>
-        <pc:sldMkLst>
-          <pc:docMk/>
-          <pc:sldMk cId="2562857934" sldId="290"/>
-        </pc:sldMkLst>
-        <pc:spChg chg="mod ord">
-          <ac:chgData name="Matthieu De Mari" userId="dfb708c9-d8dc-439f-9a3b-c772bf4a311c" providerId="ADAL" clId="{5AF9E225-0E3D-4808-B523-40F6E9A1D59D}" dt="2023-03-02T08:42:02.491" v="3000" actId="700"/>
-          <ac:spMkLst>
-            <pc:docMk/>
-            <pc:sldMk cId="2562857934" sldId="290"/>
-            <ac:spMk id="2" creationId="{BCE0280D-E69E-AFD4-54DB-A0586F69E5B1}"/>
-          </ac:spMkLst>
-        </pc:spChg>
-        <pc:spChg chg="mod ord">
-          <ac:chgData name="Matthieu De Mari" userId="dfb708c9-d8dc-439f-9a3b-c772bf4a311c" providerId="ADAL" clId="{5AF9E225-0E3D-4808-B523-40F6E9A1D59D}" dt="2023-03-02T08:42:24.180" v="3008" actId="20577"/>
-          <ac:spMkLst>
-            <pc:docMk/>
-            <pc:sldMk cId="2562857934" sldId="290"/>
-            <ac:spMk id="3" creationId="{30506D83-108F-33EE-389E-86C33979129B}"/>
-          </ac:spMkLst>
-        </pc:spChg>
-        <pc:spChg chg="add del mod ord">
-          <ac:chgData name="Matthieu De Mari" userId="dfb708c9-d8dc-439f-9a3b-c772bf4a311c" providerId="ADAL" clId="{5AF9E225-0E3D-4808-B523-40F6E9A1D59D}" dt="2023-03-02T08:42:13.221" v="3005" actId="478"/>
-          <ac:spMkLst>
-            <pc:docMk/>
-            <pc:sldMk cId="2562857934" sldId="290"/>
-            <ac:spMk id="4" creationId="{428F5BFF-84CA-D49B-9A2E-E6F8DBB16F59}"/>
-          </ac:spMkLst>
-        </pc:spChg>
-        <pc:spChg chg="add del mod">
-          <ac:chgData name="Matthieu De Mari" userId="dfb708c9-d8dc-439f-9a3b-c772bf4a311c" providerId="ADAL" clId="{5AF9E225-0E3D-4808-B523-40F6E9A1D59D}" dt="2023-03-02T08:44:14.047" v="3056" actId="478"/>
-          <ac:spMkLst>
-            <pc:docMk/>
-            <pc:sldMk cId="2562857934" sldId="290"/>
-            <ac:spMk id="9" creationId="{E9B2B529-A121-72E0-AE95-1C3D84E20DB3}"/>
-          </ac:spMkLst>
-        </pc:spChg>
-        <pc:spChg chg="add mod">
-          <ac:chgData name="Matthieu De Mari" userId="dfb708c9-d8dc-439f-9a3b-c772bf4a311c" providerId="ADAL" clId="{5AF9E225-0E3D-4808-B523-40F6E9A1D59D}" dt="2023-03-02T08:44:18.884" v="3062" actId="1036"/>
-          <ac:spMkLst>
-            <pc:docMk/>
-            <pc:sldMk cId="2562857934" sldId="290"/>
-            <ac:spMk id="10" creationId="{7ED0F190-D3E4-F041-958D-F931C15664E6}"/>
-          </ac:spMkLst>
-        </pc:spChg>
-        <pc:picChg chg="add mod">
-          <ac:chgData name="Matthieu De Mari" userId="dfb708c9-d8dc-439f-9a3b-c772bf4a311c" providerId="ADAL" clId="{5AF9E225-0E3D-4808-B523-40F6E9A1D59D}" dt="2023-03-02T08:44:08.390" v="3054" actId="1038"/>
-          <ac:picMkLst>
-            <pc:docMk/>
-            <pc:sldMk cId="2562857934" sldId="290"/>
-            <ac:picMk id="6" creationId="{443F2A43-9B9A-30DD-287B-B34B57370886}"/>
-          </ac:picMkLst>
-        </pc:picChg>
-        <pc:picChg chg="add mod">
-          <ac:chgData name="Matthieu De Mari" userId="dfb708c9-d8dc-439f-9a3b-c772bf4a311c" providerId="ADAL" clId="{5AF9E225-0E3D-4808-B523-40F6E9A1D59D}" dt="2023-03-02T08:42:41.087" v="3013" actId="1076"/>
-          <ac:picMkLst>
-            <pc:docMk/>
-            <pc:sldMk cId="2562857934" sldId="290"/>
-            <ac:picMk id="8" creationId="{76B653B4-B1FF-34AB-F799-3C6DD7B2DB72}"/>
-          </ac:picMkLst>
-        </pc:picChg>
-      </pc:sldChg>
-      <pc:sldChg chg="delSp modSp add mod">
-        <pc:chgData name="Matthieu De Mari" userId="dfb708c9-d8dc-439f-9a3b-c772bf4a311c" providerId="ADAL" clId="{5AF9E225-0E3D-4808-B523-40F6E9A1D59D}" dt="2023-03-02T08:47:27.886" v="3225" actId="20577"/>
-        <pc:sldMkLst>
-          <pc:docMk/>
-          <pc:sldMk cId="3292482358" sldId="291"/>
-        </pc:sldMkLst>
-        <pc:spChg chg="mod">
-          <ac:chgData name="Matthieu De Mari" userId="dfb708c9-d8dc-439f-9a3b-c772bf4a311c" providerId="ADAL" clId="{5AF9E225-0E3D-4808-B523-40F6E9A1D59D}" dt="2023-03-02T08:47:27.886" v="3225" actId="20577"/>
-          <ac:spMkLst>
-            <pc:docMk/>
-            <pc:sldMk cId="3292482358" sldId="291"/>
-            <ac:spMk id="5" creationId="{DC5B08FF-7D05-A1F5-35B7-5B067BDD0835}"/>
-          </ac:spMkLst>
-        </pc:spChg>
-        <pc:picChg chg="del">
-          <ac:chgData name="Matthieu De Mari" userId="dfb708c9-d8dc-439f-9a3b-c772bf4a311c" providerId="ADAL" clId="{5AF9E225-0E3D-4808-B523-40F6E9A1D59D}" dt="2023-03-02T08:38:26.446" v="2896" actId="478"/>
-          <ac:picMkLst>
-            <pc:docMk/>
-            <pc:sldMk cId="3292482358" sldId="291"/>
-            <ac:picMk id="6" creationId="{B9B1F783-5C9B-1900-BC04-D7161A01A992}"/>
-          </ac:picMkLst>
-        </pc:picChg>
-      </pc:sldChg>
-      <pc:sldChg chg="addSp delSp modSp add mod">
-        <pc:chgData name="Matthieu De Mari" userId="dfb708c9-d8dc-439f-9a3b-c772bf4a311c" providerId="ADAL" clId="{5AF9E225-0E3D-4808-B523-40F6E9A1D59D}" dt="2023-03-02T08:44:21.897" v="3064"/>
-        <pc:sldMkLst>
-          <pc:docMk/>
-          <pc:sldMk cId="3520355124" sldId="292"/>
-        </pc:sldMkLst>
-        <pc:spChg chg="add del mod">
-          <ac:chgData name="Matthieu De Mari" userId="dfb708c9-d8dc-439f-9a3b-c772bf4a311c" providerId="ADAL" clId="{5AF9E225-0E3D-4808-B523-40F6E9A1D59D}" dt="2023-03-02T08:44:21.697" v="3063" actId="478"/>
-          <ac:spMkLst>
-            <pc:docMk/>
-            <pc:sldMk cId="3520355124" sldId="292"/>
-            <ac:spMk id="7" creationId="{59793ECA-8173-3D7A-F8AB-A7491EF717F7}"/>
-          </ac:spMkLst>
-        </pc:spChg>
-        <pc:spChg chg="add mod">
-          <ac:chgData name="Matthieu De Mari" userId="dfb708c9-d8dc-439f-9a3b-c772bf4a311c" providerId="ADAL" clId="{5AF9E225-0E3D-4808-B523-40F6E9A1D59D}" dt="2023-03-02T08:44:21.897" v="3064"/>
-          <ac:spMkLst>
-            <pc:docMk/>
-            <pc:sldMk cId="3520355124" sldId="292"/>
-            <ac:spMk id="9" creationId="{79D6F656-72E0-A2BA-03EB-373E523ACD6B}"/>
-          </ac:spMkLst>
-        </pc:spChg>
-        <pc:picChg chg="add mod">
-          <ac:chgData name="Matthieu De Mari" userId="dfb708c9-d8dc-439f-9a3b-c772bf4a311c" providerId="ADAL" clId="{5AF9E225-0E3D-4808-B523-40F6E9A1D59D}" dt="2023-03-02T08:43:31.904" v="3019" actId="1076"/>
-          <ac:picMkLst>
-            <pc:docMk/>
-            <pc:sldMk cId="3520355124" sldId="292"/>
-            <ac:picMk id="5" creationId="{D902306C-37FB-ECEE-99FA-743032E028F6}"/>
-          </ac:picMkLst>
-        </pc:picChg>
-        <pc:picChg chg="del">
-          <ac:chgData name="Matthieu De Mari" userId="dfb708c9-d8dc-439f-9a3b-c772bf4a311c" providerId="ADAL" clId="{5AF9E225-0E3D-4808-B523-40F6E9A1D59D}" dt="2023-03-02T08:43:25.131" v="3015" actId="478"/>
-          <ac:picMkLst>
-            <pc:docMk/>
-            <pc:sldMk cId="3520355124" sldId="292"/>
-            <ac:picMk id="6" creationId="{443F2A43-9B9A-30DD-287B-B34B57370886}"/>
-          </ac:picMkLst>
-        </pc:picChg>
-      </pc:sldChg>
-      <pc:sldChg chg="modSp new mod">
-        <pc:chgData name="Matthieu De Mari" userId="dfb708c9-d8dc-439f-9a3b-c772bf4a311c" providerId="ADAL" clId="{5AF9E225-0E3D-4808-B523-40F6E9A1D59D}" dt="2023-03-02T08:47:53.024" v="3226" actId="114"/>
-        <pc:sldMkLst>
-          <pc:docMk/>
-          <pc:sldMk cId="3046349634" sldId="293"/>
-        </pc:sldMkLst>
-        <pc:spChg chg="mod">
-          <ac:chgData name="Matthieu De Mari" userId="dfb708c9-d8dc-439f-9a3b-c772bf4a311c" providerId="ADAL" clId="{5AF9E225-0E3D-4808-B523-40F6E9A1D59D}" dt="2023-03-02T08:45:29.243" v="3125" actId="20577"/>
-          <ac:spMkLst>
-            <pc:docMk/>
-            <pc:sldMk cId="3046349634" sldId="293"/>
-            <ac:spMk id="2" creationId="{3BD544E6-22B2-D018-F02A-B886B1BC209B}"/>
-          </ac:spMkLst>
-        </pc:spChg>
-        <pc:spChg chg="mod">
-          <ac:chgData name="Matthieu De Mari" userId="dfb708c9-d8dc-439f-9a3b-c772bf4a311c" providerId="ADAL" clId="{5AF9E225-0E3D-4808-B523-40F6E9A1D59D}" dt="2023-03-02T08:47:53.024" v="3226" actId="114"/>
-          <ac:spMkLst>
-            <pc:docMk/>
-            <pc:sldMk cId="3046349634" sldId="293"/>
-            <ac:spMk id="3" creationId="{0B4790D0-53F9-363F-B6B5-FCCD143331AF}"/>
-          </ac:spMkLst>
-        </pc:spChg>
-      </pc:sldChg>
-      <pc:sldChg chg="modSp add mod">
-        <pc:chgData name="Matthieu De Mari" userId="dfb708c9-d8dc-439f-9a3b-c772bf4a311c" providerId="ADAL" clId="{5AF9E225-0E3D-4808-B523-40F6E9A1D59D}" dt="2023-03-02T09:04:46.904" v="4174" actId="27636"/>
-        <pc:sldMkLst>
-          <pc:docMk/>
-          <pc:sldMk cId="427136966" sldId="294"/>
-        </pc:sldMkLst>
-        <pc:spChg chg="mod">
-          <ac:chgData name="Matthieu De Mari" userId="dfb708c9-d8dc-439f-9a3b-c772bf4a311c" providerId="ADAL" clId="{5AF9E225-0E3D-4808-B523-40F6E9A1D59D}" dt="2023-03-02T08:49:12.400" v="3273" actId="20577"/>
-          <ac:spMkLst>
-            <pc:docMk/>
-            <pc:sldMk cId="427136966" sldId="294"/>
-            <ac:spMk id="2" creationId="{3BD544E6-22B2-D018-F02A-B886B1BC209B}"/>
-          </ac:spMkLst>
-        </pc:spChg>
-        <pc:spChg chg="mod">
-          <ac:chgData name="Matthieu De Mari" userId="dfb708c9-d8dc-439f-9a3b-c772bf4a311c" providerId="ADAL" clId="{5AF9E225-0E3D-4808-B523-40F6E9A1D59D}" dt="2023-03-02T09:04:46.904" v="4174" actId="27636"/>
-          <ac:spMkLst>
-            <pc:docMk/>
-            <pc:sldMk cId="427136966" sldId="294"/>
-            <ac:spMk id="3" creationId="{0B4790D0-53F9-363F-B6B5-FCCD143331AF}"/>
-          </ac:spMkLst>
-        </pc:spChg>
-      </pc:sldChg>
-      <pc:sldChg chg="addSp delSp modSp new mod modClrScheme chgLayout">
-        <pc:chgData name="Matthieu De Mari" userId="dfb708c9-d8dc-439f-9a3b-c772bf4a311c" providerId="ADAL" clId="{5AF9E225-0E3D-4808-B523-40F6E9A1D59D}" dt="2023-03-02T09:05:33.864" v="4216" actId="20577"/>
-        <pc:sldMkLst>
-          <pc:docMk/>
-          <pc:sldMk cId="323951598" sldId="295"/>
-        </pc:sldMkLst>
-        <pc:spChg chg="del mod ord">
-          <ac:chgData name="Matthieu De Mari" userId="dfb708c9-d8dc-439f-9a3b-c772bf4a311c" providerId="ADAL" clId="{5AF9E225-0E3D-4808-B523-40F6E9A1D59D}" dt="2023-03-02T08:50:53.075" v="3299" actId="700"/>
-          <ac:spMkLst>
-            <pc:docMk/>
-            <pc:sldMk cId="323951598" sldId="295"/>
-            <ac:spMk id="2" creationId="{DB628DF2-220C-014A-227A-AFCDA83BA19A}"/>
-          </ac:spMkLst>
-        </pc:spChg>
-        <pc:spChg chg="del mod ord">
-          <ac:chgData name="Matthieu De Mari" userId="dfb708c9-d8dc-439f-9a3b-c772bf4a311c" providerId="ADAL" clId="{5AF9E225-0E3D-4808-B523-40F6E9A1D59D}" dt="2023-03-02T08:50:53.075" v="3299" actId="700"/>
-          <ac:spMkLst>
-            <pc:docMk/>
-            <pc:sldMk cId="323951598" sldId="295"/>
-            <ac:spMk id="3" creationId="{F8F906A2-A4EE-7C99-5656-6C1167A2BFF8}"/>
-          </ac:spMkLst>
-        </pc:spChg>
-        <pc:spChg chg="del">
-          <ac:chgData name="Matthieu De Mari" userId="dfb708c9-d8dc-439f-9a3b-c772bf4a311c" providerId="ADAL" clId="{5AF9E225-0E3D-4808-B523-40F6E9A1D59D}" dt="2023-03-02T08:50:53.075" v="3299" actId="700"/>
-          <ac:spMkLst>
-            <pc:docMk/>
-            <pc:sldMk cId="323951598" sldId="295"/>
-            <ac:spMk id="4" creationId="{AD936443-007E-F3D4-CBCF-09B865B5A94B}"/>
-          </ac:spMkLst>
-        </pc:spChg>
-        <pc:spChg chg="add mod ord">
-          <ac:chgData name="Matthieu De Mari" userId="dfb708c9-d8dc-439f-9a3b-c772bf4a311c" providerId="ADAL" clId="{5AF9E225-0E3D-4808-B523-40F6E9A1D59D}" dt="2023-03-02T08:52:46.848" v="3375" actId="20577"/>
-          <ac:spMkLst>
-            <pc:docMk/>
-            <pc:sldMk cId="323951598" sldId="295"/>
-            <ac:spMk id="5" creationId="{612AEEA9-41B6-ED03-6C32-23B2219F119B}"/>
-          </ac:spMkLst>
-        </pc:spChg>
-        <pc:spChg chg="add mod ord">
-          <ac:chgData name="Matthieu De Mari" userId="dfb708c9-d8dc-439f-9a3b-c772bf4a311c" providerId="ADAL" clId="{5AF9E225-0E3D-4808-B523-40F6E9A1D59D}" dt="2023-03-02T09:05:33.864" v="4216" actId="20577"/>
-          <ac:spMkLst>
-            <pc:docMk/>
-            <pc:sldMk cId="323951598" sldId="295"/>
-            <ac:spMk id="6" creationId="{59E73361-8759-0080-17AE-8FB69DE2B9FF}"/>
-          </ac:spMkLst>
-        </pc:spChg>
-      </pc:sldChg>
-      <pc:sldChg chg="addSp delSp modSp new mod modClrScheme chgLayout">
-        <pc:chgData name="Matthieu De Mari" userId="dfb708c9-d8dc-439f-9a3b-c772bf4a311c" providerId="ADAL" clId="{5AF9E225-0E3D-4808-B523-40F6E9A1D59D}" dt="2023-03-02T09:06:28.328" v="4228" actId="20577"/>
-        <pc:sldMkLst>
-          <pc:docMk/>
-          <pc:sldMk cId="1855779909" sldId="296"/>
-        </pc:sldMkLst>
-        <pc:spChg chg="del mod ord">
-          <ac:chgData name="Matthieu De Mari" userId="dfb708c9-d8dc-439f-9a3b-c772bf4a311c" providerId="ADAL" clId="{5AF9E225-0E3D-4808-B523-40F6E9A1D59D}" dt="2023-03-02T08:51:35.309" v="3321" actId="700"/>
-          <ac:spMkLst>
-            <pc:docMk/>
-            <pc:sldMk cId="1855779909" sldId="296"/>
-            <ac:spMk id="2" creationId="{E999589A-FBC7-ED2C-F0E6-CAC4138FA6F3}"/>
-          </ac:spMkLst>
-        </pc:spChg>
-        <pc:spChg chg="mod ord">
-          <ac:chgData name="Matthieu De Mari" userId="dfb708c9-d8dc-439f-9a3b-c772bf4a311c" providerId="ADAL" clId="{5AF9E225-0E3D-4808-B523-40F6E9A1D59D}" dt="2023-03-02T09:06:28.328" v="4228" actId="20577"/>
-          <ac:spMkLst>
-            <pc:docMk/>
-            <pc:sldMk cId="1855779909" sldId="296"/>
-            <ac:spMk id="3" creationId="{2AA71324-43A9-3773-A9F6-00EC1B6AE4B5}"/>
-          </ac:spMkLst>
-        </pc:spChg>
-        <pc:spChg chg="del mod">
-          <ac:chgData name="Matthieu De Mari" userId="dfb708c9-d8dc-439f-9a3b-c772bf4a311c" providerId="ADAL" clId="{5AF9E225-0E3D-4808-B523-40F6E9A1D59D}" dt="2023-03-02T08:51:35.309" v="3321" actId="700"/>
-          <ac:spMkLst>
-            <pc:docMk/>
-            <pc:sldMk cId="1855779909" sldId="296"/>
-            <ac:spMk id="4" creationId="{BE8E1445-FAEE-DA2A-EC42-9250F7E19885}"/>
-          </ac:spMkLst>
-        </pc:spChg>
-        <pc:spChg chg="add mod ord">
-          <ac:chgData name="Matthieu De Mari" userId="dfb708c9-d8dc-439f-9a3b-c772bf4a311c" providerId="ADAL" clId="{5AF9E225-0E3D-4808-B523-40F6E9A1D59D}" dt="2023-03-02T09:04:20.369" v="4159" actId="20577"/>
-          <ac:spMkLst>
-            <pc:docMk/>
-            <pc:sldMk cId="1855779909" sldId="296"/>
-            <ac:spMk id="5" creationId="{099CC6C1-BA31-E246-8AF2-1BFB1D218A2D}"/>
-          </ac:spMkLst>
-        </pc:spChg>
-      </pc:sldChg>
-      <pc:sldChg chg="modSp add mod">
-        <pc:chgData name="Matthieu De Mari" userId="dfb708c9-d8dc-439f-9a3b-c772bf4a311c" providerId="ADAL" clId="{5AF9E225-0E3D-4808-B523-40F6E9A1D59D}" dt="2023-03-02T08:56:04.515" v="3607" actId="20577"/>
-        <pc:sldMkLst>
-          <pc:docMk/>
-          <pc:sldMk cId="1514077654" sldId="297"/>
-        </pc:sldMkLst>
-        <pc:spChg chg="mod">
-          <ac:chgData name="Matthieu De Mari" userId="dfb708c9-d8dc-439f-9a3b-c772bf4a311c" providerId="ADAL" clId="{5AF9E225-0E3D-4808-B523-40F6E9A1D59D}" dt="2023-03-02T08:55:17.286" v="3543" actId="20577"/>
-          <ac:spMkLst>
-            <pc:docMk/>
-            <pc:sldMk cId="1514077654" sldId="297"/>
-            <ac:spMk id="5" creationId="{612AEEA9-41B6-ED03-6C32-23B2219F119B}"/>
-          </ac:spMkLst>
-        </pc:spChg>
-        <pc:spChg chg="mod">
-          <ac:chgData name="Matthieu De Mari" userId="dfb708c9-d8dc-439f-9a3b-c772bf4a311c" providerId="ADAL" clId="{5AF9E225-0E3D-4808-B523-40F6E9A1D59D}" dt="2023-03-02T08:56:04.515" v="3607" actId="20577"/>
-          <ac:spMkLst>
-            <pc:docMk/>
-            <pc:sldMk cId="1514077654" sldId="297"/>
-            <ac:spMk id="6" creationId="{59E73361-8759-0080-17AE-8FB69DE2B9FF}"/>
-          </ac:spMkLst>
-        </pc:spChg>
-      </pc:sldChg>
-      <pc:sldChg chg="modSp new mod">
-        <pc:chgData name="Matthieu De Mari" userId="dfb708c9-d8dc-439f-9a3b-c772bf4a311c" providerId="ADAL" clId="{5AF9E225-0E3D-4808-B523-40F6E9A1D59D}" dt="2023-03-02T08:56:36.889" v="3652" actId="14100"/>
-        <pc:sldMkLst>
-          <pc:docMk/>
-          <pc:sldMk cId="2514894683" sldId="298"/>
-        </pc:sldMkLst>
-        <pc:spChg chg="mod">
-          <ac:chgData name="Matthieu De Mari" userId="dfb708c9-d8dc-439f-9a3b-c772bf4a311c" providerId="ADAL" clId="{5AF9E225-0E3D-4808-B523-40F6E9A1D59D}" dt="2023-03-02T08:55:24.262" v="3557" actId="20577"/>
-          <ac:spMkLst>
-            <pc:docMk/>
-            <pc:sldMk cId="2514894683" sldId="298"/>
-            <ac:spMk id="2" creationId="{B7D73546-6348-08E1-9138-D596DEE29A4C}"/>
-          </ac:spMkLst>
-        </pc:spChg>
-        <pc:spChg chg="mod">
-          <ac:chgData name="Matthieu De Mari" userId="dfb708c9-d8dc-439f-9a3b-c772bf4a311c" providerId="ADAL" clId="{5AF9E225-0E3D-4808-B523-40F6E9A1D59D}" dt="2023-03-02T08:56:36.889" v="3652" actId="14100"/>
-          <ac:spMkLst>
-            <pc:docMk/>
-            <pc:sldMk cId="2514894683" sldId="298"/>
-            <ac:spMk id="3" creationId="{56048AC0-FB9F-12B1-4F29-670572903CBF}"/>
-          </ac:spMkLst>
-        </pc:spChg>
-      </pc:sldChg>
-      <pc:sldChg chg="addSp delSp modSp new mod">
-        <pc:chgData name="Matthieu De Mari" userId="dfb708c9-d8dc-439f-9a3b-c772bf4a311c" providerId="ADAL" clId="{5AF9E225-0E3D-4808-B523-40F6E9A1D59D}" dt="2023-03-02T08:59:30.392" v="3889" actId="21"/>
-        <pc:sldMkLst>
-          <pc:docMk/>
-          <pc:sldMk cId="1452574487" sldId="299"/>
-        </pc:sldMkLst>
-        <pc:spChg chg="mod">
-          <ac:chgData name="Matthieu De Mari" userId="dfb708c9-d8dc-439f-9a3b-c772bf4a311c" providerId="ADAL" clId="{5AF9E225-0E3D-4808-B523-40F6E9A1D59D}" dt="2023-03-02T08:56:43.413" v="3669" actId="20577"/>
-          <ac:spMkLst>
-            <pc:docMk/>
-            <pc:sldMk cId="1452574487" sldId="299"/>
-            <ac:spMk id="2" creationId="{6C228B34-D86C-5095-EA4A-9B10343FA620}"/>
-          </ac:spMkLst>
-        </pc:spChg>
-        <pc:spChg chg="mod">
-          <ac:chgData name="Matthieu De Mari" userId="dfb708c9-d8dc-439f-9a3b-c772bf4a311c" providerId="ADAL" clId="{5AF9E225-0E3D-4808-B523-40F6E9A1D59D}" dt="2023-03-02T08:59:28.252" v="3888"/>
-          <ac:spMkLst>
-            <pc:docMk/>
-            <pc:sldMk cId="1452574487" sldId="299"/>
-            <ac:spMk id="3" creationId="{C7C49193-D5B6-610B-EEA3-E2A025BD75D6}"/>
-          </ac:spMkLst>
-        </pc:spChg>
-        <pc:picChg chg="add del">
-          <ac:chgData name="Matthieu De Mari" userId="dfb708c9-d8dc-439f-9a3b-c772bf4a311c" providerId="ADAL" clId="{5AF9E225-0E3D-4808-B523-40F6E9A1D59D}" dt="2023-03-02T08:59:30.392" v="3889" actId="21"/>
-          <ac:picMkLst>
-            <pc:docMk/>
-            <pc:sldMk cId="1452574487" sldId="299"/>
-            <ac:picMk id="5" creationId="{FD51391D-B5FC-9A86-227B-0A7DF7CB378F}"/>
-          </ac:picMkLst>
-        </pc:picChg>
-      </pc:sldChg>
-      <pc:sldChg chg="addSp delSp modSp add mod modClrScheme chgLayout">
-        <pc:chgData name="Matthieu De Mari" userId="dfb708c9-d8dc-439f-9a3b-c772bf4a311c" providerId="ADAL" clId="{5AF9E225-0E3D-4808-B523-40F6E9A1D59D}" dt="2023-03-02T09:03:33.636" v="4087" actId="20577"/>
-        <pc:sldMkLst>
-          <pc:docMk/>
-          <pc:sldMk cId="1699114457" sldId="300"/>
-        </pc:sldMkLst>
-        <pc:spChg chg="add del mod ord">
-          <ac:chgData name="Matthieu De Mari" userId="dfb708c9-d8dc-439f-9a3b-c772bf4a311c" providerId="ADAL" clId="{5AF9E225-0E3D-4808-B523-40F6E9A1D59D}" dt="2023-03-02T09:02:30.185" v="4010" actId="478"/>
-          <ac:spMkLst>
-            <pc:docMk/>
-            <pc:sldMk cId="1699114457" sldId="300"/>
-            <ac:spMk id="2" creationId="{B43CB63D-D1F8-4E1D-F2D1-F72202E9AC6B}"/>
-          </ac:spMkLst>
-        </pc:spChg>
-        <pc:spChg chg="mod ord">
-          <ac:chgData name="Matthieu De Mari" userId="dfb708c9-d8dc-439f-9a3b-c772bf4a311c" providerId="ADAL" clId="{5AF9E225-0E3D-4808-B523-40F6E9A1D59D}" dt="2023-03-02T09:01:57.080" v="3970" actId="700"/>
-          <ac:spMkLst>
-            <pc:docMk/>
-            <pc:sldMk cId="1699114457" sldId="300"/>
-            <ac:spMk id="5" creationId="{612AEEA9-41B6-ED03-6C32-23B2219F119B}"/>
-          </ac:spMkLst>
-        </pc:spChg>
-        <pc:spChg chg="mod ord">
-          <ac:chgData name="Matthieu De Mari" userId="dfb708c9-d8dc-439f-9a3b-c772bf4a311c" providerId="ADAL" clId="{5AF9E225-0E3D-4808-B523-40F6E9A1D59D}" dt="2023-03-02T09:03:33.636" v="4087" actId="20577"/>
-          <ac:spMkLst>
-            <pc:docMk/>
-            <pc:sldMk cId="1699114457" sldId="300"/>
-            <ac:spMk id="6" creationId="{59E73361-8759-0080-17AE-8FB69DE2B9FF}"/>
-          </ac:spMkLst>
-        </pc:spChg>
-        <pc:picChg chg="add mod">
-          <ac:chgData name="Matthieu De Mari" userId="dfb708c9-d8dc-439f-9a3b-c772bf4a311c" providerId="ADAL" clId="{5AF9E225-0E3D-4808-B523-40F6E9A1D59D}" dt="2023-03-02T09:03:14.022" v="4014" actId="1076"/>
-          <ac:picMkLst>
-            <pc:docMk/>
-            <pc:sldMk cId="1699114457" sldId="300"/>
-            <ac:picMk id="4" creationId="{1C1CB572-15DF-A789-FAEA-D70859E67A0E}"/>
-          </ac:picMkLst>
-        </pc:picChg>
-      </pc:sldChg>
-      <pc:sldChg chg="addSp delSp modSp add mod modClrScheme chgLayout">
-        <pc:chgData name="Matthieu De Mari" userId="dfb708c9-d8dc-439f-9a3b-c772bf4a311c" providerId="ADAL" clId="{5AF9E225-0E3D-4808-B523-40F6E9A1D59D}" dt="2023-03-02T09:03:43.897" v="4104" actId="20577"/>
-        <pc:sldMkLst>
-          <pc:docMk/>
-          <pc:sldMk cId="1276239023" sldId="301"/>
-        </pc:sldMkLst>
-        <pc:spChg chg="mod ord">
-          <ac:chgData name="Matthieu De Mari" userId="dfb708c9-d8dc-439f-9a3b-c772bf4a311c" providerId="ADAL" clId="{5AF9E225-0E3D-4808-B523-40F6E9A1D59D}" dt="2023-03-02T09:00:45.091" v="3955" actId="700"/>
-          <ac:spMkLst>
-            <pc:docMk/>
-            <pc:sldMk cId="1276239023" sldId="301"/>
-            <ac:spMk id="2" creationId="{B7D73546-6348-08E1-9138-D596DEE29A4C}"/>
-          </ac:spMkLst>
-        </pc:spChg>
-        <pc:spChg chg="mod ord">
-          <ac:chgData name="Matthieu De Mari" userId="dfb708c9-d8dc-439f-9a3b-c772bf4a311c" providerId="ADAL" clId="{5AF9E225-0E3D-4808-B523-40F6E9A1D59D}" dt="2023-03-02T09:03:43.897" v="4104" actId="20577"/>
-          <ac:spMkLst>
-            <pc:docMk/>
-            <pc:sldMk cId="1276239023" sldId="301"/>
-            <ac:spMk id="3" creationId="{56048AC0-FB9F-12B1-4F29-670572903CBF}"/>
-          </ac:spMkLst>
-        </pc:spChg>
-        <pc:spChg chg="add del mod ord">
-          <ac:chgData name="Matthieu De Mari" userId="dfb708c9-d8dc-439f-9a3b-c772bf4a311c" providerId="ADAL" clId="{5AF9E225-0E3D-4808-B523-40F6E9A1D59D}" dt="2023-03-02T09:01:03.993" v="3965" actId="478"/>
-          <ac:spMkLst>
-            <pc:docMk/>
-            <pc:sldMk cId="1276239023" sldId="301"/>
-            <ac:spMk id="4" creationId="{EE4FAF28-634E-901F-1BF2-0D02218F64F6}"/>
-          </ac:spMkLst>
-        </pc:spChg>
-        <pc:picChg chg="add mod">
-          <ac:chgData name="Matthieu De Mari" userId="dfb708c9-d8dc-439f-9a3b-c772bf4a311c" providerId="ADAL" clId="{5AF9E225-0E3D-4808-B523-40F6E9A1D59D}" dt="2023-03-02T09:01:42.639" v="3969" actId="1076"/>
-          <ac:picMkLst>
-            <pc:docMk/>
-            <pc:sldMk cId="1276239023" sldId="301"/>
-            <ac:picMk id="6" creationId="{B268E989-9B7A-B232-3315-31834458E4CF}"/>
-          </ac:picMkLst>
-        </pc:picChg>
-      </pc:sldChg>
-      <pc:sldChg chg="addSp delSp modSp add mod modClrScheme chgLayout">
-        <pc:chgData name="Matthieu De Mari" userId="dfb708c9-d8dc-439f-9a3b-c772bf4a311c" providerId="ADAL" clId="{5AF9E225-0E3D-4808-B523-40F6E9A1D59D}" dt="2023-03-02T09:04:08.494" v="4134" actId="20577"/>
-        <pc:sldMkLst>
-          <pc:docMk/>
-          <pc:sldMk cId="3968924669" sldId="302"/>
-        </pc:sldMkLst>
-        <pc:spChg chg="mod ord">
-          <ac:chgData name="Matthieu De Mari" userId="dfb708c9-d8dc-439f-9a3b-c772bf4a311c" providerId="ADAL" clId="{5AF9E225-0E3D-4808-B523-40F6E9A1D59D}" dt="2023-03-02T08:59:53.356" v="3893" actId="700"/>
-          <ac:spMkLst>
-            <pc:docMk/>
-            <pc:sldMk cId="3968924669" sldId="302"/>
-            <ac:spMk id="2" creationId="{6C228B34-D86C-5095-EA4A-9B10343FA620}"/>
-          </ac:spMkLst>
-        </pc:spChg>
-        <pc:spChg chg="mod ord">
-          <ac:chgData name="Matthieu De Mari" userId="dfb708c9-d8dc-439f-9a3b-c772bf4a311c" providerId="ADAL" clId="{5AF9E225-0E3D-4808-B523-40F6E9A1D59D}" dt="2023-03-02T09:04:08.494" v="4134" actId="20577"/>
-          <ac:spMkLst>
-            <pc:docMk/>
-            <pc:sldMk cId="3968924669" sldId="302"/>
-            <ac:spMk id="3" creationId="{C7C49193-D5B6-610B-EEA3-E2A025BD75D6}"/>
-          </ac:spMkLst>
-        </pc:spChg>
-        <pc:spChg chg="add del mod ord">
-          <ac:chgData name="Matthieu De Mari" userId="dfb708c9-d8dc-439f-9a3b-c772bf4a311c" providerId="ADAL" clId="{5AF9E225-0E3D-4808-B523-40F6E9A1D59D}" dt="2023-03-02T08:59:58.873" v="3899" actId="478"/>
-          <ac:spMkLst>
-            <pc:docMk/>
-            <pc:sldMk cId="3968924669" sldId="302"/>
-            <ac:spMk id="4" creationId="{90B548F9-A663-2056-5AD0-BDC679C9C01E}"/>
-          </ac:spMkLst>
-        </pc:spChg>
-        <pc:picChg chg="add mod">
-          <ac:chgData name="Matthieu De Mari" userId="dfb708c9-d8dc-439f-9a3b-c772bf4a311c" providerId="ADAL" clId="{5AF9E225-0E3D-4808-B523-40F6E9A1D59D}" dt="2023-03-02T09:00:03.657" v="3903" actId="1076"/>
-          <ac:picMkLst>
-            <pc:docMk/>
-            <pc:sldMk cId="3968924669" sldId="302"/>
-            <ac:picMk id="5" creationId="{608741EA-45BF-0A5E-D113-B97931DDBA08}"/>
-          </ac:picMkLst>
-        </pc:picChg>
-      </pc:sldChg>
-      <pc:sldChg chg="modSp new mod">
-        <pc:chgData name="Matthieu De Mari" userId="dfb708c9-d8dc-439f-9a3b-c772bf4a311c" providerId="ADAL" clId="{5AF9E225-0E3D-4808-B523-40F6E9A1D59D}" dt="2023-03-02T09:09:23.148" v="4269" actId="113"/>
-        <pc:sldMkLst>
-          <pc:docMk/>
-          <pc:sldMk cId="4232115997" sldId="303"/>
-        </pc:sldMkLst>
-        <pc:spChg chg="mod">
-          <ac:chgData name="Matthieu De Mari" userId="dfb708c9-d8dc-439f-9a3b-c772bf4a311c" providerId="ADAL" clId="{5AF9E225-0E3D-4808-B523-40F6E9A1D59D}" dt="2023-03-02T09:07:07.544" v="4240" actId="20577"/>
-          <ac:spMkLst>
-            <pc:docMk/>
-            <pc:sldMk cId="4232115997" sldId="303"/>
-            <ac:spMk id="2" creationId="{508FB456-9B7D-F6FA-8CFF-A89108724F4A}"/>
-          </ac:spMkLst>
-        </pc:spChg>
-        <pc:spChg chg="mod">
-          <ac:chgData name="Matthieu De Mari" userId="dfb708c9-d8dc-439f-9a3b-c772bf4a311c" providerId="ADAL" clId="{5AF9E225-0E3D-4808-B523-40F6E9A1D59D}" dt="2023-03-02T09:09:23.148" v="4269" actId="113"/>
-          <ac:spMkLst>
-            <pc:docMk/>
-            <pc:sldMk cId="4232115997" sldId="303"/>
-            <ac:spMk id="3" creationId="{60ECB68E-5BF7-D3CC-11B5-DA1468BBE623}"/>
-          </ac:spMkLst>
-        </pc:spChg>
-      </pc:sldChg>
-      <pc:sldChg chg="modSp add mod">
-        <pc:chgData name="Matthieu De Mari" userId="dfb708c9-d8dc-439f-9a3b-c772bf4a311c" providerId="ADAL" clId="{5AF9E225-0E3D-4808-B523-40F6E9A1D59D}" dt="2023-03-02T09:06:47.611" v="4234" actId="20577"/>
-        <pc:sldMkLst>
-          <pc:docMk/>
-          <pc:sldMk cId="354883896" sldId="304"/>
-        </pc:sldMkLst>
-        <pc:spChg chg="mod">
-          <ac:chgData name="Matthieu De Mari" userId="dfb708c9-d8dc-439f-9a3b-c772bf4a311c" providerId="ADAL" clId="{5AF9E225-0E3D-4808-B523-40F6E9A1D59D}" dt="2023-03-02T09:06:47.611" v="4234" actId="20577"/>
-          <ac:spMkLst>
-            <pc:docMk/>
-            <pc:sldMk cId="354883896" sldId="304"/>
-            <ac:spMk id="5" creationId="{2B13EA12-F42E-A14F-570D-C7B3FB0BA678}"/>
-          </ac:spMkLst>
-        </pc:spChg>
-      </pc:sldChg>
-      <pc:sldChg chg="modSp add mod">
-        <pc:chgData name="Matthieu De Mari" userId="dfb708c9-d8dc-439f-9a3b-c772bf4a311c" providerId="ADAL" clId="{5AF9E225-0E3D-4808-B523-40F6E9A1D59D}" dt="2023-03-02T09:10:35.361" v="4304" actId="27636"/>
-        <pc:sldMkLst>
-          <pc:docMk/>
-          <pc:sldMk cId="4099824996" sldId="305"/>
-        </pc:sldMkLst>
-        <pc:spChg chg="mod">
-          <ac:chgData name="Matthieu De Mari" userId="dfb708c9-d8dc-439f-9a3b-c772bf4a311c" providerId="ADAL" clId="{5AF9E225-0E3D-4808-B523-40F6E9A1D59D}" dt="2023-03-02T09:10:35.361" v="4304" actId="27636"/>
-          <ac:spMkLst>
-            <pc:docMk/>
-            <pc:sldMk cId="4099824996" sldId="305"/>
-            <ac:spMk id="3" creationId="{60ECB68E-5BF7-D3CC-11B5-DA1468BBE623}"/>
-          </ac:spMkLst>
-        </pc:spChg>
-      </pc:sldChg>
-      <pc:sldChg chg="modSp add mod">
-        <pc:chgData name="Matthieu De Mari" userId="dfb708c9-d8dc-439f-9a3b-c772bf4a311c" providerId="ADAL" clId="{5AF9E225-0E3D-4808-B523-40F6E9A1D59D}" dt="2023-03-02T09:09:27.720" v="4270" actId="207"/>
-        <pc:sldMkLst>
-          <pc:docMk/>
-          <pc:sldMk cId="4051912021" sldId="306"/>
-        </pc:sldMkLst>
-        <pc:spChg chg="mod">
-          <ac:chgData name="Matthieu De Mari" userId="dfb708c9-d8dc-439f-9a3b-c772bf4a311c" providerId="ADAL" clId="{5AF9E225-0E3D-4808-B523-40F6E9A1D59D}" dt="2023-03-02T09:09:27.720" v="4270" actId="207"/>
-          <ac:spMkLst>
-            <pc:docMk/>
-            <pc:sldMk cId="4051912021" sldId="306"/>
-            <ac:spMk id="3" creationId="{60ECB68E-5BF7-D3CC-11B5-DA1468BBE623}"/>
-          </ac:spMkLst>
-        </pc:spChg>
-      </pc:sldChg>
-      <pc:sldChg chg="modSp add mod">
-        <pc:chgData name="Matthieu De Mari" userId="dfb708c9-d8dc-439f-9a3b-c772bf4a311c" providerId="ADAL" clId="{5AF9E225-0E3D-4808-B523-40F6E9A1D59D}" dt="2023-03-02T09:11:43.126" v="4415" actId="20577"/>
-        <pc:sldMkLst>
-          <pc:docMk/>
-          <pc:sldMk cId="2900176786" sldId="307"/>
-        </pc:sldMkLst>
-        <pc:spChg chg="mod">
-          <ac:chgData name="Matthieu De Mari" userId="dfb708c9-d8dc-439f-9a3b-c772bf4a311c" providerId="ADAL" clId="{5AF9E225-0E3D-4808-B523-40F6E9A1D59D}" dt="2023-03-02T09:11:43.126" v="4415" actId="20577"/>
-          <ac:spMkLst>
-            <pc:docMk/>
-            <pc:sldMk cId="2900176786" sldId="307"/>
-            <ac:spMk id="3" creationId="{60ECB68E-5BF7-D3CC-11B5-DA1468BBE623}"/>
-          </ac:spMkLst>
-        </pc:spChg>
-      </pc:sldChg>
-      <pc:sldChg chg="modSp add mod">
-        <pc:chgData name="Matthieu De Mari" userId="dfb708c9-d8dc-439f-9a3b-c772bf4a311c" providerId="ADAL" clId="{5AF9E225-0E3D-4808-B523-40F6E9A1D59D}" dt="2023-03-02T09:10:43.209" v="4307" actId="207"/>
-        <pc:sldMkLst>
-          <pc:docMk/>
-          <pc:sldMk cId="1601297533" sldId="308"/>
-        </pc:sldMkLst>
-        <pc:spChg chg="mod">
-          <ac:chgData name="Matthieu De Mari" userId="dfb708c9-d8dc-439f-9a3b-c772bf4a311c" providerId="ADAL" clId="{5AF9E225-0E3D-4808-B523-40F6E9A1D59D}" dt="2023-03-02T09:10:43.209" v="4307" actId="207"/>
-          <ac:spMkLst>
-            <pc:docMk/>
-            <pc:sldMk cId="1601297533" sldId="308"/>
-            <ac:spMk id="3" creationId="{60ECB68E-5BF7-D3CC-11B5-DA1468BBE623}"/>
-          </ac:spMkLst>
-        </pc:spChg>
-      </pc:sldChg>
-      <pc:sldChg chg="modSp add mod ord">
-        <pc:chgData name="Matthieu De Mari" userId="dfb708c9-d8dc-439f-9a3b-c772bf4a311c" providerId="ADAL" clId="{5AF9E225-0E3D-4808-B523-40F6E9A1D59D}" dt="2023-03-02T09:20:16.513" v="4645"/>
-        <pc:sldMkLst>
-          <pc:docMk/>
-          <pc:sldMk cId="3331075550" sldId="309"/>
-        </pc:sldMkLst>
-        <pc:spChg chg="mod">
-          <ac:chgData name="Matthieu De Mari" userId="dfb708c9-d8dc-439f-9a3b-c772bf4a311c" providerId="ADAL" clId="{5AF9E225-0E3D-4808-B523-40F6E9A1D59D}" dt="2023-03-02T09:13:45.782" v="4477"/>
-          <ac:spMkLst>
-            <pc:docMk/>
-            <pc:sldMk cId="3331075550" sldId="309"/>
-            <ac:spMk id="3" creationId="{60ECB68E-5BF7-D3CC-11B5-DA1468BBE623}"/>
-          </ac:spMkLst>
-        </pc:spChg>
-      </pc:sldChg>
-      <pc:sldChg chg="modSp add mod">
-        <pc:chgData name="Matthieu De Mari" userId="dfb708c9-d8dc-439f-9a3b-c772bf4a311c" providerId="ADAL" clId="{5AF9E225-0E3D-4808-B523-40F6E9A1D59D}" dt="2023-03-02T09:13:28.270" v="4475" actId="20577"/>
-        <pc:sldMkLst>
-          <pc:docMk/>
-          <pc:sldMk cId="4251184714" sldId="310"/>
-        </pc:sldMkLst>
-        <pc:spChg chg="mod">
-          <ac:chgData name="Matthieu De Mari" userId="dfb708c9-d8dc-439f-9a3b-c772bf4a311c" providerId="ADAL" clId="{5AF9E225-0E3D-4808-B523-40F6E9A1D59D}" dt="2023-03-02T09:13:28.270" v="4475" actId="20577"/>
-          <ac:spMkLst>
-            <pc:docMk/>
-            <pc:sldMk cId="4251184714" sldId="310"/>
-            <ac:spMk id="3" creationId="{60ECB68E-5BF7-D3CC-11B5-DA1468BBE623}"/>
-          </ac:spMkLst>
-        </pc:spChg>
-      </pc:sldChg>
-      <pc:sldChg chg="modSp add mod ord">
-        <pc:chgData name="Matthieu De Mari" userId="dfb708c9-d8dc-439f-9a3b-c772bf4a311c" providerId="ADAL" clId="{5AF9E225-0E3D-4808-B523-40F6E9A1D59D}" dt="2023-03-02T09:20:16.513" v="4645"/>
-        <pc:sldMkLst>
-          <pc:docMk/>
-          <pc:sldMk cId="3629183510" sldId="311"/>
-        </pc:sldMkLst>
-        <pc:spChg chg="mod">
-          <ac:chgData name="Matthieu De Mari" userId="dfb708c9-d8dc-439f-9a3b-c772bf4a311c" providerId="ADAL" clId="{5AF9E225-0E3D-4808-B523-40F6E9A1D59D}" dt="2023-03-02T09:13:49.894" v="4479"/>
-          <ac:spMkLst>
-            <pc:docMk/>
-            <pc:sldMk cId="3629183510" sldId="311"/>
-            <ac:spMk id="3" creationId="{60ECB68E-5BF7-D3CC-11B5-DA1468BBE623}"/>
-          </ac:spMkLst>
-        </pc:spChg>
-      </pc:sldChg>
-      <pc:sldChg chg="modSp add mod">
-        <pc:chgData name="Matthieu De Mari" userId="dfb708c9-d8dc-439f-9a3b-c772bf4a311c" providerId="ADAL" clId="{5AF9E225-0E3D-4808-B523-40F6E9A1D59D}" dt="2023-03-02T09:14:09.472" v="4486" actId="207"/>
-        <pc:sldMkLst>
-          <pc:docMk/>
-          <pc:sldMk cId="7996884" sldId="312"/>
-        </pc:sldMkLst>
-        <pc:spChg chg="mod">
-          <ac:chgData name="Matthieu De Mari" userId="dfb708c9-d8dc-439f-9a3b-c772bf4a311c" providerId="ADAL" clId="{5AF9E225-0E3D-4808-B523-40F6E9A1D59D}" dt="2023-03-02T09:14:09.472" v="4486" actId="207"/>
-          <ac:spMkLst>
-            <pc:docMk/>
-            <pc:sldMk cId="7996884" sldId="312"/>
-            <ac:spMk id="3" creationId="{60ECB68E-5BF7-D3CC-11B5-DA1468BBE623}"/>
-          </ac:spMkLst>
-        </pc:spChg>
-      </pc:sldChg>
-      <pc:sldChg chg="add">
-        <pc:chgData name="Matthieu De Mari" userId="dfb708c9-d8dc-439f-9a3b-c772bf4a311c" providerId="ADAL" clId="{5AF9E225-0E3D-4808-B523-40F6E9A1D59D}" dt="2023-03-02T09:14:04.028" v="4484" actId="2890"/>
-        <pc:sldMkLst>
-          <pc:docMk/>
-          <pc:sldMk cId="1140638742" sldId="313"/>
-        </pc:sldMkLst>
-      </pc:sldChg>
-      <pc:sldChg chg="modSp new mod">
-        <pc:chgData name="Matthieu De Mari" userId="dfb708c9-d8dc-439f-9a3b-c772bf4a311c" providerId="ADAL" clId="{5AF9E225-0E3D-4808-B523-40F6E9A1D59D}" dt="2023-03-02T09:19:43.572" v="4643" actId="20577"/>
-        <pc:sldMkLst>
-          <pc:docMk/>
-          <pc:sldMk cId="2858358615" sldId="314"/>
-        </pc:sldMkLst>
-        <pc:spChg chg="mod">
-          <ac:chgData name="Matthieu De Mari" userId="dfb708c9-d8dc-439f-9a3b-c772bf4a311c" providerId="ADAL" clId="{5AF9E225-0E3D-4808-B523-40F6E9A1D59D}" dt="2023-03-02T09:15:03.737" v="4518" actId="20577"/>
-          <ac:spMkLst>
-            <pc:docMk/>
-            <pc:sldMk cId="2858358615" sldId="314"/>
-            <ac:spMk id="2" creationId="{8D13B38D-6896-4496-58F6-35E02213C6ED}"/>
-          </ac:spMkLst>
-        </pc:spChg>
-        <pc:spChg chg="mod">
-          <ac:chgData name="Matthieu De Mari" userId="dfb708c9-d8dc-439f-9a3b-c772bf4a311c" providerId="ADAL" clId="{5AF9E225-0E3D-4808-B523-40F6E9A1D59D}" dt="2023-03-02T09:19:43.572" v="4643" actId="20577"/>
-          <ac:spMkLst>
-            <pc:docMk/>
-            <pc:sldMk cId="2858358615" sldId="314"/>
-            <ac:spMk id="3" creationId="{FC4A93C0-0CAD-4BA5-9658-F523BC4C732F}"/>
-          </ac:spMkLst>
-        </pc:spChg>
-      </pc:sldChg>
-      <pc:sldChg chg="modSp add mod ord">
-        <pc:chgData name="Matthieu De Mari" userId="dfb708c9-d8dc-439f-9a3b-c772bf4a311c" providerId="ADAL" clId="{5AF9E225-0E3D-4808-B523-40F6E9A1D59D}" dt="2023-03-02T09:21:38.413" v="4685" actId="20577"/>
-        <pc:sldMkLst>
-          <pc:docMk/>
-          <pc:sldMk cId="1040156172" sldId="377"/>
-        </pc:sldMkLst>
-        <pc:spChg chg="mod">
-          <ac:chgData name="Matthieu De Mari" userId="dfb708c9-d8dc-439f-9a3b-c772bf4a311c" providerId="ADAL" clId="{5AF9E225-0E3D-4808-B523-40F6E9A1D59D}" dt="2023-03-02T09:21:38.413" v="4685" actId="20577"/>
-          <ac:spMkLst>
-            <pc:docMk/>
-            <pc:sldMk cId="1040156172" sldId="377"/>
-            <ac:spMk id="2" creationId="{080CEB46-CC16-4D19-8C2C-AEE9471D8168}"/>
-          </ac:spMkLst>
-        </pc:spChg>
-      </pc:sldChg>
-      <pc:sldChg chg="add ord">
-        <pc:chgData name="Matthieu De Mari" userId="dfb708c9-d8dc-439f-9a3b-c772bf4a311c" providerId="ADAL" clId="{5AF9E225-0E3D-4808-B523-40F6E9A1D59D}" dt="2023-03-02T09:20:56.065" v="4649" actId="20578"/>
-        <pc:sldMkLst>
-          <pc:docMk/>
-          <pc:sldMk cId="3338565690" sldId="378"/>
-        </pc:sldMkLst>
-      </pc:sldChg>
-      <pc:sldMasterChg chg="addSp mod">
-        <pc:chgData name="Matthieu De Mari" userId="dfb708c9-d8dc-439f-9a3b-c772bf4a311c" providerId="ADAL" clId="{5AF9E225-0E3D-4808-B523-40F6E9A1D59D}" dt="2023-03-02T06:54:28.184" v="0" actId="33475"/>
-        <pc:sldMasterMkLst>
-          <pc:docMk/>
-          <pc:sldMasterMk cId="1162895350" sldId="2147483648"/>
-        </pc:sldMasterMkLst>
-        <pc:spChg chg="add">
-          <ac:chgData name="Matthieu De Mari" userId="dfb708c9-d8dc-439f-9a3b-c772bf4a311c" providerId="ADAL" clId="{5AF9E225-0E3D-4808-B523-40F6E9A1D59D}" dt="2023-03-02T06:54:28.184" v="0" actId="33475"/>
-          <ac:spMkLst>
-            <pc:docMk/>
-            <pc:sldMasterMk cId="1162895350" sldId="2147483648"/>
-            <ac:spMk id="9" creationId="{487321BB-4993-C3D7-45BA-3941EB0C1E33}"/>
-          </ac:spMkLst>
-        </pc:spChg>
-        <pc:spChg chg="add">
-          <ac:chgData name="Matthieu De Mari" userId="dfb708c9-d8dc-439f-9a3b-c772bf4a311c" providerId="ADAL" clId="{5AF9E225-0E3D-4808-B523-40F6E9A1D59D}" dt="2023-03-02T06:54:28.184" v="0" actId="33475"/>
-          <ac:spMkLst>
-            <pc:docMk/>
-            <pc:sldMasterMk cId="1162895350" sldId="2147483648"/>
-            <ac:spMk id="10" creationId="{1EEF943D-E5F8-C50D-F37B-649E0AB3F320}"/>
-          </ac:spMkLst>
-        </pc:spChg>
-      </pc:sldMasterChg>
     </pc:docChg>
   </pc:docChgLst>
   <pc:docChgLst>
@@ -17448,7 +17430,7 @@
           <a:p>
             <a:r>
               <a:rPr lang="en-SG" dirty="0"/>
-              <a:t>It could be a variable/function/… name, or in other words, an </a:t>
+              <a:t>It could be a variable/function/class/… name, or in other words, an </a:t>
             </a:r>
             <a:r>
               <a:rPr lang="en-SG" b="1" dirty="0"/>
@@ -17641,12 +17623,16 @@
           <a:lstStyle/>
           <a:p>
             <a:r>
-              <a:rPr lang="en-GB" sz="2400" dirty="0" err="1"/>
-              <a:t>Current_lexeme</a:t>
-            </a:r>
-            <a:r>
               <a:rPr lang="en-GB" sz="2400" dirty="0"/>
-              <a:t> = “int” (backtrack to last lexeme that had at least one valid type)</a:t>
+              <a:t>Current lexeme = “int” (</a:t>
+            </a:r>
+            <a:r>
+              <a:rPr lang="en-GB" sz="2400" b="1" dirty="0"/>
+              <a:t>backtrack</a:t>
+            </a:r>
+            <a:r>
+              <a:rPr lang="en-GB" sz="2400" dirty="0"/>
+              <a:t> to last lexeme that had at least one valid type)</a:t>
             </a:r>
           </a:p>
           <a:p>
@@ -17920,12 +17906,8 @@
           <a:lstStyle/>
           <a:p>
             <a:r>
-              <a:rPr lang="en-GB" sz="2400" dirty="0" err="1"/>
-              <a:t>Current_lexeme</a:t>
-            </a:r>
-            <a:r>
               <a:rPr lang="en-GB" sz="2400" dirty="0"/>
-              <a:t> = “” (</a:t>
+              <a:t>Current lexeme = “” (</a:t>
             </a:r>
             <a:r>
               <a:rPr lang="en-GB" sz="2400" b="1" dirty="0"/>
@@ -18155,12 +18137,8 @@
           <a:lstStyle/>
           <a:p>
             <a:r>
-              <a:rPr lang="en-GB" sz="2400" dirty="0" err="1"/>
-              <a:t>Current_lexeme</a:t>
-            </a:r>
-            <a:r>
               <a:rPr lang="en-GB" sz="2400" dirty="0"/>
-              <a:t> = “ ” (single whitespace?)</a:t>
+              <a:t>Current lexeme = “ ” (single whitespace?)</a:t>
             </a:r>
           </a:p>
           <a:p>
@@ -18366,12 +18344,8 @@
           <a:lstStyle/>
           <a:p>
             <a:r>
-              <a:rPr lang="en-GB" sz="2400" dirty="0" err="1"/>
-              <a:t>Current_lexeme</a:t>
-            </a:r>
-            <a:r>
               <a:rPr lang="en-GB" sz="2400" dirty="0"/>
-              <a:t> = “” (irrelevant anyway, </a:t>
+              <a:t>Current lexeme = “” (irrelevant anyway, </a:t>
             </a:r>
             <a:r>
               <a:rPr lang="en-GB" sz="2400" b="1" dirty="0"/>
@@ -18585,12 +18559,8 @@
           <a:lstStyle/>
           <a:p>
             <a:r>
-              <a:rPr lang="en-GB" sz="2400" dirty="0" err="1"/>
-              <a:t>Current_lexeme</a:t>
-            </a:r>
-            <a:r>
               <a:rPr lang="en-GB" sz="2400" dirty="0"/>
-              <a:t> = “f”</a:t>
+              <a:t>Current lexeme = “f”</a:t>
             </a:r>
           </a:p>
           <a:p>
@@ -18796,12 +18766,8 @@
           <a:lstStyle/>
           <a:p>
             <a:r>
-              <a:rPr lang="en-GB" sz="2400" dirty="0" err="1"/>
-              <a:t>Current_lexeme</a:t>
-            </a:r>
-            <a:r>
               <a:rPr lang="en-GB" sz="2400" dirty="0"/>
-              <a:t> = “</a:t>
+              <a:t>Current lexeme = “</a:t>
             </a:r>
             <a:r>
               <a:rPr lang="en-GB" sz="2400" dirty="0" err="1"/>
@@ -19015,12 +18981,8 @@
           <a:lstStyle/>
           <a:p>
             <a:r>
-              <a:rPr lang="en-GB" sz="2400" dirty="0" err="1"/>
-              <a:t>Current_lexeme</a:t>
-            </a:r>
-            <a:r>
               <a:rPr lang="en-GB" sz="2400" dirty="0"/>
-              <a:t> = “for”</a:t>
+              <a:t>Current lexeme = “for”</a:t>
             </a:r>
           </a:p>
           <a:p>
@@ -19226,12 +19188,16 @@
           <a:lstStyle/>
           <a:p>
             <a:r>
-              <a:rPr lang="en-GB" sz="2400" dirty="0" err="1"/>
-              <a:t>Current_lexeme</a:t>
-            </a:r>
-            <a:r>
               <a:rPr lang="en-GB" sz="2400" dirty="0"/>
-              <a:t> = “for” (shall we call that a lexeme and categorise it now?)</a:t>
+              <a:t>Current lexeme = “for” (</a:t>
+            </a:r>
+            <a:r>
+              <a:rPr lang="en-GB" sz="2400" b="1" dirty="0"/>
+              <a:t>shall we call that a lexeme and categorise it now?</a:t>
+            </a:r>
+            <a:r>
+              <a:rPr lang="en-GB" sz="2400" dirty="0"/>
+              <a:t>)</a:t>
             </a:r>
           </a:p>
           <a:p>
@@ -19437,12 +19403,24 @@
           <a:lstStyle/>
           <a:p>
             <a:r>
-              <a:rPr lang="en-GB" sz="2400" dirty="0" err="1"/>
-              <a:t>Current_lexeme</a:t>
-            </a:r>
-            <a:r>
               <a:rPr lang="en-GB" sz="2400" dirty="0"/>
-              <a:t> = “for” (shall we call that a lexeme and categorise it now? No, continue)</a:t>
+              <a:t>Current lexeme = “for” (shall we call that a lexeme and categorise it now? </a:t>
+            </a:r>
+            <a:r>
+              <a:rPr lang="en-GB" sz="2400" b="1" dirty="0"/>
+              <a:t>No,</a:t>
+            </a:r>
+            <a:r>
+              <a:rPr lang="en-GB" sz="2400" dirty="0"/>
+              <a:t> </a:t>
+            </a:r>
+            <a:r>
+              <a:rPr lang="en-GB" sz="2400" b="1" dirty="0"/>
+              <a:t>continue</a:t>
+            </a:r>
+            <a:r>
+              <a:rPr lang="en-GB" sz="2400" dirty="0"/>
+              <a:t>)</a:t>
             </a:r>
           </a:p>
           <a:p>
@@ -19790,12 +19768,8 @@
           <a:lstStyle/>
           <a:p>
             <a:r>
-              <a:rPr lang="en-GB" sz="2400" dirty="0" err="1"/>
-              <a:t>Current_lexeme</a:t>
-            </a:r>
-            <a:r>
               <a:rPr lang="en-GB" sz="2400" dirty="0"/>
-              <a:t> = “fort”</a:t>
+              <a:t>Current lexeme = “fort”</a:t>
             </a:r>
           </a:p>
           <a:p>
@@ -20001,20 +19975,20 @@
           <a:lstStyle/>
           <a:p>
             <a:r>
-              <a:rPr lang="en-GB" sz="2400" dirty="0" err="1"/>
-              <a:t>Current_lexeme</a:t>
-            </a:r>
-            <a:r>
               <a:rPr lang="en-GB" sz="2400" dirty="0"/>
-              <a:t> = “fort=”</a:t>
+              <a:t>Current lexeme = “fort=”</a:t>
             </a:r>
           </a:p>
           <a:p>
             <a:r>
               <a:rPr lang="en-GB" sz="2400" dirty="0"/>
-              <a:t>Token types it could be: nothing</a:t>
-            </a:r>
-            <a:endParaRPr lang="en-SG" sz="2400" dirty="0"/>
+              <a:t>Token types it could be: </a:t>
+            </a:r>
+            <a:r>
+              <a:rPr lang="en-GB" sz="2400" b="1" dirty="0"/>
+              <a:t>nothing</a:t>
+            </a:r>
+            <a:endParaRPr lang="en-SG" sz="2400" b="1" dirty="0"/>
           </a:p>
         </p:txBody>
       </p:sp>
@@ -20212,12 +20186,16 @@
           <a:lstStyle/>
           <a:p>
             <a:r>
-              <a:rPr lang="en-GB" sz="2400" dirty="0" err="1"/>
-              <a:t>Current_lexeme</a:t>
-            </a:r>
-            <a:r>
               <a:rPr lang="en-GB" sz="2400" dirty="0"/>
-              <a:t> = “fort” (backtrack to last lexeme that had at least one valid type)</a:t>
+              <a:t>Current lexeme = “fort” (</a:t>
+            </a:r>
+            <a:r>
+              <a:rPr lang="en-GB" sz="2400" b="1" dirty="0"/>
+              <a:t>backtrack</a:t>
+            </a:r>
+            <a:r>
+              <a:rPr lang="en-GB" sz="2400" dirty="0"/>
+              <a:t> to last lexeme that had at least one valid type)</a:t>
             </a:r>
           </a:p>
           <a:p>
@@ -20580,7 +20558,7 @@
             </a:r>
             <a:r>
               <a:rPr lang="en-SG" dirty="0"/>
-              <a:t> Ultimately, this means that we will have to scan many more lexemes than before and will make the tokenizer slower.</a:t>
+              <a:t> Ultimately, this means that we will have to scan many more lexemes than before. In turn, it will make the tokenizer slower.</a:t>
             </a:r>
             <a:br>
               <a:rPr lang="en-SG" dirty="0"/>
@@ -20831,77 +20809,26 @@
         <p:spPr/>
         <p:txBody>
           <a:bodyPr>
-            <a:normAutofit fontScale="92500" lnSpcReduction="10000"/>
+            <a:normAutofit/>
           </a:bodyPr>
           <a:lstStyle/>
           <a:p>
             <a:r>
               <a:rPr lang="en-GB" dirty="0"/>
-              <a:t>Need to recognize more keywords, operators, punctuation, </a:t>
-            </a:r>
-            <a:r>
-              <a:rPr lang="en-GB" dirty="0" err="1"/>
-              <a:t>lieteral</a:t>
-            </a:r>
+              <a:t>Will split 1t00 into LITERAL(1) and IDENTIFIER(t00), instead of UNKNOWN(1t00).</a:t>
+            </a:r>
+          </a:p>
+          <a:p>
             <a:r>
               <a:rPr lang="en-GB" dirty="0"/>
-              <a:t> types (float, char, string, etc.)</a:t>
+              <a:t>Per se, it is not that bad as it will be caught by PARSER later on: Literals cannot be followed by identifiers.</a:t>
             </a:r>
           </a:p>
           <a:p>
             <a:r>
               <a:rPr lang="en-GB" dirty="0"/>
-              <a:t>The == operator recognized as two = operators</a:t>
-            </a:r>
-          </a:p>
-          <a:p>
-            <a:r>
-              <a:rPr lang="en-GB" dirty="0"/>
-              <a:t>Adding == to operator </a:t>
-            </a:r>
-            <a:r>
-              <a:rPr lang="en-GB" dirty="0" err="1"/>
-              <a:t>RegEx</a:t>
-            </a:r>
-            <a:r>
-              <a:rPr lang="en-GB" dirty="0"/>
-              <a:t> will not solve that</a:t>
-            </a:r>
-          </a:p>
-          <a:p>
-            <a:pPr marL="0" indent="0">
-              <a:buNone/>
-            </a:pPr>
-            <a:r>
-              <a:rPr lang="en-GB" dirty="0"/>
-              <a:t>Need more specific rules for deciding if special character should be added to lexeme or not</a:t>
-            </a:r>
-          </a:p>
-          <a:p>
-            <a:r>
-              <a:rPr lang="en-GB" dirty="0"/>
-              <a:t>Variable= No, split the two to get an identifier and an operator</a:t>
-            </a:r>
-          </a:p>
-          <a:p>
-            <a:r>
-              <a:rPr lang="en-GB" dirty="0"/>
-              <a:t>Variable== Yes, the two == signs need to be combined in a lexeme</a:t>
-            </a:r>
-          </a:p>
-          <a:p>
-            <a:r>
-              <a:rPr lang="en-GB" dirty="0"/>
-              <a:t>Similarly, variable0.7 Invalid, the . should not be part of a lexeme</a:t>
-            </a:r>
-          </a:p>
-          <a:p>
-            <a:r>
-              <a:rPr lang="en-GB" dirty="0"/>
-              <a:t>10.7 Valid, all characters will be part of a lexeme (float identifier)</a:t>
-            </a:r>
-          </a:p>
-          <a:p>
+              <a:t>So it is up to us to decide who will raise the error: the tokenizer or the parser.</a:t>
+            </a:r>
             <a:endParaRPr lang="en-SG" dirty="0"/>
           </a:p>
         </p:txBody>
@@ -20941,7 +20868,7 @@
           <p:cNvPr id="2" name="Title 1">
             <a:extLst>
               <a:ext uri="{FF2B5EF4-FFF2-40B4-BE49-F238E27FC236}">
-                <a16:creationId xmlns:a16="http://schemas.microsoft.com/office/drawing/2014/main" id="{E3241298-4AFB-E902-8308-53D802DAE0FD}"/>
+                <a16:creationId xmlns:a16="http://schemas.microsoft.com/office/drawing/2014/main" id="{AEFA02F6-623B-13EA-E722-E0CCCD99DB57}"/>
               </a:ext>
             </a:extLst>
           </p:cNvPr>
@@ -20966,7 +20893,7 @@
           <p:cNvPr id="3" name="Content Placeholder 2">
             <a:extLst>
               <a:ext uri="{FF2B5EF4-FFF2-40B4-BE49-F238E27FC236}">
-                <a16:creationId xmlns:a16="http://schemas.microsoft.com/office/drawing/2014/main" id="{DE81F6FE-6ED0-9FA2-308D-BCF427F4494B}"/>
+                <a16:creationId xmlns:a16="http://schemas.microsoft.com/office/drawing/2014/main" id="{015D9CC1-DB3F-2AA6-618F-E8DA5A2D10D9}"/>
               </a:ext>
             </a:extLst>
           </p:cNvPr>
@@ -20982,94 +20909,14 @@
           <a:bodyPr/>
           <a:lstStyle/>
           <a:p>
-            <a:endParaRPr lang="en-SG"/>
+            <a:endParaRPr lang="en-SG" dirty="0"/>
           </a:p>
         </p:txBody>
       </p:sp>
     </p:spTree>
     <p:extLst>
       <p:ext uri="{BB962C8B-B14F-4D97-AF65-F5344CB8AC3E}">
-        <p14:creationId xmlns:p14="http://schemas.microsoft.com/office/powerpoint/2010/main" val="3242948426"/>
-      </p:ext>
-    </p:extLst>
-  </p:cSld>
-  <p:clrMapOvr>
-    <a:masterClrMapping/>
-  </p:clrMapOvr>
-</p:sld>
-</file>
-
-<file path=ppt/slides/slide29.xml><?xml version="1.0" encoding="utf-8"?>
-<p:sld xmlns:a="http://schemas.openxmlformats.org/drawingml/2006/main" xmlns:r="http://schemas.openxmlformats.org/officeDocument/2006/relationships" xmlns:p="http://schemas.openxmlformats.org/presentationml/2006/main">
-  <p:cSld>
-    <p:spTree>
-      <p:nvGrpSpPr>
-        <p:cNvPr id="1" name=""/>
-        <p:cNvGrpSpPr/>
-        <p:nvPr/>
-      </p:nvGrpSpPr>
-      <p:grpSpPr>
-        <a:xfrm>
-          <a:off x="0" y="0"/>
-          <a:ext cx="0" cy="0"/>
-          <a:chOff x="0" y="0"/>
-          <a:chExt cx="0" cy="0"/>
-        </a:xfrm>
-      </p:grpSpPr>
-      <p:sp>
-        <p:nvSpPr>
-          <p:cNvPr id="2" name="Title 1">
-            <a:extLst>
-              <a:ext uri="{FF2B5EF4-FFF2-40B4-BE49-F238E27FC236}">
-                <a16:creationId xmlns:a16="http://schemas.microsoft.com/office/drawing/2014/main" id="{6F28FC54-3F10-310A-4E3B-63B5874B7B24}"/>
-              </a:ext>
-            </a:extLst>
-          </p:cNvPr>
-          <p:cNvSpPr>
-            <a:spLocks noGrp="1"/>
-          </p:cNvSpPr>
-          <p:nvPr>
-            <p:ph type="title"/>
-          </p:nvPr>
-        </p:nvSpPr>
-        <p:spPr/>
-        <p:txBody>
-          <a:bodyPr/>
-          <a:lstStyle/>
-          <a:p>
-            <a:endParaRPr lang="en-SG"/>
-          </a:p>
-        </p:txBody>
-      </p:sp>
-      <p:sp>
-        <p:nvSpPr>
-          <p:cNvPr id="3" name="Content Placeholder 2">
-            <a:extLst>
-              <a:ext uri="{FF2B5EF4-FFF2-40B4-BE49-F238E27FC236}">
-                <a16:creationId xmlns:a16="http://schemas.microsoft.com/office/drawing/2014/main" id="{F1C556DD-3998-4484-2C6F-A9F8F2762031}"/>
-              </a:ext>
-            </a:extLst>
-          </p:cNvPr>
-          <p:cNvSpPr>
-            <a:spLocks noGrp="1"/>
-          </p:cNvSpPr>
-          <p:nvPr>
-            <p:ph idx="1"/>
-          </p:nvPr>
-        </p:nvSpPr>
-        <p:spPr/>
-        <p:txBody>
-          <a:bodyPr/>
-          <a:lstStyle/>
-          <a:p>
-            <a:endParaRPr lang="en-SG"/>
-          </a:p>
-        </p:txBody>
-      </p:sp>
-    </p:spTree>
-    <p:extLst>
-      <p:ext uri="{BB962C8B-B14F-4D97-AF65-F5344CB8AC3E}">
-        <p14:creationId xmlns:p14="http://schemas.microsoft.com/office/powerpoint/2010/main" val="1463768414"/>
+        <p14:creationId xmlns:p14="http://schemas.microsoft.com/office/powerpoint/2010/main" val="319636625"/>
       </p:ext>
     </p:extLst>
   </p:cSld>
@@ -21213,186 +21060,6 @@
 </p:sld>
 </file>
 
-<file path=ppt/slides/slide30.xml><?xml version="1.0" encoding="utf-8"?>
-<p:sld xmlns:a="http://schemas.openxmlformats.org/drawingml/2006/main" xmlns:r="http://schemas.openxmlformats.org/officeDocument/2006/relationships" xmlns:p="http://schemas.openxmlformats.org/presentationml/2006/main">
-  <p:cSld>
-    <p:spTree>
-      <p:nvGrpSpPr>
-        <p:cNvPr id="1" name=""/>
-        <p:cNvGrpSpPr/>
-        <p:nvPr/>
-      </p:nvGrpSpPr>
-      <p:grpSpPr>
-        <a:xfrm>
-          <a:off x="0" y="0"/>
-          <a:ext cx="0" cy="0"/>
-          <a:chOff x="0" y="0"/>
-          <a:chExt cx="0" cy="0"/>
-        </a:xfrm>
-      </p:grpSpPr>
-      <p:sp>
-        <p:nvSpPr>
-          <p:cNvPr id="2" name="Title 1">
-            <a:extLst>
-              <a:ext uri="{FF2B5EF4-FFF2-40B4-BE49-F238E27FC236}">
-                <a16:creationId xmlns:a16="http://schemas.microsoft.com/office/drawing/2014/main" id="{B8F8AD20-D3EE-F984-0A9E-5C7B13B5240C}"/>
-              </a:ext>
-            </a:extLst>
-          </p:cNvPr>
-          <p:cNvSpPr>
-            <a:spLocks noGrp="1"/>
-          </p:cNvSpPr>
-          <p:nvPr>
-            <p:ph type="title"/>
-          </p:nvPr>
-        </p:nvSpPr>
-        <p:spPr/>
-        <p:txBody>
-          <a:bodyPr/>
-          <a:lstStyle/>
-          <a:p>
-            <a:r>
-              <a:rPr lang="en-GB"/>
-              <a:t>Limits of code 2</a:t>
-            </a:r>
-            <a:endParaRPr lang="en-SG" dirty="0"/>
-          </a:p>
-        </p:txBody>
-      </p:sp>
-      <p:sp>
-        <p:nvSpPr>
-          <p:cNvPr id="3" name="Content Placeholder 2">
-            <a:extLst>
-              <a:ext uri="{FF2B5EF4-FFF2-40B4-BE49-F238E27FC236}">
-                <a16:creationId xmlns:a16="http://schemas.microsoft.com/office/drawing/2014/main" id="{58E87A79-F9F7-F59B-E9FE-8D35F3995109}"/>
-              </a:ext>
-            </a:extLst>
-          </p:cNvPr>
-          <p:cNvSpPr>
-            <a:spLocks noGrp="1"/>
-          </p:cNvSpPr>
-          <p:nvPr>
-            <p:ph idx="1"/>
-          </p:nvPr>
-        </p:nvSpPr>
-        <p:spPr/>
-        <p:txBody>
-          <a:bodyPr/>
-          <a:lstStyle/>
-          <a:p>
-            <a:r>
-              <a:rPr lang="en-GB" dirty="0"/>
-              <a:t>Will split 1t00 into LITERAL(1) and IDENTIFIER(t00), instead of UNKNOWN(1t00).</a:t>
-            </a:r>
-          </a:p>
-          <a:p>
-            <a:r>
-              <a:rPr lang="en-GB" dirty="0"/>
-              <a:t>Per se, it is not that bad as it will be caught by PARSER later on: Literals cannot be followed by identifiers.</a:t>
-            </a:r>
-          </a:p>
-          <a:p>
-            <a:r>
-              <a:rPr lang="en-GB" dirty="0"/>
-              <a:t>So it is up to us to decide who will raise the error: the tokenizer or the parser.</a:t>
-            </a:r>
-            <a:endParaRPr lang="en-SG" dirty="0"/>
-          </a:p>
-        </p:txBody>
-      </p:sp>
-    </p:spTree>
-    <p:extLst>
-      <p:ext uri="{BB962C8B-B14F-4D97-AF65-F5344CB8AC3E}">
-        <p14:creationId xmlns:p14="http://schemas.microsoft.com/office/powerpoint/2010/main" val="1117217621"/>
-      </p:ext>
-    </p:extLst>
-  </p:cSld>
-  <p:clrMapOvr>
-    <a:masterClrMapping/>
-  </p:clrMapOvr>
-</p:sld>
-</file>
-
-<file path=ppt/slides/slide31.xml><?xml version="1.0" encoding="utf-8"?>
-<p:sld xmlns:a="http://schemas.openxmlformats.org/drawingml/2006/main" xmlns:r="http://schemas.openxmlformats.org/officeDocument/2006/relationships" xmlns:p="http://schemas.openxmlformats.org/presentationml/2006/main">
-  <p:cSld>
-    <p:spTree>
-      <p:nvGrpSpPr>
-        <p:cNvPr id="1" name=""/>
-        <p:cNvGrpSpPr/>
-        <p:nvPr/>
-      </p:nvGrpSpPr>
-      <p:grpSpPr>
-        <a:xfrm>
-          <a:off x="0" y="0"/>
-          <a:ext cx="0" cy="0"/>
-          <a:chOff x="0" y="0"/>
-          <a:chExt cx="0" cy="0"/>
-        </a:xfrm>
-      </p:grpSpPr>
-      <p:sp>
-        <p:nvSpPr>
-          <p:cNvPr id="2" name="Title 1">
-            <a:extLst>
-              <a:ext uri="{FF2B5EF4-FFF2-40B4-BE49-F238E27FC236}">
-                <a16:creationId xmlns:a16="http://schemas.microsoft.com/office/drawing/2014/main" id="{AEFA02F6-623B-13EA-E722-E0CCCD99DB57}"/>
-              </a:ext>
-            </a:extLst>
-          </p:cNvPr>
-          <p:cNvSpPr>
-            <a:spLocks noGrp="1"/>
-          </p:cNvSpPr>
-          <p:nvPr>
-            <p:ph type="title"/>
-          </p:nvPr>
-        </p:nvSpPr>
-        <p:spPr/>
-        <p:txBody>
-          <a:bodyPr/>
-          <a:lstStyle/>
-          <a:p>
-            <a:endParaRPr lang="en-SG"/>
-          </a:p>
-        </p:txBody>
-      </p:sp>
-      <p:sp>
-        <p:nvSpPr>
-          <p:cNvPr id="3" name="Content Placeholder 2">
-            <a:extLst>
-              <a:ext uri="{FF2B5EF4-FFF2-40B4-BE49-F238E27FC236}">
-                <a16:creationId xmlns:a16="http://schemas.microsoft.com/office/drawing/2014/main" id="{015D9CC1-DB3F-2AA6-618F-E8DA5A2D10D9}"/>
-              </a:ext>
-            </a:extLst>
-          </p:cNvPr>
-          <p:cNvSpPr>
-            <a:spLocks noGrp="1"/>
-          </p:cNvSpPr>
-          <p:nvPr>
-            <p:ph idx="1"/>
-          </p:nvPr>
-        </p:nvSpPr>
-        <p:spPr/>
-        <p:txBody>
-          <a:bodyPr/>
-          <a:lstStyle/>
-          <a:p>
-            <a:endParaRPr lang="en-SG" dirty="0"/>
-          </a:p>
-        </p:txBody>
-      </p:sp>
-    </p:spTree>
-    <p:extLst>
-      <p:ext uri="{BB962C8B-B14F-4D97-AF65-F5344CB8AC3E}">
-        <p14:creationId xmlns:p14="http://schemas.microsoft.com/office/powerpoint/2010/main" val="319636625"/>
-      </p:ext>
-    </p:extLst>
-  </p:cSld>
-  <p:clrMapOvr>
-    <a:masterClrMapping/>
-  </p:clrMapOvr>
-</p:sld>
-</file>
-
 <file path=ppt/slides/slide4.xml><?xml version="1.0" encoding="utf-8"?>
 <p:sld xmlns:a="http://schemas.openxmlformats.org/drawingml/2006/main" xmlns:r="http://schemas.openxmlformats.org/officeDocument/2006/relationships" xmlns:p="http://schemas.openxmlformats.org/presentationml/2006/main">
   <p:cSld>
@@ -21488,7 +21155,7 @@
           <a:p>
             <a:r>
               <a:rPr lang="en-GB" dirty="0"/>
-              <a:t>In practice, it is never the case.</a:t>
+              <a:t>In practice, almost never true.</a:t>
             </a:r>
           </a:p>
         </p:txBody>
@@ -21722,12 +21389,8 @@
           <a:lstStyle/>
           <a:p>
             <a:r>
-              <a:rPr lang="en-GB" sz="2400" dirty="0" err="1"/>
-              <a:t>Current_lexeme</a:t>
-            </a:r>
-            <a:r>
               <a:rPr lang="en-GB" sz="2400" dirty="0"/>
-              <a:t> = “</a:t>
+              <a:t>Current lexeme = “</a:t>
             </a:r>
             <a:r>
               <a:rPr lang="en-GB" sz="2400" dirty="0" err="1"/>
@@ -21895,12 +21558,8 @@
           <a:lstStyle/>
           <a:p>
             <a:r>
-              <a:rPr lang="en-GB" sz="2400" dirty="0" err="1"/>
-              <a:t>Current_lexeme</a:t>
-            </a:r>
-            <a:r>
               <a:rPr lang="en-GB" sz="2400" dirty="0"/>
-              <a:t> = “in”</a:t>
+              <a:t>Current lexeme = “in”</a:t>
             </a:r>
           </a:p>
           <a:p>
@@ -22106,12 +21765,8 @@
           <a:lstStyle/>
           <a:p>
             <a:r>
-              <a:rPr lang="en-GB" sz="2400" dirty="0" err="1"/>
-              <a:t>Current_lexeme</a:t>
-            </a:r>
-            <a:r>
               <a:rPr lang="en-GB" sz="2400" dirty="0"/>
-              <a:t> = “int”</a:t>
+              <a:t>Current lexeme = “int”</a:t>
             </a:r>
           </a:p>
           <a:p>
@@ -22317,12 +21972,8 @@
           <a:lstStyle/>
           <a:p>
             <a:r>
-              <a:rPr lang="en-GB" sz="2400" dirty="0" err="1"/>
-              <a:t>Current_lexeme</a:t>
-            </a:r>
-            <a:r>
               <a:rPr lang="en-GB" sz="2400" dirty="0"/>
-              <a:t> = “int ” (with whitespace!)</a:t>
+              <a:t>Current lexeme = “int ” (with whitespace!)</a:t>
             </a:r>
           </a:p>
           <a:p>
@@ -22528,12 +22179,8 @@
           <a:lstStyle/>
           <a:p>
             <a:r>
-              <a:rPr lang="en-GB" sz="2400" dirty="0" err="1"/>
-              <a:t>Current_lexeme</a:t>
-            </a:r>
-            <a:r>
               <a:rPr lang="en-GB" sz="2400" dirty="0"/>
-              <a:t> = “int” (backtrack to last lexeme that had at least one valid type)</a:t>
+              <a:t>Current lexeme = “int” (backtrack to last lexeme that had at least one valid type)</a:t>
             </a:r>
           </a:p>
           <a:p>

</xml_diff>

<commit_message>
Big commit, have not done in a while, W10-11 finalized.
</commit_message>
<xml_diff>
--- a/W10/W10S1/W10S1.pptx
+++ b/W10/W10S1/W10S1.pptx
@@ -287,7 +287,7 @@
 <file path=ppt/revisionInfo.xml><?xml version="1.0" encoding="utf-8"?>
 <p1510:revInfo xmlns:a="http://schemas.openxmlformats.org/drawingml/2006/main" xmlns:r="http://schemas.openxmlformats.org/officeDocument/2006/relationships" xmlns:p1510="http://schemas.microsoft.com/office/powerpoint/2015/10/main">
   <p1510:revLst>
-    <p1510:client id="{B062104F-1E69-4CDF-A22D-D1D6E8C24F26}" v="51" dt="2023-03-28T05:53:21.164"/>
+    <p1510:client id="{B062104F-1E69-4CDF-A22D-D1D6E8C24F26}" v="53" dt="2023-03-30T07:34:23.004"/>
   </p1510:revLst>
 </p1510:revInfo>
 </file>
@@ -4422,7 +4422,7 @@
   <pc:docChgLst>
     <pc:chgData name="Matthieu De Mari" userId="dfb708c9-d8dc-439f-9a3b-c772bf4a311c" providerId="ADAL" clId="{B062104F-1E69-4CDF-A22D-D1D6E8C24F26}"/>
     <pc:docChg chg="undo redo custSel addSld delSld modSld sldOrd addSection delSection modSection">
-      <pc:chgData name="Matthieu De Mari" userId="dfb708c9-d8dc-439f-9a3b-c772bf4a311c" providerId="ADAL" clId="{B062104F-1E69-4CDF-A22D-D1D6E8C24F26}" dt="2023-03-28T05:56:58.081" v="12404" actId="207"/>
+      <pc:chgData name="Matthieu De Mari" userId="dfb708c9-d8dc-439f-9a3b-c772bf4a311c" providerId="ADAL" clId="{B062104F-1E69-4CDF-A22D-D1D6E8C24F26}" dt="2023-03-30T07:35:16.122" v="12442" actId="1076"/>
       <pc:docMkLst>
         <pc:docMk/>
       </pc:docMkLst>
@@ -5522,7 +5522,7 @@
         </pc:cxnChg>
       </pc:sldChg>
       <pc:sldChg chg="addSp delSp modSp add mod ord">
-        <pc:chgData name="Matthieu De Mari" userId="dfb708c9-d8dc-439f-9a3b-c772bf4a311c" providerId="ADAL" clId="{B062104F-1E69-4CDF-A22D-D1D6E8C24F26}" dt="2023-03-27T02:06:28.570" v="6810"/>
+        <pc:chgData name="Matthieu De Mari" userId="dfb708c9-d8dc-439f-9a3b-c772bf4a311c" providerId="ADAL" clId="{B062104F-1E69-4CDF-A22D-D1D6E8C24F26}" dt="2023-03-30T07:34:00.108" v="12421" actId="14100"/>
         <pc:sldMkLst>
           <pc:docMk/>
           <pc:sldMk cId="1892235338" sldId="411"/>
@@ -5536,13 +5536,21 @@
           </ac:spMkLst>
         </pc:spChg>
         <pc:spChg chg="mod">
-          <ac:chgData name="Matthieu De Mari" userId="dfb708c9-d8dc-439f-9a3b-c772bf4a311c" providerId="ADAL" clId="{B062104F-1E69-4CDF-A22D-D1D6E8C24F26}" dt="2023-03-27T02:06:25.760" v="6808" actId="14100"/>
+          <ac:chgData name="Matthieu De Mari" userId="dfb708c9-d8dc-439f-9a3b-c772bf4a311c" providerId="ADAL" clId="{B062104F-1E69-4CDF-A22D-D1D6E8C24F26}" dt="2023-03-30T07:34:00.108" v="12421" actId="14100"/>
           <ac:spMkLst>
             <pc:docMk/>
             <pc:sldMk cId="1892235338" sldId="411"/>
             <ac:spMk id="8" creationId="{82F60193-F2F1-E3C8-D181-1294065C155D}"/>
           </ac:spMkLst>
         </pc:spChg>
+        <pc:picChg chg="add mod ord">
+          <ac:chgData name="Matthieu De Mari" userId="dfb708c9-d8dc-439f-9a3b-c772bf4a311c" providerId="ADAL" clId="{B062104F-1E69-4CDF-A22D-D1D6E8C24F26}" dt="2023-03-30T07:33:56.433" v="12420" actId="1076"/>
+          <ac:picMkLst>
+            <pc:docMk/>
+            <pc:sldMk cId="1892235338" sldId="411"/>
+            <ac:picMk id="3" creationId="{0DA51312-F25B-B942-611A-C2F3632C8E7A}"/>
+          </ac:picMkLst>
+        </pc:picChg>
         <pc:picChg chg="del">
           <ac:chgData name="Matthieu De Mari" userId="dfb708c9-d8dc-439f-9a3b-c772bf4a311c" providerId="ADAL" clId="{B062104F-1E69-4CDF-A22D-D1D6E8C24F26}" dt="2023-03-27T02:04:22.646" v="6690" actId="478"/>
           <ac:picMkLst>
@@ -5559,8 +5567,8 @@
             <ac:picMk id="4" creationId="{EAE031E3-9324-F1F7-2B8D-0F847DCA6439}"/>
           </ac:picMkLst>
         </pc:picChg>
-        <pc:picChg chg="add mod ord modCrop">
-          <ac:chgData name="Matthieu De Mari" userId="dfb708c9-d8dc-439f-9a3b-c772bf4a311c" providerId="ADAL" clId="{B062104F-1E69-4CDF-A22D-D1D6E8C24F26}" dt="2023-03-27T02:06:22.621" v="6807" actId="171"/>
+        <pc:picChg chg="add del mod ord modCrop">
+          <ac:chgData name="Matthieu De Mari" userId="dfb708c9-d8dc-439f-9a3b-c772bf4a311c" providerId="ADAL" clId="{B062104F-1E69-4CDF-A22D-D1D6E8C24F26}" dt="2023-03-30T07:33:50.766" v="12410" actId="478"/>
           <ac:picMkLst>
             <pc:docMk/>
             <pc:sldMk cId="1892235338" sldId="411"/>
@@ -5582,8 +5590,8 @@
           <pc:sldMk cId="224038096" sldId="412"/>
         </pc:sldMkLst>
       </pc:sldChg>
-      <pc:sldChg chg="modSp add mod">
-        <pc:chgData name="Matthieu De Mari" userId="dfb708c9-d8dc-439f-9a3b-c772bf4a311c" providerId="ADAL" clId="{B062104F-1E69-4CDF-A22D-D1D6E8C24F26}" dt="2023-03-27T02:07:35.543" v="6872" actId="1076"/>
+      <pc:sldChg chg="addSp delSp modSp add mod">
+        <pc:chgData name="Matthieu De Mari" userId="dfb708c9-d8dc-439f-9a3b-c772bf4a311c" providerId="ADAL" clId="{B062104F-1E69-4CDF-A22D-D1D6E8C24F26}" dt="2023-03-30T07:34:17.069" v="12431" actId="14100"/>
         <pc:sldMkLst>
           <pc:docMk/>
           <pc:sldMk cId="722276603" sldId="412"/>
@@ -5597,13 +5605,37 @@
           </ac:spMkLst>
         </pc:spChg>
         <pc:spChg chg="mod">
-          <ac:chgData name="Matthieu De Mari" userId="dfb708c9-d8dc-439f-9a3b-c772bf4a311c" providerId="ADAL" clId="{B062104F-1E69-4CDF-A22D-D1D6E8C24F26}" dt="2023-03-27T02:07:35.543" v="6872" actId="1076"/>
+          <ac:chgData name="Matthieu De Mari" userId="dfb708c9-d8dc-439f-9a3b-c772bf4a311c" providerId="ADAL" clId="{B062104F-1E69-4CDF-A22D-D1D6E8C24F26}" dt="2023-03-30T07:34:17.069" v="12431" actId="14100"/>
           <ac:spMkLst>
             <pc:docMk/>
             <pc:sldMk cId="722276603" sldId="412"/>
             <ac:spMk id="8" creationId="{82F60193-F2F1-E3C8-D181-1294065C155D}"/>
           </ac:spMkLst>
         </pc:spChg>
+        <pc:picChg chg="add del">
+          <ac:chgData name="Matthieu De Mari" userId="dfb708c9-d8dc-439f-9a3b-c772bf4a311c" providerId="ADAL" clId="{B062104F-1E69-4CDF-A22D-D1D6E8C24F26}" dt="2023-03-30T07:34:05.204" v="12424" actId="22"/>
+          <ac:picMkLst>
+            <pc:docMk/>
+            <pc:sldMk cId="722276603" sldId="412"/>
+            <ac:picMk id="3" creationId="{62BD7633-85A8-CC87-0D6E-BD54CF7FFC06}"/>
+          </ac:picMkLst>
+        </pc:picChg>
+        <pc:picChg chg="add mod ord">
+          <ac:chgData name="Matthieu De Mari" userId="dfb708c9-d8dc-439f-9a3b-c772bf4a311c" providerId="ADAL" clId="{B062104F-1E69-4CDF-A22D-D1D6E8C24F26}" dt="2023-03-30T07:34:11.100" v="12430" actId="171"/>
+          <ac:picMkLst>
+            <pc:docMk/>
+            <pc:sldMk cId="722276603" sldId="412"/>
+            <ac:picMk id="4" creationId="{F7136249-6C9A-86D1-98B3-9C3EF5D3EAD7}"/>
+          </ac:picMkLst>
+        </pc:picChg>
+        <pc:picChg chg="del">
+          <ac:chgData name="Matthieu De Mari" userId="dfb708c9-d8dc-439f-9a3b-c772bf4a311c" providerId="ADAL" clId="{B062104F-1E69-4CDF-A22D-D1D6E8C24F26}" dt="2023-03-30T07:34:03.748" v="12422" actId="478"/>
+          <ac:picMkLst>
+            <pc:docMk/>
+            <pc:sldMk cId="722276603" sldId="412"/>
+            <ac:picMk id="7" creationId="{926B6400-8E44-1309-476D-6B945159EBC1}"/>
+          </ac:picMkLst>
+        </pc:picChg>
       </pc:sldChg>
       <pc:sldChg chg="del">
         <pc:chgData name="Matthieu De Mari" userId="dfb708c9-d8dc-439f-9a3b-c772bf4a311c" providerId="ADAL" clId="{B062104F-1E69-4CDF-A22D-D1D6E8C24F26}" dt="2023-03-21T06:06:12.238" v="16" actId="47"/>
@@ -5612,8 +5644,8 @@
           <pc:sldMk cId="1129488317" sldId="413"/>
         </pc:sldMkLst>
       </pc:sldChg>
-      <pc:sldChg chg="modSp add mod">
-        <pc:chgData name="Matthieu De Mari" userId="dfb708c9-d8dc-439f-9a3b-c772bf4a311c" providerId="ADAL" clId="{B062104F-1E69-4CDF-A22D-D1D6E8C24F26}" dt="2023-03-27T02:08:18.096" v="6958" actId="14100"/>
+      <pc:sldChg chg="addSp delSp modSp add mod">
+        <pc:chgData name="Matthieu De Mari" userId="dfb708c9-d8dc-439f-9a3b-c772bf4a311c" providerId="ADAL" clId="{B062104F-1E69-4CDF-A22D-D1D6E8C24F26}" dt="2023-03-30T07:34:26.062" v="12437" actId="171"/>
         <pc:sldMkLst>
           <pc:docMk/>
           <pc:sldMk cId="1495360429" sldId="413"/>
@@ -5634,9 +5666,25 @@
             <ac:spMk id="8" creationId="{82F60193-F2F1-E3C8-D181-1294065C155D}"/>
           </ac:spMkLst>
         </pc:spChg>
+        <pc:picChg chg="add mod ord">
+          <ac:chgData name="Matthieu De Mari" userId="dfb708c9-d8dc-439f-9a3b-c772bf4a311c" providerId="ADAL" clId="{B062104F-1E69-4CDF-A22D-D1D6E8C24F26}" dt="2023-03-30T07:34:26.062" v="12437" actId="171"/>
+          <ac:picMkLst>
+            <pc:docMk/>
+            <pc:sldMk cId="1495360429" sldId="413"/>
+            <ac:picMk id="2" creationId="{38C177BA-937E-F33A-CD18-3818406A9DC7}"/>
+          </ac:picMkLst>
+        </pc:picChg>
+        <pc:picChg chg="del">
+          <ac:chgData name="Matthieu De Mari" userId="dfb708c9-d8dc-439f-9a3b-c772bf4a311c" providerId="ADAL" clId="{B062104F-1E69-4CDF-A22D-D1D6E8C24F26}" dt="2023-03-30T07:34:22.741" v="12432" actId="478"/>
+          <ac:picMkLst>
+            <pc:docMk/>
+            <pc:sldMk cId="1495360429" sldId="413"/>
+            <ac:picMk id="7" creationId="{926B6400-8E44-1309-476D-6B945159EBC1}"/>
+          </ac:picMkLst>
+        </pc:picChg>
       </pc:sldChg>
       <pc:sldChg chg="addSp delSp modSp new mod">
-        <pc:chgData name="Matthieu De Mari" userId="dfb708c9-d8dc-439f-9a3b-c772bf4a311c" providerId="ADAL" clId="{B062104F-1E69-4CDF-A22D-D1D6E8C24F26}" dt="2023-03-27T02:11:34.680" v="7156" actId="20577"/>
+        <pc:chgData name="Matthieu De Mari" userId="dfb708c9-d8dc-439f-9a3b-c772bf4a311c" providerId="ADAL" clId="{B062104F-1E69-4CDF-A22D-D1D6E8C24F26}" dt="2023-03-30T07:35:16.122" v="12442" actId="1076"/>
         <pc:sldMkLst>
           <pc:docMk/>
           <pc:sldMk cId="1313730759" sldId="414"/>
@@ -5665,6 +5713,14 @@
             <ac:spMk id="11" creationId="{F8AC0A0A-99A8-4AD9-940F-9E60A2E8BDF1}"/>
           </ac:spMkLst>
         </pc:spChg>
+        <pc:picChg chg="add mod">
+          <ac:chgData name="Matthieu De Mari" userId="dfb708c9-d8dc-439f-9a3b-c772bf4a311c" providerId="ADAL" clId="{B062104F-1E69-4CDF-A22D-D1D6E8C24F26}" dt="2023-03-30T07:35:16.122" v="12442" actId="1076"/>
+          <ac:picMkLst>
+            <pc:docMk/>
+            <pc:sldMk cId="1313730759" sldId="414"/>
+            <ac:picMk id="3" creationId="{9F96E32E-903A-6978-B14C-609CFEAD0540}"/>
+          </ac:picMkLst>
+        </pc:picChg>
         <pc:picChg chg="add mod modCrop">
           <ac:chgData name="Matthieu De Mari" userId="dfb708c9-d8dc-439f-9a3b-c772bf4a311c" providerId="ADAL" clId="{B062104F-1E69-4CDF-A22D-D1D6E8C24F26}" dt="2023-03-27T02:09:40.413" v="6971" actId="1076"/>
           <ac:picMkLst>
@@ -5673,8 +5729,8 @@
             <ac:picMk id="5" creationId="{1ECD69AF-2C34-AA87-7DF3-63B64FE1C135}"/>
           </ac:picMkLst>
         </pc:picChg>
-        <pc:picChg chg="add mod">
-          <ac:chgData name="Matthieu De Mari" userId="dfb708c9-d8dc-439f-9a3b-c772bf4a311c" providerId="ADAL" clId="{B062104F-1E69-4CDF-A22D-D1D6E8C24F26}" dt="2023-03-27T02:09:19.439" v="6966" actId="14100"/>
+        <pc:picChg chg="add del mod">
+          <ac:chgData name="Matthieu De Mari" userId="dfb708c9-d8dc-439f-9a3b-c772bf4a311c" providerId="ADAL" clId="{B062104F-1E69-4CDF-A22D-D1D6E8C24F26}" dt="2023-03-30T07:34:30.729" v="12438" actId="478"/>
           <ac:picMkLst>
             <pc:docMk/>
             <pc:sldMk cId="1313730759" sldId="414"/>
@@ -5713,7 +5769,7 @@
         </pc:sldMkLst>
       </pc:sldChg>
       <pc:sldChg chg="addSp delSp modSp add mod">
-        <pc:chgData name="Matthieu De Mari" userId="dfb708c9-d8dc-439f-9a3b-c772bf4a311c" providerId="ADAL" clId="{B062104F-1E69-4CDF-A22D-D1D6E8C24F26}" dt="2023-03-27T02:18:46.084" v="8112" actId="20577"/>
+        <pc:chgData name="Matthieu De Mari" userId="dfb708c9-d8dc-439f-9a3b-c772bf4a311c" providerId="ADAL" clId="{B062104F-1E69-4CDF-A22D-D1D6E8C24F26}" dt="2023-03-30T07:33:46.459" v="12409" actId="1076"/>
         <pc:sldMkLst>
           <pc:docMk/>
           <pc:sldMk cId="4223509382" sldId="415"/>
@@ -5732,6 +5788,14 @@
             <pc:docMk/>
             <pc:sldMk cId="4223509382" sldId="415"/>
             <ac:picMk id="3" creationId="{B25F8C3F-C632-32E0-34B5-8C266725044E}"/>
+          </ac:picMkLst>
+        </pc:picChg>
+        <pc:picChg chg="add mod">
+          <ac:chgData name="Matthieu De Mari" userId="dfb708c9-d8dc-439f-9a3b-c772bf4a311c" providerId="ADAL" clId="{B062104F-1E69-4CDF-A22D-D1D6E8C24F26}" dt="2023-03-30T07:33:46.459" v="12409" actId="1076"/>
+          <ac:picMkLst>
+            <pc:docMk/>
+            <pc:sldMk cId="4223509382" sldId="415"/>
+            <ac:picMk id="3" creationId="{E48F462A-3051-697F-FF69-9DEF8559167E}"/>
           </ac:picMkLst>
         </pc:picChg>
         <pc:picChg chg="del">
@@ -5742,8 +5806,8 @@
             <ac:picMk id="6" creationId="{7537C2AA-6666-630C-FFE8-41317883A99B}"/>
           </ac:picMkLst>
         </pc:picChg>
-        <pc:picChg chg="add mod">
-          <ac:chgData name="Matthieu De Mari" userId="dfb708c9-d8dc-439f-9a3b-c772bf4a311c" providerId="ADAL" clId="{B062104F-1E69-4CDF-A22D-D1D6E8C24F26}" dt="2023-03-27T02:17:22.802" v="7897" actId="1036"/>
+        <pc:picChg chg="add del mod">
+          <ac:chgData name="Matthieu De Mari" userId="dfb708c9-d8dc-439f-9a3b-c772bf4a311c" providerId="ADAL" clId="{B062104F-1E69-4CDF-A22D-D1D6E8C24F26}" dt="2023-03-30T07:33:40.505" v="12407" actId="478"/>
           <ac:picMkLst>
             <pc:docMk/>
             <pc:sldMk cId="4223509382" sldId="415"/>
@@ -14582,7 +14646,7 @@
           <a:p>
             <a:fld id="{98CFC6A4-B085-437B-8084-693BEB2A32DE}" type="datetimeFigureOut">
               <a:rPr lang="en-SG" smtClean="0"/>
-              <a:t>28/3/2023</a:t>
+              <a:t>30/3/2023</a:t>
             </a:fld>
             <a:endParaRPr lang="en-SG"/>
           </a:p>
@@ -14999,7 +15063,7 @@
           <a:p>
             <a:fld id="{AB35F6B0-D468-4997-9CE3-CF2A1AE5E3F9}" type="datetimeFigureOut">
               <a:rPr lang="en-SG" smtClean="0"/>
-              <a:t>28/3/2023</a:t>
+              <a:t>30/3/2023</a:t>
             </a:fld>
             <a:endParaRPr lang="en-SG"/>
           </a:p>
@@ -15199,7 +15263,7 @@
           <a:p>
             <a:fld id="{AB35F6B0-D468-4997-9CE3-CF2A1AE5E3F9}" type="datetimeFigureOut">
               <a:rPr lang="en-SG" smtClean="0"/>
-              <a:t>28/3/2023</a:t>
+              <a:t>30/3/2023</a:t>
             </a:fld>
             <a:endParaRPr lang="en-SG"/>
           </a:p>
@@ -15409,7 +15473,7 @@
           <a:p>
             <a:fld id="{AB35F6B0-D468-4997-9CE3-CF2A1AE5E3F9}" type="datetimeFigureOut">
               <a:rPr lang="en-SG" smtClean="0"/>
-              <a:t>28/3/2023</a:t>
+              <a:t>30/3/2023</a:t>
             </a:fld>
             <a:endParaRPr lang="en-SG"/>
           </a:p>
@@ -15609,7 +15673,7 @@
           <a:p>
             <a:fld id="{AB35F6B0-D468-4997-9CE3-CF2A1AE5E3F9}" type="datetimeFigureOut">
               <a:rPr lang="en-SG" smtClean="0"/>
-              <a:t>28/3/2023</a:t>
+              <a:t>30/3/2023</a:t>
             </a:fld>
             <a:endParaRPr lang="en-SG"/>
           </a:p>
@@ -15885,7 +15949,7 @@
           <a:p>
             <a:fld id="{AB35F6B0-D468-4997-9CE3-CF2A1AE5E3F9}" type="datetimeFigureOut">
               <a:rPr lang="en-SG" smtClean="0"/>
-              <a:t>28/3/2023</a:t>
+              <a:t>30/3/2023</a:t>
             </a:fld>
             <a:endParaRPr lang="en-SG"/>
           </a:p>
@@ -16153,7 +16217,7 @@
           <a:p>
             <a:fld id="{AB35F6B0-D468-4997-9CE3-CF2A1AE5E3F9}" type="datetimeFigureOut">
               <a:rPr lang="en-SG" smtClean="0"/>
-              <a:t>28/3/2023</a:t>
+              <a:t>30/3/2023</a:t>
             </a:fld>
             <a:endParaRPr lang="en-SG"/>
           </a:p>
@@ -16568,7 +16632,7 @@
           <a:p>
             <a:fld id="{AB35F6B0-D468-4997-9CE3-CF2A1AE5E3F9}" type="datetimeFigureOut">
               <a:rPr lang="en-SG" smtClean="0"/>
-              <a:t>28/3/2023</a:t>
+              <a:t>30/3/2023</a:t>
             </a:fld>
             <a:endParaRPr lang="en-SG"/>
           </a:p>
@@ -16710,7 +16774,7 @@
           <a:p>
             <a:fld id="{AB35F6B0-D468-4997-9CE3-CF2A1AE5E3F9}" type="datetimeFigureOut">
               <a:rPr lang="en-SG" smtClean="0"/>
-              <a:t>28/3/2023</a:t>
+              <a:t>30/3/2023</a:t>
             </a:fld>
             <a:endParaRPr lang="en-SG"/>
           </a:p>
@@ -16823,7 +16887,7 @@
           <a:p>
             <a:fld id="{AB35F6B0-D468-4997-9CE3-CF2A1AE5E3F9}" type="datetimeFigureOut">
               <a:rPr lang="en-SG" smtClean="0"/>
-              <a:t>28/3/2023</a:t>
+              <a:t>30/3/2023</a:t>
             </a:fld>
             <a:endParaRPr lang="en-SG"/>
           </a:p>
@@ -17136,7 +17200,7 @@
           <a:p>
             <a:fld id="{AB35F6B0-D468-4997-9CE3-CF2A1AE5E3F9}" type="datetimeFigureOut">
               <a:rPr lang="en-SG" smtClean="0"/>
-              <a:t>28/3/2023</a:t>
+              <a:t>30/3/2023</a:t>
             </a:fld>
             <a:endParaRPr lang="en-SG"/>
           </a:p>
@@ -17425,7 +17489,7 @@
           <a:p>
             <a:fld id="{AB35F6B0-D468-4997-9CE3-CF2A1AE5E3F9}" type="datetimeFigureOut">
               <a:rPr lang="en-SG" smtClean="0"/>
-              <a:t>28/3/2023</a:t>
+              <a:t>30/3/2023</a:t>
             </a:fld>
             <a:endParaRPr lang="en-SG"/>
           </a:p>
@@ -17668,7 +17732,7 @@
           <a:p>
             <a:fld id="{AB35F6B0-D468-4997-9CE3-CF2A1AE5E3F9}" type="datetimeFigureOut">
               <a:rPr lang="en-SG" smtClean="0"/>
-              <a:t>28/3/2023</a:t>
+              <a:t>30/3/2023</a:t>
             </a:fld>
             <a:endParaRPr lang="en-SG"/>
           </a:p>
@@ -22306,10 +22370,10 @@
       </p:sp>
       <p:pic>
         <p:nvPicPr>
-          <p:cNvPr id="7" name="Picture 6">
+          <p:cNvPr id="3" name="Picture 2">
             <a:extLst>
               <a:ext uri="{FF2B5EF4-FFF2-40B4-BE49-F238E27FC236}">
-                <a16:creationId xmlns:a16="http://schemas.microsoft.com/office/drawing/2014/main" id="{91F01B81-0422-853E-1677-6A81D33DFEDD}"/>
+                <a16:creationId xmlns:a16="http://schemas.microsoft.com/office/drawing/2014/main" id="{E48F462A-3051-697F-FF69-9DEF8559167E}"/>
               </a:ext>
             </a:extLst>
           </p:cNvPr>
@@ -22326,8 +22390,8 @@
         </p:blipFill>
         <p:spPr>
           <a:xfrm>
-            <a:off x="0" y="2740411"/>
-            <a:ext cx="12192000" cy="4081293"/>
+            <a:off x="0" y="2794000"/>
+            <a:ext cx="12192000" cy="4064000"/>
           </a:xfrm>
           <a:prstGeom prst="rect">
             <a:avLst/>
@@ -22844,10 +22908,10 @@
       </p:grpSpPr>
       <p:pic>
         <p:nvPicPr>
-          <p:cNvPr id="7" name="Picture 6">
+          <p:cNvPr id="3" name="Picture 2">
             <a:extLst>
               <a:ext uri="{FF2B5EF4-FFF2-40B4-BE49-F238E27FC236}">
-                <a16:creationId xmlns:a16="http://schemas.microsoft.com/office/drawing/2014/main" id="{926B6400-8E44-1309-476D-6B945159EBC1}"/>
+                <a16:creationId xmlns:a16="http://schemas.microsoft.com/office/drawing/2014/main" id="{0DA51312-F25B-B942-611A-C2F3632C8E7A}"/>
               </a:ext>
             </a:extLst>
           </p:cNvPr>
@@ -22856,15 +22920,16 @@
           </p:cNvPicPr>
           <p:nvPr/>
         </p:nvPicPr>
-        <p:blipFill rotWithShape="1">
+        <p:blipFill>
           <a:blip r:embed="rId2"/>
-          <a:srcRect l="10577"/>
-          <a:stretch/>
+          <a:stretch>
+            <a:fillRect/>
+          </a:stretch>
         </p:blipFill>
         <p:spPr>
           <a:xfrm>
-            <a:off x="53162" y="2406566"/>
-            <a:ext cx="12138838" cy="4278150"/>
+            <a:off x="0" y="2603957"/>
+            <a:ext cx="12192000" cy="4064000"/>
           </a:xfrm>
           <a:prstGeom prst="rect">
             <a:avLst/>
@@ -22930,8 +22995,8 @@
         </p:nvSpPr>
         <p:spPr>
           <a:xfrm>
-            <a:off x="3290277" y="2005925"/>
-            <a:ext cx="7302721" cy="2730198"/>
+            <a:off x="3548185" y="2005925"/>
+            <a:ext cx="7044813" cy="2761460"/>
           </a:xfrm>
           <a:custGeom>
             <a:avLst/>
@@ -23050,10 +23115,10 @@
       </p:grpSpPr>
       <p:pic>
         <p:nvPicPr>
-          <p:cNvPr id="7" name="Picture 6">
+          <p:cNvPr id="4" name="Picture 3">
             <a:extLst>
               <a:ext uri="{FF2B5EF4-FFF2-40B4-BE49-F238E27FC236}">
-                <a16:creationId xmlns:a16="http://schemas.microsoft.com/office/drawing/2014/main" id="{926B6400-8E44-1309-476D-6B945159EBC1}"/>
+                <a16:creationId xmlns:a16="http://schemas.microsoft.com/office/drawing/2014/main" id="{F7136249-6C9A-86D1-98B3-9C3EF5D3EAD7}"/>
               </a:ext>
             </a:extLst>
           </p:cNvPr>
@@ -23062,15 +23127,16 @@
           </p:cNvPicPr>
           <p:nvPr/>
         </p:nvPicPr>
-        <p:blipFill rotWithShape="1">
+        <p:blipFill>
           <a:blip r:embed="rId2"/>
-          <a:srcRect l="10577"/>
-          <a:stretch/>
+          <a:stretch>
+            <a:fillRect/>
+          </a:stretch>
         </p:blipFill>
         <p:spPr>
           <a:xfrm>
-            <a:off x="53162" y="2406566"/>
-            <a:ext cx="12138838" cy="4278150"/>
+            <a:off x="0" y="2603957"/>
+            <a:ext cx="12192000" cy="4064000"/>
           </a:xfrm>
           <a:prstGeom prst="rect">
             <a:avLst/>
@@ -23136,8 +23202,8 @@
         </p:nvSpPr>
         <p:spPr>
           <a:xfrm>
-            <a:off x="8229600" y="1278563"/>
-            <a:ext cx="948813" cy="1628229"/>
+            <a:off x="8104554" y="1278563"/>
+            <a:ext cx="1073859" cy="1831960"/>
           </a:xfrm>
           <a:custGeom>
             <a:avLst/>
@@ -23256,10 +23322,10 @@
       </p:grpSpPr>
       <p:pic>
         <p:nvPicPr>
-          <p:cNvPr id="7" name="Picture 6">
+          <p:cNvPr id="2" name="Picture 1">
             <a:extLst>
               <a:ext uri="{FF2B5EF4-FFF2-40B4-BE49-F238E27FC236}">
-                <a16:creationId xmlns:a16="http://schemas.microsoft.com/office/drawing/2014/main" id="{926B6400-8E44-1309-476D-6B945159EBC1}"/>
+                <a16:creationId xmlns:a16="http://schemas.microsoft.com/office/drawing/2014/main" id="{38C177BA-937E-F33A-CD18-3818406A9DC7}"/>
               </a:ext>
             </a:extLst>
           </p:cNvPr>
@@ -23268,15 +23334,16 @@
           </p:cNvPicPr>
           <p:nvPr/>
         </p:nvPicPr>
-        <p:blipFill rotWithShape="1">
+        <p:blipFill>
           <a:blip r:embed="rId2"/>
-          <a:srcRect l="10577"/>
-          <a:stretch/>
+          <a:stretch>
+            <a:fillRect/>
+          </a:stretch>
         </p:blipFill>
         <p:spPr>
           <a:xfrm>
-            <a:off x="53162" y="2406566"/>
-            <a:ext cx="12138838" cy="4278150"/>
+            <a:off x="0" y="2603957"/>
+            <a:ext cx="12192000" cy="4064000"/>
           </a:xfrm>
           <a:prstGeom prst="rect">
             <a:avLst/>
@@ -23518,36 +23585,6 @@
           </a:prstGeom>
         </p:spPr>
       </p:pic>
-      <p:pic>
-        <p:nvPicPr>
-          <p:cNvPr id="7" name="Picture 6">
-            <a:extLst>
-              <a:ext uri="{FF2B5EF4-FFF2-40B4-BE49-F238E27FC236}">
-                <a16:creationId xmlns:a16="http://schemas.microsoft.com/office/drawing/2014/main" id="{0FACB8EB-3723-6C5D-9E76-950F64C1760D}"/>
-              </a:ext>
-            </a:extLst>
-          </p:cNvPr>
-          <p:cNvPicPr>
-            <a:picLocks noChangeAspect="1"/>
-          </p:cNvPicPr>
-          <p:nvPr/>
-        </p:nvPicPr>
-        <p:blipFill>
-          <a:blip r:embed="rId3"/>
-          <a:stretch>
-            <a:fillRect/>
-          </a:stretch>
-        </p:blipFill>
-        <p:spPr>
-          <a:xfrm>
-            <a:off x="7248260" y="180194"/>
-            <a:ext cx="4161119" cy="6513510"/>
-          </a:xfrm>
-          <a:prstGeom prst="rect">
-            <a:avLst/>
-          </a:prstGeom>
-        </p:spPr>
-      </p:pic>
       <p:sp>
         <p:nvSpPr>
           <p:cNvPr id="11" name="TextBox 10">
@@ -23672,6 +23709,36 @@
           </a:p>
         </p:txBody>
       </p:sp>
+      <p:pic>
+        <p:nvPicPr>
+          <p:cNvPr id="3" name="Picture 2">
+            <a:extLst>
+              <a:ext uri="{FF2B5EF4-FFF2-40B4-BE49-F238E27FC236}">
+                <a16:creationId xmlns:a16="http://schemas.microsoft.com/office/drawing/2014/main" id="{9F96E32E-903A-6978-B14C-609CFEAD0540}"/>
+              </a:ext>
+            </a:extLst>
+          </p:cNvPr>
+          <p:cNvPicPr>
+            <a:picLocks noChangeAspect="1"/>
+          </p:cNvPicPr>
+          <p:nvPr/>
+        </p:nvPicPr>
+        <p:blipFill>
+          <a:blip r:embed="rId3"/>
+          <a:stretch>
+            <a:fillRect/>
+          </a:stretch>
+        </p:blipFill>
+        <p:spPr>
+          <a:xfrm>
+            <a:off x="7367333" y="55844"/>
+            <a:ext cx="4222882" cy="6746312"/>
+          </a:xfrm>
+          <a:prstGeom prst="rect">
+            <a:avLst/>
+          </a:prstGeom>
+        </p:spPr>
+      </p:pic>
     </p:spTree>
     <p:extLst>
       <p:ext uri="{BB962C8B-B14F-4D97-AF65-F5344CB8AC3E}">

</xml_diff>